<commit_message>
gradient descent 작성 중
</commit_message>
<xml_diff>
--- a/pics/2020-08-16-gradient_descent/pics.pptx
+++ b/pics/2020-08-16-gradient_descent/pics.pptx
@@ -6,6 +6,7 @@
   </p:sldMasterIdLst>
   <p:sldIdLst>
     <p:sldId id="256" r:id="rId2"/>
+    <p:sldId id="257" r:id="rId3"/>
   </p:sldIdLst>
   <p:sldSz cx="12192000" cy="6858000"/>
   <p:notesSz cx="6858000" cy="9144000"/>
@@ -129,7 +130,7 @@
           <p:cNvPr id="2" name="제목 1">
             <a:extLst>
               <a:ext uri="{FF2B5EF4-FFF2-40B4-BE49-F238E27FC236}">
-                <a16:creationId xmlns:a16="http://schemas.microsoft.com/office/drawing/2014/main" id="{23AD7069-5964-4780-9D96-D06C66A124BB}"/>
+                <a16:creationId xmlns:a16="http://schemas.microsoft.com/office/drawing/2014/main" xmlns="" id="{23AD7069-5964-4780-9D96-D06C66A124BB}"/>
               </a:ext>
             </a:extLst>
           </p:cNvPr>
@@ -166,7 +167,7 @@
           <p:cNvPr id="3" name="부제목 2">
             <a:extLst>
               <a:ext uri="{FF2B5EF4-FFF2-40B4-BE49-F238E27FC236}">
-                <a16:creationId xmlns:a16="http://schemas.microsoft.com/office/drawing/2014/main" id="{0DF4A341-0E6D-49CC-816D-F511F3BE5429}"/>
+                <a16:creationId xmlns:a16="http://schemas.microsoft.com/office/drawing/2014/main" xmlns="" id="{0DF4A341-0E6D-49CC-816D-F511F3BE5429}"/>
               </a:ext>
             </a:extLst>
           </p:cNvPr>
@@ -236,7 +237,7 @@
           <p:cNvPr id="4" name="날짜 개체 틀 3">
             <a:extLst>
               <a:ext uri="{FF2B5EF4-FFF2-40B4-BE49-F238E27FC236}">
-                <a16:creationId xmlns:a16="http://schemas.microsoft.com/office/drawing/2014/main" id="{65732238-A993-44FF-9D8B-8F4B9C669825}"/>
+                <a16:creationId xmlns:a16="http://schemas.microsoft.com/office/drawing/2014/main" xmlns="" id="{65732238-A993-44FF-9D8B-8F4B9C669825}"/>
               </a:ext>
             </a:extLst>
           </p:cNvPr>
@@ -265,7 +266,7 @@
           <p:cNvPr id="5" name="바닥글 개체 틀 4">
             <a:extLst>
               <a:ext uri="{FF2B5EF4-FFF2-40B4-BE49-F238E27FC236}">
-                <a16:creationId xmlns:a16="http://schemas.microsoft.com/office/drawing/2014/main" id="{CFA07908-5C04-4E00-8FAD-37D13FEBB045}"/>
+                <a16:creationId xmlns:a16="http://schemas.microsoft.com/office/drawing/2014/main" xmlns="" id="{CFA07908-5C04-4E00-8FAD-37D13FEBB045}"/>
               </a:ext>
             </a:extLst>
           </p:cNvPr>
@@ -290,7 +291,7 @@
           <p:cNvPr id="6" name="슬라이드 번호 개체 틀 5">
             <a:extLst>
               <a:ext uri="{FF2B5EF4-FFF2-40B4-BE49-F238E27FC236}">
-                <a16:creationId xmlns:a16="http://schemas.microsoft.com/office/drawing/2014/main" id="{5082B68B-C6CF-4D79-89EC-BF9E33097671}"/>
+                <a16:creationId xmlns:a16="http://schemas.microsoft.com/office/drawing/2014/main" xmlns="" id="{5082B68B-C6CF-4D79-89EC-BF9E33097671}"/>
               </a:ext>
             </a:extLst>
           </p:cNvPr>
@@ -349,7 +350,7 @@
           <p:cNvPr id="2" name="제목 1">
             <a:extLst>
               <a:ext uri="{FF2B5EF4-FFF2-40B4-BE49-F238E27FC236}">
-                <a16:creationId xmlns:a16="http://schemas.microsoft.com/office/drawing/2014/main" id="{C671CFA0-0649-4B63-8095-C3030B04111C}"/>
+                <a16:creationId xmlns:a16="http://schemas.microsoft.com/office/drawing/2014/main" xmlns="" id="{C671CFA0-0649-4B63-8095-C3030B04111C}"/>
               </a:ext>
             </a:extLst>
           </p:cNvPr>
@@ -377,7 +378,7 @@
           <p:cNvPr id="3" name="세로 텍스트 개체 틀 2">
             <a:extLst>
               <a:ext uri="{FF2B5EF4-FFF2-40B4-BE49-F238E27FC236}">
-                <a16:creationId xmlns:a16="http://schemas.microsoft.com/office/drawing/2014/main" id="{727853BA-120F-40DE-94DF-800B6A289218}"/>
+                <a16:creationId xmlns:a16="http://schemas.microsoft.com/office/drawing/2014/main" xmlns="" id="{727853BA-120F-40DE-94DF-800B6A289218}"/>
               </a:ext>
             </a:extLst>
           </p:cNvPr>
@@ -434,7 +435,7 @@
           <p:cNvPr id="4" name="날짜 개체 틀 3">
             <a:extLst>
               <a:ext uri="{FF2B5EF4-FFF2-40B4-BE49-F238E27FC236}">
-                <a16:creationId xmlns:a16="http://schemas.microsoft.com/office/drawing/2014/main" id="{18CF8022-C9ED-4EF4-A238-3B614F74659D}"/>
+                <a16:creationId xmlns:a16="http://schemas.microsoft.com/office/drawing/2014/main" xmlns="" id="{18CF8022-C9ED-4EF4-A238-3B614F74659D}"/>
               </a:ext>
             </a:extLst>
           </p:cNvPr>
@@ -463,7 +464,7 @@
           <p:cNvPr id="5" name="바닥글 개체 틀 4">
             <a:extLst>
               <a:ext uri="{FF2B5EF4-FFF2-40B4-BE49-F238E27FC236}">
-                <a16:creationId xmlns:a16="http://schemas.microsoft.com/office/drawing/2014/main" id="{B1FC5681-6EE6-4E64-A91A-2BC302336060}"/>
+                <a16:creationId xmlns:a16="http://schemas.microsoft.com/office/drawing/2014/main" xmlns="" id="{B1FC5681-6EE6-4E64-A91A-2BC302336060}"/>
               </a:ext>
             </a:extLst>
           </p:cNvPr>
@@ -488,7 +489,7 @@
           <p:cNvPr id="6" name="슬라이드 번호 개체 틀 5">
             <a:extLst>
               <a:ext uri="{FF2B5EF4-FFF2-40B4-BE49-F238E27FC236}">
-                <a16:creationId xmlns:a16="http://schemas.microsoft.com/office/drawing/2014/main" id="{D33625FD-2D0C-48F7-B809-A53D41E4629C}"/>
+                <a16:creationId xmlns:a16="http://schemas.microsoft.com/office/drawing/2014/main" xmlns="" id="{D33625FD-2D0C-48F7-B809-A53D41E4629C}"/>
               </a:ext>
             </a:extLst>
           </p:cNvPr>
@@ -547,7 +548,7 @@
           <p:cNvPr id="2" name="세로 제목 1">
             <a:extLst>
               <a:ext uri="{FF2B5EF4-FFF2-40B4-BE49-F238E27FC236}">
-                <a16:creationId xmlns:a16="http://schemas.microsoft.com/office/drawing/2014/main" id="{9688BA00-9634-421D-A0D6-BACB7626627D}"/>
+                <a16:creationId xmlns:a16="http://schemas.microsoft.com/office/drawing/2014/main" xmlns="" id="{9688BA00-9634-421D-A0D6-BACB7626627D}"/>
               </a:ext>
             </a:extLst>
           </p:cNvPr>
@@ -580,7 +581,7 @@
           <p:cNvPr id="3" name="세로 텍스트 개체 틀 2">
             <a:extLst>
               <a:ext uri="{FF2B5EF4-FFF2-40B4-BE49-F238E27FC236}">
-                <a16:creationId xmlns:a16="http://schemas.microsoft.com/office/drawing/2014/main" id="{1D47EBBC-134A-4AA4-A609-A2EA9B176A78}"/>
+                <a16:creationId xmlns:a16="http://schemas.microsoft.com/office/drawing/2014/main" xmlns="" id="{1D47EBBC-134A-4AA4-A609-A2EA9B176A78}"/>
               </a:ext>
             </a:extLst>
           </p:cNvPr>
@@ -642,7 +643,7 @@
           <p:cNvPr id="4" name="날짜 개체 틀 3">
             <a:extLst>
               <a:ext uri="{FF2B5EF4-FFF2-40B4-BE49-F238E27FC236}">
-                <a16:creationId xmlns:a16="http://schemas.microsoft.com/office/drawing/2014/main" id="{761115FC-7EC7-4F68-A16F-08B5E29EC42D}"/>
+                <a16:creationId xmlns:a16="http://schemas.microsoft.com/office/drawing/2014/main" xmlns="" id="{761115FC-7EC7-4F68-A16F-08B5E29EC42D}"/>
               </a:ext>
             </a:extLst>
           </p:cNvPr>
@@ -671,7 +672,7 @@
           <p:cNvPr id="5" name="바닥글 개체 틀 4">
             <a:extLst>
               <a:ext uri="{FF2B5EF4-FFF2-40B4-BE49-F238E27FC236}">
-                <a16:creationId xmlns:a16="http://schemas.microsoft.com/office/drawing/2014/main" id="{1F8B6984-9501-4179-A2FF-11707BE1D892}"/>
+                <a16:creationId xmlns:a16="http://schemas.microsoft.com/office/drawing/2014/main" xmlns="" id="{1F8B6984-9501-4179-A2FF-11707BE1D892}"/>
               </a:ext>
             </a:extLst>
           </p:cNvPr>
@@ -696,7 +697,7 @@
           <p:cNvPr id="6" name="슬라이드 번호 개체 틀 5">
             <a:extLst>
               <a:ext uri="{FF2B5EF4-FFF2-40B4-BE49-F238E27FC236}">
-                <a16:creationId xmlns:a16="http://schemas.microsoft.com/office/drawing/2014/main" id="{1EFB39EE-367C-4851-9D46-9ACEDF00CDFB}"/>
+                <a16:creationId xmlns:a16="http://schemas.microsoft.com/office/drawing/2014/main" xmlns="" id="{1EFB39EE-367C-4851-9D46-9ACEDF00CDFB}"/>
               </a:ext>
             </a:extLst>
           </p:cNvPr>
@@ -755,7 +756,7 @@
           <p:cNvPr id="2" name="제목 1">
             <a:extLst>
               <a:ext uri="{FF2B5EF4-FFF2-40B4-BE49-F238E27FC236}">
-                <a16:creationId xmlns:a16="http://schemas.microsoft.com/office/drawing/2014/main" id="{ECD4A443-8749-4BBD-B492-5F28E6D7D0BD}"/>
+                <a16:creationId xmlns:a16="http://schemas.microsoft.com/office/drawing/2014/main" xmlns="" id="{ECD4A443-8749-4BBD-B492-5F28E6D7D0BD}"/>
               </a:ext>
             </a:extLst>
           </p:cNvPr>
@@ -783,7 +784,7 @@
           <p:cNvPr id="3" name="내용 개체 틀 2">
             <a:extLst>
               <a:ext uri="{FF2B5EF4-FFF2-40B4-BE49-F238E27FC236}">
-                <a16:creationId xmlns:a16="http://schemas.microsoft.com/office/drawing/2014/main" id="{BC6CE70D-D9F9-4534-AFA1-2A0A240048B0}"/>
+                <a16:creationId xmlns:a16="http://schemas.microsoft.com/office/drawing/2014/main" xmlns="" id="{BC6CE70D-D9F9-4534-AFA1-2A0A240048B0}"/>
               </a:ext>
             </a:extLst>
           </p:cNvPr>
@@ -840,7 +841,7 @@
           <p:cNvPr id="4" name="날짜 개체 틀 3">
             <a:extLst>
               <a:ext uri="{FF2B5EF4-FFF2-40B4-BE49-F238E27FC236}">
-                <a16:creationId xmlns:a16="http://schemas.microsoft.com/office/drawing/2014/main" id="{726FFC8A-465B-41DD-ACC1-014FDE8B92CC}"/>
+                <a16:creationId xmlns:a16="http://schemas.microsoft.com/office/drawing/2014/main" xmlns="" id="{726FFC8A-465B-41DD-ACC1-014FDE8B92CC}"/>
               </a:ext>
             </a:extLst>
           </p:cNvPr>
@@ -869,7 +870,7 @@
           <p:cNvPr id="5" name="바닥글 개체 틀 4">
             <a:extLst>
               <a:ext uri="{FF2B5EF4-FFF2-40B4-BE49-F238E27FC236}">
-                <a16:creationId xmlns:a16="http://schemas.microsoft.com/office/drawing/2014/main" id="{2297F822-B965-4D77-B9B9-B49F33FBD0FA}"/>
+                <a16:creationId xmlns:a16="http://schemas.microsoft.com/office/drawing/2014/main" xmlns="" id="{2297F822-B965-4D77-B9B9-B49F33FBD0FA}"/>
               </a:ext>
             </a:extLst>
           </p:cNvPr>
@@ -894,7 +895,7 @@
           <p:cNvPr id="6" name="슬라이드 번호 개체 틀 5">
             <a:extLst>
               <a:ext uri="{FF2B5EF4-FFF2-40B4-BE49-F238E27FC236}">
-                <a16:creationId xmlns:a16="http://schemas.microsoft.com/office/drawing/2014/main" id="{475EA872-F642-405C-97A6-8F3852DAE12E}"/>
+                <a16:creationId xmlns:a16="http://schemas.microsoft.com/office/drawing/2014/main" xmlns="" id="{475EA872-F642-405C-97A6-8F3852DAE12E}"/>
               </a:ext>
             </a:extLst>
           </p:cNvPr>
@@ -953,7 +954,7 @@
           <p:cNvPr id="2" name="제목 1">
             <a:extLst>
               <a:ext uri="{FF2B5EF4-FFF2-40B4-BE49-F238E27FC236}">
-                <a16:creationId xmlns:a16="http://schemas.microsoft.com/office/drawing/2014/main" id="{EFA03812-B77B-45D3-A461-83ED45D4B07F}"/>
+                <a16:creationId xmlns:a16="http://schemas.microsoft.com/office/drawing/2014/main" xmlns="" id="{EFA03812-B77B-45D3-A461-83ED45D4B07F}"/>
               </a:ext>
             </a:extLst>
           </p:cNvPr>
@@ -990,7 +991,7 @@
           <p:cNvPr id="3" name="텍스트 개체 틀 2">
             <a:extLst>
               <a:ext uri="{FF2B5EF4-FFF2-40B4-BE49-F238E27FC236}">
-                <a16:creationId xmlns:a16="http://schemas.microsoft.com/office/drawing/2014/main" id="{0255C030-3D9B-4201-B45D-AEF5BC606248}"/>
+                <a16:creationId xmlns:a16="http://schemas.microsoft.com/office/drawing/2014/main" xmlns="" id="{0255C030-3D9B-4201-B45D-AEF5BC606248}"/>
               </a:ext>
             </a:extLst>
           </p:cNvPr>
@@ -1115,7 +1116,7 @@
           <p:cNvPr id="4" name="날짜 개체 틀 3">
             <a:extLst>
               <a:ext uri="{FF2B5EF4-FFF2-40B4-BE49-F238E27FC236}">
-                <a16:creationId xmlns:a16="http://schemas.microsoft.com/office/drawing/2014/main" id="{B189197E-B5F5-437A-BAF9-9779E0B0AAEA}"/>
+                <a16:creationId xmlns:a16="http://schemas.microsoft.com/office/drawing/2014/main" xmlns="" id="{B189197E-B5F5-437A-BAF9-9779E0B0AAEA}"/>
               </a:ext>
             </a:extLst>
           </p:cNvPr>
@@ -1144,7 +1145,7 @@
           <p:cNvPr id="5" name="바닥글 개체 틀 4">
             <a:extLst>
               <a:ext uri="{FF2B5EF4-FFF2-40B4-BE49-F238E27FC236}">
-                <a16:creationId xmlns:a16="http://schemas.microsoft.com/office/drawing/2014/main" id="{C33DF5BF-781B-4E7B-BAA0-59D88BE03056}"/>
+                <a16:creationId xmlns:a16="http://schemas.microsoft.com/office/drawing/2014/main" xmlns="" id="{C33DF5BF-781B-4E7B-BAA0-59D88BE03056}"/>
               </a:ext>
             </a:extLst>
           </p:cNvPr>
@@ -1169,7 +1170,7 @@
           <p:cNvPr id="6" name="슬라이드 번호 개체 틀 5">
             <a:extLst>
               <a:ext uri="{FF2B5EF4-FFF2-40B4-BE49-F238E27FC236}">
-                <a16:creationId xmlns:a16="http://schemas.microsoft.com/office/drawing/2014/main" id="{CA580DCE-7755-4F22-9370-1B8FC26BF2B1}"/>
+                <a16:creationId xmlns:a16="http://schemas.microsoft.com/office/drawing/2014/main" xmlns="" id="{CA580DCE-7755-4F22-9370-1B8FC26BF2B1}"/>
               </a:ext>
             </a:extLst>
           </p:cNvPr>
@@ -1228,7 +1229,7 @@
           <p:cNvPr id="2" name="제목 1">
             <a:extLst>
               <a:ext uri="{FF2B5EF4-FFF2-40B4-BE49-F238E27FC236}">
-                <a16:creationId xmlns:a16="http://schemas.microsoft.com/office/drawing/2014/main" id="{DF757344-98BE-47ED-9ECF-C988ABA86568}"/>
+                <a16:creationId xmlns:a16="http://schemas.microsoft.com/office/drawing/2014/main" xmlns="" id="{DF757344-98BE-47ED-9ECF-C988ABA86568}"/>
               </a:ext>
             </a:extLst>
           </p:cNvPr>
@@ -1256,7 +1257,7 @@
           <p:cNvPr id="3" name="내용 개체 틀 2">
             <a:extLst>
               <a:ext uri="{FF2B5EF4-FFF2-40B4-BE49-F238E27FC236}">
-                <a16:creationId xmlns:a16="http://schemas.microsoft.com/office/drawing/2014/main" id="{B6B582D9-F1BA-407C-94C5-F3B6B97017A4}"/>
+                <a16:creationId xmlns:a16="http://schemas.microsoft.com/office/drawing/2014/main" xmlns="" id="{B6B582D9-F1BA-407C-94C5-F3B6B97017A4}"/>
               </a:ext>
             </a:extLst>
           </p:cNvPr>
@@ -1318,7 +1319,7 @@
           <p:cNvPr id="4" name="내용 개체 틀 3">
             <a:extLst>
               <a:ext uri="{FF2B5EF4-FFF2-40B4-BE49-F238E27FC236}">
-                <a16:creationId xmlns:a16="http://schemas.microsoft.com/office/drawing/2014/main" id="{43505CD2-CC54-420C-8818-027F081CAAE4}"/>
+                <a16:creationId xmlns:a16="http://schemas.microsoft.com/office/drawing/2014/main" xmlns="" id="{43505CD2-CC54-420C-8818-027F081CAAE4}"/>
               </a:ext>
             </a:extLst>
           </p:cNvPr>
@@ -1380,7 +1381,7 @@
           <p:cNvPr id="5" name="날짜 개체 틀 4">
             <a:extLst>
               <a:ext uri="{FF2B5EF4-FFF2-40B4-BE49-F238E27FC236}">
-                <a16:creationId xmlns:a16="http://schemas.microsoft.com/office/drawing/2014/main" id="{285F5A39-98CF-4D5F-882B-5D0170AEFCF9}"/>
+                <a16:creationId xmlns:a16="http://schemas.microsoft.com/office/drawing/2014/main" xmlns="" id="{285F5A39-98CF-4D5F-882B-5D0170AEFCF9}"/>
               </a:ext>
             </a:extLst>
           </p:cNvPr>
@@ -1409,7 +1410,7 @@
           <p:cNvPr id="6" name="바닥글 개체 틀 5">
             <a:extLst>
               <a:ext uri="{FF2B5EF4-FFF2-40B4-BE49-F238E27FC236}">
-                <a16:creationId xmlns:a16="http://schemas.microsoft.com/office/drawing/2014/main" id="{37DFAF4D-E89E-47E0-A0F6-0AAA4D83D469}"/>
+                <a16:creationId xmlns:a16="http://schemas.microsoft.com/office/drawing/2014/main" xmlns="" id="{37DFAF4D-E89E-47E0-A0F6-0AAA4D83D469}"/>
               </a:ext>
             </a:extLst>
           </p:cNvPr>
@@ -1434,7 +1435,7 @@
           <p:cNvPr id="7" name="슬라이드 번호 개체 틀 6">
             <a:extLst>
               <a:ext uri="{FF2B5EF4-FFF2-40B4-BE49-F238E27FC236}">
-                <a16:creationId xmlns:a16="http://schemas.microsoft.com/office/drawing/2014/main" id="{D21EEB7E-149D-4D98-B56D-0F077498A16E}"/>
+                <a16:creationId xmlns:a16="http://schemas.microsoft.com/office/drawing/2014/main" xmlns="" id="{D21EEB7E-149D-4D98-B56D-0F077498A16E}"/>
               </a:ext>
             </a:extLst>
           </p:cNvPr>
@@ -1493,7 +1494,7 @@
           <p:cNvPr id="2" name="제목 1">
             <a:extLst>
               <a:ext uri="{FF2B5EF4-FFF2-40B4-BE49-F238E27FC236}">
-                <a16:creationId xmlns:a16="http://schemas.microsoft.com/office/drawing/2014/main" id="{96648F8F-3694-44DE-B861-13D3A5287450}"/>
+                <a16:creationId xmlns:a16="http://schemas.microsoft.com/office/drawing/2014/main" xmlns="" id="{96648F8F-3694-44DE-B861-13D3A5287450}"/>
               </a:ext>
             </a:extLst>
           </p:cNvPr>
@@ -1526,7 +1527,7 @@
           <p:cNvPr id="3" name="텍스트 개체 틀 2">
             <a:extLst>
               <a:ext uri="{FF2B5EF4-FFF2-40B4-BE49-F238E27FC236}">
-                <a16:creationId xmlns:a16="http://schemas.microsoft.com/office/drawing/2014/main" id="{E1A473AA-E8E5-4063-80DA-652645969E0B}"/>
+                <a16:creationId xmlns:a16="http://schemas.microsoft.com/office/drawing/2014/main" xmlns="" id="{E1A473AA-E8E5-4063-80DA-652645969E0B}"/>
               </a:ext>
             </a:extLst>
           </p:cNvPr>
@@ -1597,7 +1598,7 @@
           <p:cNvPr id="4" name="내용 개체 틀 3">
             <a:extLst>
               <a:ext uri="{FF2B5EF4-FFF2-40B4-BE49-F238E27FC236}">
-                <a16:creationId xmlns:a16="http://schemas.microsoft.com/office/drawing/2014/main" id="{753BE0AE-C500-4820-8910-717D4C871AC0}"/>
+                <a16:creationId xmlns:a16="http://schemas.microsoft.com/office/drawing/2014/main" xmlns="" id="{753BE0AE-C500-4820-8910-717D4C871AC0}"/>
               </a:ext>
             </a:extLst>
           </p:cNvPr>
@@ -1659,7 +1660,7 @@
           <p:cNvPr id="5" name="텍스트 개체 틀 4">
             <a:extLst>
               <a:ext uri="{FF2B5EF4-FFF2-40B4-BE49-F238E27FC236}">
-                <a16:creationId xmlns:a16="http://schemas.microsoft.com/office/drawing/2014/main" id="{61295558-E7A0-4CC2-94BC-7B0BA7BD08D6}"/>
+                <a16:creationId xmlns:a16="http://schemas.microsoft.com/office/drawing/2014/main" xmlns="" id="{61295558-E7A0-4CC2-94BC-7B0BA7BD08D6}"/>
               </a:ext>
             </a:extLst>
           </p:cNvPr>
@@ -1730,7 +1731,7 @@
           <p:cNvPr id="6" name="내용 개체 틀 5">
             <a:extLst>
               <a:ext uri="{FF2B5EF4-FFF2-40B4-BE49-F238E27FC236}">
-                <a16:creationId xmlns:a16="http://schemas.microsoft.com/office/drawing/2014/main" id="{08974315-0AA3-4003-963B-355F2F04DCA6}"/>
+                <a16:creationId xmlns:a16="http://schemas.microsoft.com/office/drawing/2014/main" xmlns="" id="{08974315-0AA3-4003-963B-355F2F04DCA6}"/>
               </a:ext>
             </a:extLst>
           </p:cNvPr>
@@ -1792,7 +1793,7 @@
           <p:cNvPr id="7" name="날짜 개체 틀 6">
             <a:extLst>
               <a:ext uri="{FF2B5EF4-FFF2-40B4-BE49-F238E27FC236}">
-                <a16:creationId xmlns:a16="http://schemas.microsoft.com/office/drawing/2014/main" id="{55029DA8-0854-43EA-A10D-9AC5A8BC11D4}"/>
+                <a16:creationId xmlns:a16="http://schemas.microsoft.com/office/drawing/2014/main" xmlns="" id="{55029DA8-0854-43EA-A10D-9AC5A8BC11D4}"/>
               </a:ext>
             </a:extLst>
           </p:cNvPr>
@@ -1821,7 +1822,7 @@
           <p:cNvPr id="8" name="바닥글 개체 틀 7">
             <a:extLst>
               <a:ext uri="{FF2B5EF4-FFF2-40B4-BE49-F238E27FC236}">
-                <a16:creationId xmlns:a16="http://schemas.microsoft.com/office/drawing/2014/main" id="{1682983C-1C86-4BA4-BE30-74021C9C8005}"/>
+                <a16:creationId xmlns:a16="http://schemas.microsoft.com/office/drawing/2014/main" xmlns="" id="{1682983C-1C86-4BA4-BE30-74021C9C8005}"/>
               </a:ext>
             </a:extLst>
           </p:cNvPr>
@@ -1846,7 +1847,7 @@
           <p:cNvPr id="9" name="슬라이드 번호 개체 틀 8">
             <a:extLst>
               <a:ext uri="{FF2B5EF4-FFF2-40B4-BE49-F238E27FC236}">
-                <a16:creationId xmlns:a16="http://schemas.microsoft.com/office/drawing/2014/main" id="{B4498725-E39F-48C0-9C45-54F8FC091C64}"/>
+                <a16:creationId xmlns:a16="http://schemas.microsoft.com/office/drawing/2014/main" xmlns="" id="{B4498725-E39F-48C0-9C45-54F8FC091C64}"/>
               </a:ext>
             </a:extLst>
           </p:cNvPr>
@@ -1905,7 +1906,7 @@
           <p:cNvPr id="2" name="제목 1">
             <a:extLst>
               <a:ext uri="{FF2B5EF4-FFF2-40B4-BE49-F238E27FC236}">
-                <a16:creationId xmlns:a16="http://schemas.microsoft.com/office/drawing/2014/main" id="{2955AA9D-6786-4450-9BDD-2BA4EE48D863}"/>
+                <a16:creationId xmlns:a16="http://schemas.microsoft.com/office/drawing/2014/main" xmlns="" id="{2955AA9D-6786-4450-9BDD-2BA4EE48D863}"/>
               </a:ext>
             </a:extLst>
           </p:cNvPr>
@@ -1933,7 +1934,7 @@
           <p:cNvPr id="3" name="날짜 개체 틀 2">
             <a:extLst>
               <a:ext uri="{FF2B5EF4-FFF2-40B4-BE49-F238E27FC236}">
-                <a16:creationId xmlns:a16="http://schemas.microsoft.com/office/drawing/2014/main" id="{E146404A-1984-4C78-A3DE-21D46365CB7D}"/>
+                <a16:creationId xmlns:a16="http://schemas.microsoft.com/office/drawing/2014/main" xmlns="" id="{E146404A-1984-4C78-A3DE-21D46365CB7D}"/>
               </a:ext>
             </a:extLst>
           </p:cNvPr>
@@ -1962,7 +1963,7 @@
           <p:cNvPr id="4" name="바닥글 개체 틀 3">
             <a:extLst>
               <a:ext uri="{FF2B5EF4-FFF2-40B4-BE49-F238E27FC236}">
-                <a16:creationId xmlns:a16="http://schemas.microsoft.com/office/drawing/2014/main" id="{8F893B4E-C980-45B5-BE39-7594C6DD6ACA}"/>
+                <a16:creationId xmlns:a16="http://schemas.microsoft.com/office/drawing/2014/main" xmlns="" id="{8F893B4E-C980-45B5-BE39-7594C6DD6ACA}"/>
               </a:ext>
             </a:extLst>
           </p:cNvPr>
@@ -1987,7 +1988,7 @@
           <p:cNvPr id="5" name="슬라이드 번호 개체 틀 4">
             <a:extLst>
               <a:ext uri="{FF2B5EF4-FFF2-40B4-BE49-F238E27FC236}">
-                <a16:creationId xmlns:a16="http://schemas.microsoft.com/office/drawing/2014/main" id="{3BD722BB-12C7-45B1-B252-383CC3B99470}"/>
+                <a16:creationId xmlns:a16="http://schemas.microsoft.com/office/drawing/2014/main" xmlns="" id="{3BD722BB-12C7-45B1-B252-383CC3B99470}"/>
               </a:ext>
             </a:extLst>
           </p:cNvPr>
@@ -2046,7 +2047,7 @@
           <p:cNvPr id="2" name="날짜 개체 틀 1">
             <a:extLst>
               <a:ext uri="{FF2B5EF4-FFF2-40B4-BE49-F238E27FC236}">
-                <a16:creationId xmlns:a16="http://schemas.microsoft.com/office/drawing/2014/main" id="{E61E0A7B-EA91-432B-9461-3053C8942C9E}"/>
+                <a16:creationId xmlns:a16="http://schemas.microsoft.com/office/drawing/2014/main" xmlns="" id="{E61E0A7B-EA91-432B-9461-3053C8942C9E}"/>
               </a:ext>
             </a:extLst>
           </p:cNvPr>
@@ -2075,7 +2076,7 @@
           <p:cNvPr id="3" name="바닥글 개체 틀 2">
             <a:extLst>
               <a:ext uri="{FF2B5EF4-FFF2-40B4-BE49-F238E27FC236}">
-                <a16:creationId xmlns:a16="http://schemas.microsoft.com/office/drawing/2014/main" id="{BE16DEDA-1B9D-4DAE-A70C-EC2482A4D163}"/>
+                <a16:creationId xmlns:a16="http://schemas.microsoft.com/office/drawing/2014/main" xmlns="" id="{BE16DEDA-1B9D-4DAE-A70C-EC2482A4D163}"/>
               </a:ext>
             </a:extLst>
           </p:cNvPr>
@@ -2100,7 +2101,7 @@
           <p:cNvPr id="4" name="슬라이드 번호 개체 틀 3">
             <a:extLst>
               <a:ext uri="{FF2B5EF4-FFF2-40B4-BE49-F238E27FC236}">
-                <a16:creationId xmlns:a16="http://schemas.microsoft.com/office/drawing/2014/main" id="{82DFB462-9E50-4064-89B7-57CFB22BBD0F}"/>
+                <a16:creationId xmlns:a16="http://schemas.microsoft.com/office/drawing/2014/main" xmlns="" id="{82DFB462-9E50-4064-89B7-57CFB22BBD0F}"/>
               </a:ext>
             </a:extLst>
           </p:cNvPr>
@@ -2159,7 +2160,7 @@
           <p:cNvPr id="2" name="제목 1">
             <a:extLst>
               <a:ext uri="{FF2B5EF4-FFF2-40B4-BE49-F238E27FC236}">
-                <a16:creationId xmlns:a16="http://schemas.microsoft.com/office/drawing/2014/main" id="{6BE43F40-DE21-4959-A358-8BA8674B23BA}"/>
+                <a16:creationId xmlns:a16="http://schemas.microsoft.com/office/drawing/2014/main" xmlns="" id="{6BE43F40-DE21-4959-A358-8BA8674B23BA}"/>
               </a:ext>
             </a:extLst>
           </p:cNvPr>
@@ -2196,7 +2197,7 @@
           <p:cNvPr id="3" name="내용 개체 틀 2">
             <a:extLst>
               <a:ext uri="{FF2B5EF4-FFF2-40B4-BE49-F238E27FC236}">
-                <a16:creationId xmlns:a16="http://schemas.microsoft.com/office/drawing/2014/main" id="{26D00634-22EA-455E-B0A0-97DABB12CD44}"/>
+                <a16:creationId xmlns:a16="http://schemas.microsoft.com/office/drawing/2014/main" xmlns="" id="{26D00634-22EA-455E-B0A0-97DABB12CD44}"/>
               </a:ext>
             </a:extLst>
           </p:cNvPr>
@@ -2286,7 +2287,7 @@
           <p:cNvPr id="4" name="텍스트 개체 틀 3">
             <a:extLst>
               <a:ext uri="{FF2B5EF4-FFF2-40B4-BE49-F238E27FC236}">
-                <a16:creationId xmlns:a16="http://schemas.microsoft.com/office/drawing/2014/main" id="{8D5C2DF1-35A9-4DF1-A6FD-BA9C97B0749C}"/>
+                <a16:creationId xmlns:a16="http://schemas.microsoft.com/office/drawing/2014/main" xmlns="" id="{8D5C2DF1-35A9-4DF1-A6FD-BA9C97B0749C}"/>
               </a:ext>
             </a:extLst>
           </p:cNvPr>
@@ -2357,7 +2358,7 @@
           <p:cNvPr id="5" name="날짜 개체 틀 4">
             <a:extLst>
               <a:ext uri="{FF2B5EF4-FFF2-40B4-BE49-F238E27FC236}">
-                <a16:creationId xmlns:a16="http://schemas.microsoft.com/office/drawing/2014/main" id="{4E4957CF-8698-4102-9554-5E2CACD059EA}"/>
+                <a16:creationId xmlns:a16="http://schemas.microsoft.com/office/drawing/2014/main" xmlns="" id="{4E4957CF-8698-4102-9554-5E2CACD059EA}"/>
               </a:ext>
             </a:extLst>
           </p:cNvPr>
@@ -2386,7 +2387,7 @@
           <p:cNvPr id="6" name="바닥글 개체 틀 5">
             <a:extLst>
               <a:ext uri="{FF2B5EF4-FFF2-40B4-BE49-F238E27FC236}">
-                <a16:creationId xmlns:a16="http://schemas.microsoft.com/office/drawing/2014/main" id="{491EAA55-0603-4F33-85DB-1BBC35465821}"/>
+                <a16:creationId xmlns:a16="http://schemas.microsoft.com/office/drawing/2014/main" xmlns="" id="{491EAA55-0603-4F33-85DB-1BBC35465821}"/>
               </a:ext>
             </a:extLst>
           </p:cNvPr>
@@ -2411,7 +2412,7 @@
           <p:cNvPr id="7" name="슬라이드 번호 개체 틀 6">
             <a:extLst>
               <a:ext uri="{FF2B5EF4-FFF2-40B4-BE49-F238E27FC236}">
-                <a16:creationId xmlns:a16="http://schemas.microsoft.com/office/drawing/2014/main" id="{0029C551-183E-4D0D-9254-0D1A36A55CF9}"/>
+                <a16:creationId xmlns:a16="http://schemas.microsoft.com/office/drawing/2014/main" xmlns="" id="{0029C551-183E-4D0D-9254-0D1A36A55CF9}"/>
               </a:ext>
             </a:extLst>
           </p:cNvPr>
@@ -2470,7 +2471,7 @@
           <p:cNvPr id="2" name="제목 1">
             <a:extLst>
               <a:ext uri="{FF2B5EF4-FFF2-40B4-BE49-F238E27FC236}">
-                <a16:creationId xmlns:a16="http://schemas.microsoft.com/office/drawing/2014/main" id="{0B7E93DA-3856-4F86-9766-3EB54D2B7C24}"/>
+                <a16:creationId xmlns:a16="http://schemas.microsoft.com/office/drawing/2014/main" xmlns="" id="{0B7E93DA-3856-4F86-9766-3EB54D2B7C24}"/>
               </a:ext>
             </a:extLst>
           </p:cNvPr>
@@ -2507,7 +2508,7 @@
           <p:cNvPr id="3" name="그림 개체 틀 2">
             <a:extLst>
               <a:ext uri="{FF2B5EF4-FFF2-40B4-BE49-F238E27FC236}">
-                <a16:creationId xmlns:a16="http://schemas.microsoft.com/office/drawing/2014/main" id="{2215CE40-D8AC-4ED0-9786-9F04041B741A}"/>
+                <a16:creationId xmlns:a16="http://schemas.microsoft.com/office/drawing/2014/main" xmlns="" id="{2215CE40-D8AC-4ED0-9786-9F04041B741A}"/>
               </a:ext>
             </a:extLst>
           </p:cNvPr>
@@ -2574,7 +2575,7 @@
           <p:cNvPr id="4" name="텍스트 개체 틀 3">
             <a:extLst>
               <a:ext uri="{FF2B5EF4-FFF2-40B4-BE49-F238E27FC236}">
-                <a16:creationId xmlns:a16="http://schemas.microsoft.com/office/drawing/2014/main" id="{3C89CECC-4172-4B4D-A3E0-EEC3D6AF65FB}"/>
+                <a16:creationId xmlns:a16="http://schemas.microsoft.com/office/drawing/2014/main" xmlns="" id="{3C89CECC-4172-4B4D-A3E0-EEC3D6AF65FB}"/>
               </a:ext>
             </a:extLst>
           </p:cNvPr>
@@ -2645,7 +2646,7 @@
           <p:cNvPr id="5" name="날짜 개체 틀 4">
             <a:extLst>
               <a:ext uri="{FF2B5EF4-FFF2-40B4-BE49-F238E27FC236}">
-                <a16:creationId xmlns:a16="http://schemas.microsoft.com/office/drawing/2014/main" id="{C845CF85-B887-41D5-AAB8-D8BD4456601B}"/>
+                <a16:creationId xmlns:a16="http://schemas.microsoft.com/office/drawing/2014/main" xmlns="" id="{C845CF85-B887-41D5-AAB8-D8BD4456601B}"/>
               </a:ext>
             </a:extLst>
           </p:cNvPr>
@@ -2674,7 +2675,7 @@
           <p:cNvPr id="6" name="바닥글 개체 틀 5">
             <a:extLst>
               <a:ext uri="{FF2B5EF4-FFF2-40B4-BE49-F238E27FC236}">
-                <a16:creationId xmlns:a16="http://schemas.microsoft.com/office/drawing/2014/main" id="{1C5CA868-9687-46ED-AB94-D8FC7B58DB4B}"/>
+                <a16:creationId xmlns:a16="http://schemas.microsoft.com/office/drawing/2014/main" xmlns="" id="{1C5CA868-9687-46ED-AB94-D8FC7B58DB4B}"/>
               </a:ext>
             </a:extLst>
           </p:cNvPr>
@@ -2699,7 +2700,7 @@
           <p:cNvPr id="7" name="슬라이드 번호 개체 틀 6">
             <a:extLst>
               <a:ext uri="{FF2B5EF4-FFF2-40B4-BE49-F238E27FC236}">
-                <a16:creationId xmlns:a16="http://schemas.microsoft.com/office/drawing/2014/main" id="{9E600FCF-2DA4-45D1-B3F6-76E223840884}"/>
+                <a16:creationId xmlns:a16="http://schemas.microsoft.com/office/drawing/2014/main" xmlns="" id="{9E600FCF-2DA4-45D1-B3F6-76E223840884}"/>
               </a:ext>
             </a:extLst>
           </p:cNvPr>
@@ -2763,7 +2764,7 @@
           <p:cNvPr id="2" name="제목 개체 틀 1">
             <a:extLst>
               <a:ext uri="{FF2B5EF4-FFF2-40B4-BE49-F238E27FC236}">
-                <a16:creationId xmlns:a16="http://schemas.microsoft.com/office/drawing/2014/main" id="{A8C52A6F-F497-44A1-BB14-3E6CC014E8A6}"/>
+                <a16:creationId xmlns:a16="http://schemas.microsoft.com/office/drawing/2014/main" xmlns="" id="{A8C52A6F-F497-44A1-BB14-3E6CC014E8A6}"/>
               </a:ext>
             </a:extLst>
           </p:cNvPr>
@@ -2801,7 +2802,7 @@
           <p:cNvPr id="3" name="텍스트 개체 틀 2">
             <a:extLst>
               <a:ext uri="{FF2B5EF4-FFF2-40B4-BE49-F238E27FC236}">
-                <a16:creationId xmlns:a16="http://schemas.microsoft.com/office/drawing/2014/main" id="{190A1CFD-3476-480F-B326-5BE6504B4367}"/>
+                <a16:creationId xmlns:a16="http://schemas.microsoft.com/office/drawing/2014/main" xmlns="" id="{190A1CFD-3476-480F-B326-5BE6504B4367}"/>
               </a:ext>
             </a:extLst>
           </p:cNvPr>
@@ -2868,7 +2869,7 @@
           <p:cNvPr id="4" name="날짜 개체 틀 3">
             <a:extLst>
               <a:ext uri="{FF2B5EF4-FFF2-40B4-BE49-F238E27FC236}">
-                <a16:creationId xmlns:a16="http://schemas.microsoft.com/office/drawing/2014/main" id="{1CF80ACE-931E-4D4D-B423-87DA0B2985D6}"/>
+                <a16:creationId xmlns:a16="http://schemas.microsoft.com/office/drawing/2014/main" xmlns="" id="{1CF80ACE-931E-4D4D-B423-87DA0B2985D6}"/>
               </a:ext>
             </a:extLst>
           </p:cNvPr>
@@ -2915,7 +2916,7 @@
           <p:cNvPr id="5" name="바닥글 개체 틀 4">
             <a:extLst>
               <a:ext uri="{FF2B5EF4-FFF2-40B4-BE49-F238E27FC236}">
-                <a16:creationId xmlns:a16="http://schemas.microsoft.com/office/drawing/2014/main" id="{E5510432-09DD-48D1-9EB0-C69B1BDEBAB9}"/>
+                <a16:creationId xmlns:a16="http://schemas.microsoft.com/office/drawing/2014/main" xmlns="" id="{E5510432-09DD-48D1-9EB0-C69B1BDEBAB9}"/>
               </a:ext>
             </a:extLst>
           </p:cNvPr>
@@ -2958,7 +2959,7 @@
           <p:cNvPr id="6" name="슬라이드 번호 개체 틀 5">
             <a:extLst>
               <a:ext uri="{FF2B5EF4-FFF2-40B4-BE49-F238E27FC236}">
-                <a16:creationId xmlns:a16="http://schemas.microsoft.com/office/drawing/2014/main" id="{10FF43BD-85A3-4AE5-84F6-A3A72925CDB5}"/>
+                <a16:creationId xmlns:a16="http://schemas.microsoft.com/office/drawing/2014/main" xmlns="" id="{10FF43BD-85A3-4AE5-84F6-A3A72925CDB5}"/>
               </a:ext>
             </a:extLst>
           </p:cNvPr>
@@ -3326,7 +3327,7 @@
           <p:cNvPr id="28" name="그룹 27">
             <a:extLst>
               <a:ext uri="{FF2B5EF4-FFF2-40B4-BE49-F238E27FC236}">
-                <a16:creationId xmlns:a16="http://schemas.microsoft.com/office/drawing/2014/main" id="{35BB685C-447C-4A35-B90C-BBF1085510D5}"/>
+                <a16:creationId xmlns:a16="http://schemas.microsoft.com/office/drawing/2014/main" xmlns="" id="{35BB685C-447C-4A35-B90C-BBF1085510D5}"/>
               </a:ext>
             </a:extLst>
           </p:cNvPr>
@@ -3346,7 +3347,7 @@
             <p:cNvPr id="4" name="그림 3">
               <a:extLst>
                 <a:ext uri="{FF2B5EF4-FFF2-40B4-BE49-F238E27FC236}">
-                  <a16:creationId xmlns:a16="http://schemas.microsoft.com/office/drawing/2014/main" id="{7692B2D0-E87F-4CEA-8559-C34C4A7B07C4}"/>
+                  <a16:creationId xmlns:a16="http://schemas.microsoft.com/office/drawing/2014/main" xmlns="" id="{7692B2D0-E87F-4CEA-8559-C34C4A7B07C4}"/>
                 </a:ext>
               </a:extLst>
             </p:cNvPr>
@@ -3376,7 +3377,7 @@
             <p:cNvPr id="27" name="그룹 26">
               <a:extLst>
                 <a:ext uri="{FF2B5EF4-FFF2-40B4-BE49-F238E27FC236}">
-                  <a16:creationId xmlns:a16="http://schemas.microsoft.com/office/drawing/2014/main" id="{C2765D57-1FA6-4E35-A821-E79D4AF47DE8}"/>
+                  <a16:creationId xmlns:a16="http://schemas.microsoft.com/office/drawing/2014/main" xmlns="" id="{C2765D57-1FA6-4E35-A821-E79D4AF47DE8}"/>
                 </a:ext>
               </a:extLst>
             </p:cNvPr>
@@ -3396,7 +3397,7 @@
               <p:cNvPr id="6" name="직선 화살표 연결선 5">
                 <a:extLst>
                   <a:ext uri="{FF2B5EF4-FFF2-40B4-BE49-F238E27FC236}">
-                    <a16:creationId xmlns:a16="http://schemas.microsoft.com/office/drawing/2014/main" id="{D7DB7754-F1D3-49C6-A62C-3827DCBA8B00}"/>
+                    <a16:creationId xmlns:a16="http://schemas.microsoft.com/office/drawing/2014/main" xmlns="" id="{D7DB7754-F1D3-49C6-A62C-3827DCBA8B00}"/>
                   </a:ext>
                 </a:extLst>
               </p:cNvPr>
@@ -3440,7 +3441,7 @@
               <p:cNvPr id="9" name="직선 화살표 연결선 8">
                 <a:extLst>
                   <a:ext uri="{FF2B5EF4-FFF2-40B4-BE49-F238E27FC236}">
-                    <a16:creationId xmlns:a16="http://schemas.microsoft.com/office/drawing/2014/main" id="{09C90FEC-5A86-49A5-8A3B-FFF54265A8E3}"/>
+                    <a16:creationId xmlns:a16="http://schemas.microsoft.com/office/drawing/2014/main" xmlns="" id="{09C90FEC-5A86-49A5-8A3B-FFF54265A8E3}"/>
                   </a:ext>
                 </a:extLst>
               </p:cNvPr>
@@ -3484,7 +3485,7 @@
               <p:cNvPr id="12" name="직선 화살표 연결선 11">
                 <a:extLst>
                   <a:ext uri="{FF2B5EF4-FFF2-40B4-BE49-F238E27FC236}">
-                    <a16:creationId xmlns:a16="http://schemas.microsoft.com/office/drawing/2014/main" id="{5E42743C-E681-44C1-8F94-C9F08EE94C22}"/>
+                    <a16:creationId xmlns:a16="http://schemas.microsoft.com/office/drawing/2014/main" xmlns="" id="{5E42743C-E681-44C1-8F94-C9F08EE94C22}"/>
                   </a:ext>
                 </a:extLst>
               </p:cNvPr>
@@ -3528,7 +3529,7 @@
               <p:cNvPr id="15" name="직선 화살표 연결선 14">
                 <a:extLst>
                   <a:ext uri="{FF2B5EF4-FFF2-40B4-BE49-F238E27FC236}">
-                    <a16:creationId xmlns:a16="http://schemas.microsoft.com/office/drawing/2014/main" id="{BC6C7C61-B860-4A91-8571-D82AD07D2985}"/>
+                    <a16:creationId xmlns:a16="http://schemas.microsoft.com/office/drawing/2014/main" xmlns="" id="{BC6C7C61-B860-4A91-8571-D82AD07D2985}"/>
                   </a:ext>
                 </a:extLst>
               </p:cNvPr>
@@ -3572,7 +3573,7 @@
               <p:cNvPr id="20" name="그림 19">
                 <a:extLst>
                   <a:ext uri="{FF2B5EF4-FFF2-40B4-BE49-F238E27FC236}">
-                    <a16:creationId xmlns:a16="http://schemas.microsoft.com/office/drawing/2014/main" id="{50932BD1-E3D4-499D-95CA-4A42A5236EE7}"/>
+                    <a16:creationId xmlns:a16="http://schemas.microsoft.com/office/drawing/2014/main" xmlns="" id="{50932BD1-E3D4-499D-95CA-4A42A5236EE7}"/>
                   </a:ext>
                 </a:extLst>
               </p:cNvPr>
@@ -3601,7 +3602,7 @@
               <p:cNvPr id="21" name="TextBox 20">
                 <a:extLst>
                   <a:ext uri="{FF2B5EF4-FFF2-40B4-BE49-F238E27FC236}">
-                    <a16:creationId xmlns:a16="http://schemas.microsoft.com/office/drawing/2014/main" id="{304036DD-579B-4240-B70C-BEE2DE720921}"/>
+                    <a16:creationId xmlns:a16="http://schemas.microsoft.com/office/drawing/2014/main" xmlns="" id="{304036DD-579B-4240-B70C-BEE2DE720921}"/>
                   </a:ext>
                 </a:extLst>
               </p:cNvPr>
@@ -3636,7 +3637,7 @@
               <p:cNvPr id="22" name="TextBox 21">
                 <a:extLst>
                   <a:ext uri="{FF2B5EF4-FFF2-40B4-BE49-F238E27FC236}">
-                    <a16:creationId xmlns:a16="http://schemas.microsoft.com/office/drawing/2014/main" id="{0A89143E-2963-422F-84EF-87F703DA8F73}"/>
+                    <a16:creationId xmlns:a16="http://schemas.microsoft.com/office/drawing/2014/main" xmlns="" id="{0A89143E-2963-422F-84EF-87F703DA8F73}"/>
                   </a:ext>
                 </a:extLst>
               </p:cNvPr>
@@ -3672,7 +3673,7 @@
               <p:cNvPr id="23" name="직선 화살표 연결선 22">
                 <a:extLst>
                   <a:ext uri="{FF2B5EF4-FFF2-40B4-BE49-F238E27FC236}">
-                    <a16:creationId xmlns:a16="http://schemas.microsoft.com/office/drawing/2014/main" id="{32A5347C-FC5D-4463-A04A-C426A57D2DDE}"/>
+                    <a16:creationId xmlns:a16="http://schemas.microsoft.com/office/drawing/2014/main" xmlns="" id="{32A5347C-FC5D-4463-A04A-C426A57D2DDE}"/>
                   </a:ext>
                 </a:extLst>
               </p:cNvPr>
@@ -3727,6 +3728,100 @@
 </p:sld>
 </file>
 
+<file path=ppt/slides/slide2.xml><?xml version="1.0" encoding="utf-8"?>
+<p:sld xmlns:a="http://schemas.openxmlformats.org/drawingml/2006/main" xmlns:r="http://schemas.openxmlformats.org/officeDocument/2006/relationships" xmlns:p="http://schemas.openxmlformats.org/presentationml/2006/main">
+  <p:cSld>
+    <p:spTree>
+      <p:nvGrpSpPr>
+        <p:cNvPr id="1" name=""/>
+        <p:cNvGrpSpPr/>
+        <p:nvPr/>
+      </p:nvGrpSpPr>
+      <p:grpSpPr>
+        <a:xfrm>
+          <a:off x="0" y="0"/>
+          <a:ext cx="0" cy="0"/>
+          <a:chOff x="0" y="0"/>
+          <a:chExt cx="0" cy="0"/>
+        </a:xfrm>
+      </p:grpSpPr>
+      <p:pic>
+        <p:nvPicPr>
+          <p:cNvPr id="1026" name="Picture 2"/>
+          <p:cNvPicPr>
+            <a:picLocks noChangeAspect="1" noChangeArrowheads="1"/>
+          </p:cNvPicPr>
+          <p:nvPr/>
+        </p:nvPicPr>
+        <p:blipFill>
+          <a:blip r:embed="rId2">
+            <a:extLst>
+              <a:ext uri="{28A0092B-C50C-407E-A947-70E740481C1C}">
+                <a14:useLocalDpi xmlns:a14="http://schemas.microsoft.com/office/drawing/2010/main" val="0"/>
+              </a:ext>
+            </a:extLst>
+          </a:blip>
+          <a:srcRect/>
+          <a:stretch>
+            <a:fillRect/>
+          </a:stretch>
+        </p:blipFill>
+        <p:spPr bwMode="auto">
+          <a:xfrm>
+            <a:off x="2900734" y="1035171"/>
+            <a:ext cx="6387358" cy="4787660"/>
+          </a:xfrm>
+          <a:prstGeom prst="rect">
+            <a:avLst/>
+          </a:prstGeom>
+          <a:noFill/>
+          <a:ln>
+            <a:noFill/>
+          </a:ln>
+          <a:effectLst/>
+          <a:extLst>
+            <a:ext uri="{909E8E84-426E-40DD-AFC4-6F175D3DCCD1}">
+              <a14:hiddenFill xmlns:a14="http://schemas.microsoft.com/office/drawing/2010/main">
+                <a:solidFill>
+                  <a:schemeClr val="accent1"/>
+                </a:solidFill>
+              </a14:hiddenFill>
+            </a:ext>
+            <a:ext uri="{91240B29-F687-4F45-9708-019B960494DF}">
+              <a14:hiddenLine xmlns:a14="http://schemas.microsoft.com/office/drawing/2010/main" w="9525">
+                <a:solidFill>
+                  <a:schemeClr val="tx1"/>
+                </a:solidFill>
+                <a:miter lim="800000"/>
+                <a:headEnd/>
+                <a:tailEnd/>
+              </a14:hiddenLine>
+            </a:ext>
+            <a:ext uri="{AF507438-7753-43E0-B8FC-AC1667EBCBE1}">
+              <a14:hiddenEffects xmlns:a14="http://schemas.microsoft.com/office/drawing/2010/main">
+                <a:effectLst>
+                  <a:outerShdw dist="35921" dir="2700000" algn="ctr" rotWithShape="0">
+                    <a:schemeClr val="bg2"/>
+                  </a:outerShdw>
+                </a:effectLst>
+              </a14:hiddenEffects>
+            </a:ext>
+          </a:extLst>
+        </p:spPr>
+      </p:pic>
+    </p:spTree>
+    <p:extLst>
+      <p:ext uri="{BB962C8B-B14F-4D97-AF65-F5344CB8AC3E}">
+        <p14:creationId xmlns:p14="http://schemas.microsoft.com/office/powerpoint/2010/main" val="2483623747"/>
+      </p:ext>
+    </p:extLst>
+  </p:cSld>
+  <p:clrMapOvr>
+    <a:masterClrMapping/>
+  </p:clrMapOvr>
+</p:sld>
+</file>
+
 <file path=ppt/theme/theme1.xml><?xml version="1.0" encoding="utf-8"?>
 <a:theme xmlns:a="http://schemas.openxmlformats.org/drawingml/2006/main" name="Office 테마">
   <a:themeElements>
@@ -3770,7 +3865,7 @@
     </a:clrScheme>
     <a:fontScheme name="Office">
       <a:majorFont>
-        <a:latin typeface="맑은 고딕" panose="020F0302020204030204"/>
+        <a:latin typeface="맑은 고딕"/>
         <a:ea typeface=""/>
         <a:cs typeface=""/>
         <a:font script="Jpan" typeface="游ゴシック Light"/>
@@ -3822,7 +3917,7 @@
         <a:font script="Tfng" typeface="Ebrima"/>
       </a:majorFont>
       <a:minorFont>
-        <a:latin typeface="맑은 고딕" panose="020F0502020204030204"/>
+        <a:latin typeface="맑은 고딕"/>
         <a:ea typeface=""/>
         <a:cs typeface=""/>
         <a:font script="Jpan" typeface="游ゴシック"/>
@@ -4016,7 +4111,7 @@
   <a:extraClrSchemeLst/>
   <a:extLst>
     <a:ext uri="{05A4C25C-085E-4340-85A3-A5531E510DB2}">
-      <thm15:themeFamily xmlns:thm15="http://schemas.microsoft.com/office/thememl/2012/main" name="Office Theme" id="{62F939B6-93AF-4DB8-9C6B-D6C7DFDC589F}" vid="{4A3C46E8-61CC-4603-A589-7422A47A8E4A}"/>
+      <thm15:themeFamily xmlns:thm15="http://schemas.microsoft.com/office/thememl/2012/main" xmlns="" name="Office Theme" id="{62F939B6-93AF-4DB8-9C6B-D6C7DFDC589F}" vid="{4A3C46E8-61CC-4603-A589-7422A47A8E4A}"/>
     </a:ext>
   </a:extLst>
 </a:theme>

</xml_diff>

<commit_message>
gradient descent pics.pptx 저장
</commit_message>
<xml_diff>
--- a/pics/2020-08-16-gradient_descent/pics.pptx
+++ b/pics/2020-08-16-gradient_descent/pics.pptx
@@ -105,6 +105,22 @@
       </a:defRPr>
     </a:lvl9pPr>
   </p:defaultTextStyle>
+  <p:extLst>
+    <p:ext uri="{EFAFB233-063F-42B5-8137-9DF3F51BA10A}">
+      <p15:sldGuideLst xmlns:p15="http://schemas.microsoft.com/office/powerpoint/2012/main">
+        <p15:guide id="1" orient="horz" pos="2160">
+          <p15:clr>
+            <a:srgbClr val="A4A3A4"/>
+          </p15:clr>
+        </p15:guide>
+        <p15:guide id="2" pos="3840">
+          <p15:clr>
+            <a:srgbClr val="A4A3A4"/>
+          </p15:clr>
+        </p15:guide>
+      </p15:sldGuideLst>
+    </p:ext>
+  </p:extLst>
 </p:presentation>
 </file>
 
@@ -130,7 +146,7 @@
           <p:cNvPr id="2" name="제목 1">
             <a:extLst>
               <a:ext uri="{FF2B5EF4-FFF2-40B4-BE49-F238E27FC236}">
-                <a16:creationId xmlns:a16="http://schemas.microsoft.com/office/drawing/2014/main" xmlns="" id="{23AD7069-5964-4780-9D96-D06C66A124BB}"/>
+                <a16:creationId xmlns:a16="http://schemas.microsoft.com/office/drawing/2014/main" id="{23AD7069-5964-4780-9D96-D06C66A124BB}"/>
               </a:ext>
             </a:extLst>
           </p:cNvPr>
@@ -167,7 +183,7 @@
           <p:cNvPr id="3" name="부제목 2">
             <a:extLst>
               <a:ext uri="{FF2B5EF4-FFF2-40B4-BE49-F238E27FC236}">
-                <a16:creationId xmlns:a16="http://schemas.microsoft.com/office/drawing/2014/main" xmlns="" id="{0DF4A341-0E6D-49CC-816D-F511F3BE5429}"/>
+                <a16:creationId xmlns:a16="http://schemas.microsoft.com/office/drawing/2014/main" id="{0DF4A341-0E6D-49CC-816D-F511F3BE5429}"/>
               </a:ext>
             </a:extLst>
           </p:cNvPr>
@@ -237,7 +253,7 @@
           <p:cNvPr id="4" name="날짜 개체 틀 3">
             <a:extLst>
               <a:ext uri="{FF2B5EF4-FFF2-40B4-BE49-F238E27FC236}">
-                <a16:creationId xmlns:a16="http://schemas.microsoft.com/office/drawing/2014/main" xmlns="" id="{65732238-A993-44FF-9D8B-8F4B9C669825}"/>
+                <a16:creationId xmlns:a16="http://schemas.microsoft.com/office/drawing/2014/main" id="{65732238-A993-44FF-9D8B-8F4B9C669825}"/>
               </a:ext>
             </a:extLst>
           </p:cNvPr>
@@ -266,7 +282,7 @@
           <p:cNvPr id="5" name="바닥글 개체 틀 4">
             <a:extLst>
               <a:ext uri="{FF2B5EF4-FFF2-40B4-BE49-F238E27FC236}">
-                <a16:creationId xmlns:a16="http://schemas.microsoft.com/office/drawing/2014/main" xmlns="" id="{CFA07908-5C04-4E00-8FAD-37D13FEBB045}"/>
+                <a16:creationId xmlns:a16="http://schemas.microsoft.com/office/drawing/2014/main" id="{CFA07908-5C04-4E00-8FAD-37D13FEBB045}"/>
               </a:ext>
             </a:extLst>
           </p:cNvPr>
@@ -291,7 +307,7 @@
           <p:cNvPr id="6" name="슬라이드 번호 개체 틀 5">
             <a:extLst>
               <a:ext uri="{FF2B5EF4-FFF2-40B4-BE49-F238E27FC236}">
-                <a16:creationId xmlns:a16="http://schemas.microsoft.com/office/drawing/2014/main" xmlns="" id="{5082B68B-C6CF-4D79-89EC-BF9E33097671}"/>
+                <a16:creationId xmlns:a16="http://schemas.microsoft.com/office/drawing/2014/main" id="{5082B68B-C6CF-4D79-89EC-BF9E33097671}"/>
               </a:ext>
             </a:extLst>
           </p:cNvPr>
@@ -350,7 +366,7 @@
           <p:cNvPr id="2" name="제목 1">
             <a:extLst>
               <a:ext uri="{FF2B5EF4-FFF2-40B4-BE49-F238E27FC236}">
-                <a16:creationId xmlns:a16="http://schemas.microsoft.com/office/drawing/2014/main" xmlns="" id="{C671CFA0-0649-4B63-8095-C3030B04111C}"/>
+                <a16:creationId xmlns:a16="http://schemas.microsoft.com/office/drawing/2014/main" id="{C671CFA0-0649-4B63-8095-C3030B04111C}"/>
               </a:ext>
             </a:extLst>
           </p:cNvPr>
@@ -378,7 +394,7 @@
           <p:cNvPr id="3" name="세로 텍스트 개체 틀 2">
             <a:extLst>
               <a:ext uri="{FF2B5EF4-FFF2-40B4-BE49-F238E27FC236}">
-                <a16:creationId xmlns:a16="http://schemas.microsoft.com/office/drawing/2014/main" xmlns="" id="{727853BA-120F-40DE-94DF-800B6A289218}"/>
+                <a16:creationId xmlns:a16="http://schemas.microsoft.com/office/drawing/2014/main" id="{727853BA-120F-40DE-94DF-800B6A289218}"/>
               </a:ext>
             </a:extLst>
           </p:cNvPr>
@@ -435,7 +451,7 @@
           <p:cNvPr id="4" name="날짜 개체 틀 3">
             <a:extLst>
               <a:ext uri="{FF2B5EF4-FFF2-40B4-BE49-F238E27FC236}">
-                <a16:creationId xmlns:a16="http://schemas.microsoft.com/office/drawing/2014/main" xmlns="" id="{18CF8022-C9ED-4EF4-A238-3B614F74659D}"/>
+                <a16:creationId xmlns:a16="http://schemas.microsoft.com/office/drawing/2014/main" id="{18CF8022-C9ED-4EF4-A238-3B614F74659D}"/>
               </a:ext>
             </a:extLst>
           </p:cNvPr>
@@ -464,7 +480,7 @@
           <p:cNvPr id="5" name="바닥글 개체 틀 4">
             <a:extLst>
               <a:ext uri="{FF2B5EF4-FFF2-40B4-BE49-F238E27FC236}">
-                <a16:creationId xmlns:a16="http://schemas.microsoft.com/office/drawing/2014/main" xmlns="" id="{B1FC5681-6EE6-4E64-A91A-2BC302336060}"/>
+                <a16:creationId xmlns:a16="http://schemas.microsoft.com/office/drawing/2014/main" id="{B1FC5681-6EE6-4E64-A91A-2BC302336060}"/>
               </a:ext>
             </a:extLst>
           </p:cNvPr>
@@ -489,7 +505,7 @@
           <p:cNvPr id="6" name="슬라이드 번호 개체 틀 5">
             <a:extLst>
               <a:ext uri="{FF2B5EF4-FFF2-40B4-BE49-F238E27FC236}">
-                <a16:creationId xmlns:a16="http://schemas.microsoft.com/office/drawing/2014/main" xmlns="" id="{D33625FD-2D0C-48F7-B809-A53D41E4629C}"/>
+                <a16:creationId xmlns:a16="http://schemas.microsoft.com/office/drawing/2014/main" id="{D33625FD-2D0C-48F7-B809-A53D41E4629C}"/>
               </a:ext>
             </a:extLst>
           </p:cNvPr>
@@ -548,7 +564,7 @@
           <p:cNvPr id="2" name="세로 제목 1">
             <a:extLst>
               <a:ext uri="{FF2B5EF4-FFF2-40B4-BE49-F238E27FC236}">
-                <a16:creationId xmlns:a16="http://schemas.microsoft.com/office/drawing/2014/main" xmlns="" id="{9688BA00-9634-421D-A0D6-BACB7626627D}"/>
+                <a16:creationId xmlns:a16="http://schemas.microsoft.com/office/drawing/2014/main" id="{9688BA00-9634-421D-A0D6-BACB7626627D}"/>
               </a:ext>
             </a:extLst>
           </p:cNvPr>
@@ -581,7 +597,7 @@
           <p:cNvPr id="3" name="세로 텍스트 개체 틀 2">
             <a:extLst>
               <a:ext uri="{FF2B5EF4-FFF2-40B4-BE49-F238E27FC236}">
-                <a16:creationId xmlns:a16="http://schemas.microsoft.com/office/drawing/2014/main" xmlns="" id="{1D47EBBC-134A-4AA4-A609-A2EA9B176A78}"/>
+                <a16:creationId xmlns:a16="http://schemas.microsoft.com/office/drawing/2014/main" id="{1D47EBBC-134A-4AA4-A609-A2EA9B176A78}"/>
               </a:ext>
             </a:extLst>
           </p:cNvPr>
@@ -643,7 +659,7 @@
           <p:cNvPr id="4" name="날짜 개체 틀 3">
             <a:extLst>
               <a:ext uri="{FF2B5EF4-FFF2-40B4-BE49-F238E27FC236}">
-                <a16:creationId xmlns:a16="http://schemas.microsoft.com/office/drawing/2014/main" xmlns="" id="{761115FC-7EC7-4F68-A16F-08B5E29EC42D}"/>
+                <a16:creationId xmlns:a16="http://schemas.microsoft.com/office/drawing/2014/main" id="{761115FC-7EC7-4F68-A16F-08B5E29EC42D}"/>
               </a:ext>
             </a:extLst>
           </p:cNvPr>
@@ -672,7 +688,7 @@
           <p:cNvPr id="5" name="바닥글 개체 틀 4">
             <a:extLst>
               <a:ext uri="{FF2B5EF4-FFF2-40B4-BE49-F238E27FC236}">
-                <a16:creationId xmlns:a16="http://schemas.microsoft.com/office/drawing/2014/main" xmlns="" id="{1F8B6984-9501-4179-A2FF-11707BE1D892}"/>
+                <a16:creationId xmlns:a16="http://schemas.microsoft.com/office/drawing/2014/main" id="{1F8B6984-9501-4179-A2FF-11707BE1D892}"/>
               </a:ext>
             </a:extLst>
           </p:cNvPr>
@@ -697,7 +713,7 @@
           <p:cNvPr id="6" name="슬라이드 번호 개체 틀 5">
             <a:extLst>
               <a:ext uri="{FF2B5EF4-FFF2-40B4-BE49-F238E27FC236}">
-                <a16:creationId xmlns:a16="http://schemas.microsoft.com/office/drawing/2014/main" xmlns="" id="{1EFB39EE-367C-4851-9D46-9ACEDF00CDFB}"/>
+                <a16:creationId xmlns:a16="http://schemas.microsoft.com/office/drawing/2014/main" id="{1EFB39EE-367C-4851-9D46-9ACEDF00CDFB}"/>
               </a:ext>
             </a:extLst>
           </p:cNvPr>
@@ -756,7 +772,7 @@
           <p:cNvPr id="2" name="제목 1">
             <a:extLst>
               <a:ext uri="{FF2B5EF4-FFF2-40B4-BE49-F238E27FC236}">
-                <a16:creationId xmlns:a16="http://schemas.microsoft.com/office/drawing/2014/main" xmlns="" id="{ECD4A443-8749-4BBD-B492-5F28E6D7D0BD}"/>
+                <a16:creationId xmlns:a16="http://schemas.microsoft.com/office/drawing/2014/main" id="{ECD4A443-8749-4BBD-B492-5F28E6D7D0BD}"/>
               </a:ext>
             </a:extLst>
           </p:cNvPr>
@@ -784,7 +800,7 @@
           <p:cNvPr id="3" name="내용 개체 틀 2">
             <a:extLst>
               <a:ext uri="{FF2B5EF4-FFF2-40B4-BE49-F238E27FC236}">
-                <a16:creationId xmlns:a16="http://schemas.microsoft.com/office/drawing/2014/main" xmlns="" id="{BC6CE70D-D9F9-4534-AFA1-2A0A240048B0}"/>
+                <a16:creationId xmlns:a16="http://schemas.microsoft.com/office/drawing/2014/main" id="{BC6CE70D-D9F9-4534-AFA1-2A0A240048B0}"/>
               </a:ext>
             </a:extLst>
           </p:cNvPr>
@@ -841,7 +857,7 @@
           <p:cNvPr id="4" name="날짜 개체 틀 3">
             <a:extLst>
               <a:ext uri="{FF2B5EF4-FFF2-40B4-BE49-F238E27FC236}">
-                <a16:creationId xmlns:a16="http://schemas.microsoft.com/office/drawing/2014/main" xmlns="" id="{726FFC8A-465B-41DD-ACC1-014FDE8B92CC}"/>
+                <a16:creationId xmlns:a16="http://schemas.microsoft.com/office/drawing/2014/main" id="{726FFC8A-465B-41DD-ACC1-014FDE8B92CC}"/>
               </a:ext>
             </a:extLst>
           </p:cNvPr>
@@ -870,7 +886,7 @@
           <p:cNvPr id="5" name="바닥글 개체 틀 4">
             <a:extLst>
               <a:ext uri="{FF2B5EF4-FFF2-40B4-BE49-F238E27FC236}">
-                <a16:creationId xmlns:a16="http://schemas.microsoft.com/office/drawing/2014/main" xmlns="" id="{2297F822-B965-4D77-B9B9-B49F33FBD0FA}"/>
+                <a16:creationId xmlns:a16="http://schemas.microsoft.com/office/drawing/2014/main" id="{2297F822-B965-4D77-B9B9-B49F33FBD0FA}"/>
               </a:ext>
             </a:extLst>
           </p:cNvPr>
@@ -895,7 +911,7 @@
           <p:cNvPr id="6" name="슬라이드 번호 개체 틀 5">
             <a:extLst>
               <a:ext uri="{FF2B5EF4-FFF2-40B4-BE49-F238E27FC236}">
-                <a16:creationId xmlns:a16="http://schemas.microsoft.com/office/drawing/2014/main" xmlns="" id="{475EA872-F642-405C-97A6-8F3852DAE12E}"/>
+                <a16:creationId xmlns:a16="http://schemas.microsoft.com/office/drawing/2014/main" id="{475EA872-F642-405C-97A6-8F3852DAE12E}"/>
               </a:ext>
             </a:extLst>
           </p:cNvPr>
@@ -954,7 +970,7 @@
           <p:cNvPr id="2" name="제목 1">
             <a:extLst>
               <a:ext uri="{FF2B5EF4-FFF2-40B4-BE49-F238E27FC236}">
-                <a16:creationId xmlns:a16="http://schemas.microsoft.com/office/drawing/2014/main" xmlns="" id="{EFA03812-B77B-45D3-A461-83ED45D4B07F}"/>
+                <a16:creationId xmlns:a16="http://schemas.microsoft.com/office/drawing/2014/main" id="{EFA03812-B77B-45D3-A461-83ED45D4B07F}"/>
               </a:ext>
             </a:extLst>
           </p:cNvPr>
@@ -991,7 +1007,7 @@
           <p:cNvPr id="3" name="텍스트 개체 틀 2">
             <a:extLst>
               <a:ext uri="{FF2B5EF4-FFF2-40B4-BE49-F238E27FC236}">
-                <a16:creationId xmlns:a16="http://schemas.microsoft.com/office/drawing/2014/main" xmlns="" id="{0255C030-3D9B-4201-B45D-AEF5BC606248}"/>
+                <a16:creationId xmlns:a16="http://schemas.microsoft.com/office/drawing/2014/main" id="{0255C030-3D9B-4201-B45D-AEF5BC606248}"/>
               </a:ext>
             </a:extLst>
           </p:cNvPr>
@@ -1116,7 +1132,7 @@
           <p:cNvPr id="4" name="날짜 개체 틀 3">
             <a:extLst>
               <a:ext uri="{FF2B5EF4-FFF2-40B4-BE49-F238E27FC236}">
-                <a16:creationId xmlns:a16="http://schemas.microsoft.com/office/drawing/2014/main" xmlns="" id="{B189197E-B5F5-437A-BAF9-9779E0B0AAEA}"/>
+                <a16:creationId xmlns:a16="http://schemas.microsoft.com/office/drawing/2014/main" id="{B189197E-B5F5-437A-BAF9-9779E0B0AAEA}"/>
               </a:ext>
             </a:extLst>
           </p:cNvPr>
@@ -1145,7 +1161,7 @@
           <p:cNvPr id="5" name="바닥글 개체 틀 4">
             <a:extLst>
               <a:ext uri="{FF2B5EF4-FFF2-40B4-BE49-F238E27FC236}">
-                <a16:creationId xmlns:a16="http://schemas.microsoft.com/office/drawing/2014/main" xmlns="" id="{C33DF5BF-781B-4E7B-BAA0-59D88BE03056}"/>
+                <a16:creationId xmlns:a16="http://schemas.microsoft.com/office/drawing/2014/main" id="{C33DF5BF-781B-4E7B-BAA0-59D88BE03056}"/>
               </a:ext>
             </a:extLst>
           </p:cNvPr>
@@ -1170,7 +1186,7 @@
           <p:cNvPr id="6" name="슬라이드 번호 개체 틀 5">
             <a:extLst>
               <a:ext uri="{FF2B5EF4-FFF2-40B4-BE49-F238E27FC236}">
-                <a16:creationId xmlns:a16="http://schemas.microsoft.com/office/drawing/2014/main" xmlns="" id="{CA580DCE-7755-4F22-9370-1B8FC26BF2B1}"/>
+                <a16:creationId xmlns:a16="http://schemas.microsoft.com/office/drawing/2014/main" id="{CA580DCE-7755-4F22-9370-1B8FC26BF2B1}"/>
               </a:ext>
             </a:extLst>
           </p:cNvPr>
@@ -1229,7 +1245,7 @@
           <p:cNvPr id="2" name="제목 1">
             <a:extLst>
               <a:ext uri="{FF2B5EF4-FFF2-40B4-BE49-F238E27FC236}">
-                <a16:creationId xmlns:a16="http://schemas.microsoft.com/office/drawing/2014/main" xmlns="" id="{DF757344-98BE-47ED-9ECF-C988ABA86568}"/>
+                <a16:creationId xmlns:a16="http://schemas.microsoft.com/office/drawing/2014/main" id="{DF757344-98BE-47ED-9ECF-C988ABA86568}"/>
               </a:ext>
             </a:extLst>
           </p:cNvPr>
@@ -1257,7 +1273,7 @@
           <p:cNvPr id="3" name="내용 개체 틀 2">
             <a:extLst>
               <a:ext uri="{FF2B5EF4-FFF2-40B4-BE49-F238E27FC236}">
-                <a16:creationId xmlns:a16="http://schemas.microsoft.com/office/drawing/2014/main" xmlns="" id="{B6B582D9-F1BA-407C-94C5-F3B6B97017A4}"/>
+                <a16:creationId xmlns:a16="http://schemas.microsoft.com/office/drawing/2014/main" id="{B6B582D9-F1BA-407C-94C5-F3B6B97017A4}"/>
               </a:ext>
             </a:extLst>
           </p:cNvPr>
@@ -1319,7 +1335,7 @@
           <p:cNvPr id="4" name="내용 개체 틀 3">
             <a:extLst>
               <a:ext uri="{FF2B5EF4-FFF2-40B4-BE49-F238E27FC236}">
-                <a16:creationId xmlns:a16="http://schemas.microsoft.com/office/drawing/2014/main" xmlns="" id="{43505CD2-CC54-420C-8818-027F081CAAE4}"/>
+                <a16:creationId xmlns:a16="http://schemas.microsoft.com/office/drawing/2014/main" id="{43505CD2-CC54-420C-8818-027F081CAAE4}"/>
               </a:ext>
             </a:extLst>
           </p:cNvPr>
@@ -1381,7 +1397,7 @@
           <p:cNvPr id="5" name="날짜 개체 틀 4">
             <a:extLst>
               <a:ext uri="{FF2B5EF4-FFF2-40B4-BE49-F238E27FC236}">
-                <a16:creationId xmlns:a16="http://schemas.microsoft.com/office/drawing/2014/main" xmlns="" id="{285F5A39-98CF-4D5F-882B-5D0170AEFCF9}"/>
+                <a16:creationId xmlns:a16="http://schemas.microsoft.com/office/drawing/2014/main" id="{285F5A39-98CF-4D5F-882B-5D0170AEFCF9}"/>
               </a:ext>
             </a:extLst>
           </p:cNvPr>
@@ -1410,7 +1426,7 @@
           <p:cNvPr id="6" name="바닥글 개체 틀 5">
             <a:extLst>
               <a:ext uri="{FF2B5EF4-FFF2-40B4-BE49-F238E27FC236}">
-                <a16:creationId xmlns:a16="http://schemas.microsoft.com/office/drawing/2014/main" xmlns="" id="{37DFAF4D-E89E-47E0-A0F6-0AAA4D83D469}"/>
+                <a16:creationId xmlns:a16="http://schemas.microsoft.com/office/drawing/2014/main" id="{37DFAF4D-E89E-47E0-A0F6-0AAA4D83D469}"/>
               </a:ext>
             </a:extLst>
           </p:cNvPr>
@@ -1435,7 +1451,7 @@
           <p:cNvPr id="7" name="슬라이드 번호 개체 틀 6">
             <a:extLst>
               <a:ext uri="{FF2B5EF4-FFF2-40B4-BE49-F238E27FC236}">
-                <a16:creationId xmlns:a16="http://schemas.microsoft.com/office/drawing/2014/main" xmlns="" id="{D21EEB7E-149D-4D98-B56D-0F077498A16E}"/>
+                <a16:creationId xmlns:a16="http://schemas.microsoft.com/office/drawing/2014/main" id="{D21EEB7E-149D-4D98-B56D-0F077498A16E}"/>
               </a:ext>
             </a:extLst>
           </p:cNvPr>
@@ -1494,7 +1510,7 @@
           <p:cNvPr id="2" name="제목 1">
             <a:extLst>
               <a:ext uri="{FF2B5EF4-FFF2-40B4-BE49-F238E27FC236}">
-                <a16:creationId xmlns:a16="http://schemas.microsoft.com/office/drawing/2014/main" xmlns="" id="{96648F8F-3694-44DE-B861-13D3A5287450}"/>
+                <a16:creationId xmlns:a16="http://schemas.microsoft.com/office/drawing/2014/main" id="{96648F8F-3694-44DE-B861-13D3A5287450}"/>
               </a:ext>
             </a:extLst>
           </p:cNvPr>
@@ -1527,7 +1543,7 @@
           <p:cNvPr id="3" name="텍스트 개체 틀 2">
             <a:extLst>
               <a:ext uri="{FF2B5EF4-FFF2-40B4-BE49-F238E27FC236}">
-                <a16:creationId xmlns:a16="http://schemas.microsoft.com/office/drawing/2014/main" xmlns="" id="{E1A473AA-E8E5-4063-80DA-652645969E0B}"/>
+                <a16:creationId xmlns:a16="http://schemas.microsoft.com/office/drawing/2014/main" id="{E1A473AA-E8E5-4063-80DA-652645969E0B}"/>
               </a:ext>
             </a:extLst>
           </p:cNvPr>
@@ -1598,7 +1614,7 @@
           <p:cNvPr id="4" name="내용 개체 틀 3">
             <a:extLst>
               <a:ext uri="{FF2B5EF4-FFF2-40B4-BE49-F238E27FC236}">
-                <a16:creationId xmlns:a16="http://schemas.microsoft.com/office/drawing/2014/main" xmlns="" id="{753BE0AE-C500-4820-8910-717D4C871AC0}"/>
+                <a16:creationId xmlns:a16="http://schemas.microsoft.com/office/drawing/2014/main" id="{753BE0AE-C500-4820-8910-717D4C871AC0}"/>
               </a:ext>
             </a:extLst>
           </p:cNvPr>
@@ -1660,7 +1676,7 @@
           <p:cNvPr id="5" name="텍스트 개체 틀 4">
             <a:extLst>
               <a:ext uri="{FF2B5EF4-FFF2-40B4-BE49-F238E27FC236}">
-                <a16:creationId xmlns:a16="http://schemas.microsoft.com/office/drawing/2014/main" xmlns="" id="{61295558-E7A0-4CC2-94BC-7B0BA7BD08D6}"/>
+                <a16:creationId xmlns:a16="http://schemas.microsoft.com/office/drawing/2014/main" id="{61295558-E7A0-4CC2-94BC-7B0BA7BD08D6}"/>
               </a:ext>
             </a:extLst>
           </p:cNvPr>
@@ -1731,7 +1747,7 @@
           <p:cNvPr id="6" name="내용 개체 틀 5">
             <a:extLst>
               <a:ext uri="{FF2B5EF4-FFF2-40B4-BE49-F238E27FC236}">
-                <a16:creationId xmlns:a16="http://schemas.microsoft.com/office/drawing/2014/main" xmlns="" id="{08974315-0AA3-4003-963B-355F2F04DCA6}"/>
+                <a16:creationId xmlns:a16="http://schemas.microsoft.com/office/drawing/2014/main" id="{08974315-0AA3-4003-963B-355F2F04DCA6}"/>
               </a:ext>
             </a:extLst>
           </p:cNvPr>
@@ -1793,7 +1809,7 @@
           <p:cNvPr id="7" name="날짜 개체 틀 6">
             <a:extLst>
               <a:ext uri="{FF2B5EF4-FFF2-40B4-BE49-F238E27FC236}">
-                <a16:creationId xmlns:a16="http://schemas.microsoft.com/office/drawing/2014/main" xmlns="" id="{55029DA8-0854-43EA-A10D-9AC5A8BC11D4}"/>
+                <a16:creationId xmlns:a16="http://schemas.microsoft.com/office/drawing/2014/main" id="{55029DA8-0854-43EA-A10D-9AC5A8BC11D4}"/>
               </a:ext>
             </a:extLst>
           </p:cNvPr>
@@ -1822,7 +1838,7 @@
           <p:cNvPr id="8" name="바닥글 개체 틀 7">
             <a:extLst>
               <a:ext uri="{FF2B5EF4-FFF2-40B4-BE49-F238E27FC236}">
-                <a16:creationId xmlns:a16="http://schemas.microsoft.com/office/drawing/2014/main" xmlns="" id="{1682983C-1C86-4BA4-BE30-74021C9C8005}"/>
+                <a16:creationId xmlns:a16="http://schemas.microsoft.com/office/drawing/2014/main" id="{1682983C-1C86-4BA4-BE30-74021C9C8005}"/>
               </a:ext>
             </a:extLst>
           </p:cNvPr>
@@ -1847,7 +1863,7 @@
           <p:cNvPr id="9" name="슬라이드 번호 개체 틀 8">
             <a:extLst>
               <a:ext uri="{FF2B5EF4-FFF2-40B4-BE49-F238E27FC236}">
-                <a16:creationId xmlns:a16="http://schemas.microsoft.com/office/drawing/2014/main" xmlns="" id="{B4498725-E39F-48C0-9C45-54F8FC091C64}"/>
+                <a16:creationId xmlns:a16="http://schemas.microsoft.com/office/drawing/2014/main" id="{B4498725-E39F-48C0-9C45-54F8FC091C64}"/>
               </a:ext>
             </a:extLst>
           </p:cNvPr>
@@ -1906,7 +1922,7 @@
           <p:cNvPr id="2" name="제목 1">
             <a:extLst>
               <a:ext uri="{FF2B5EF4-FFF2-40B4-BE49-F238E27FC236}">
-                <a16:creationId xmlns:a16="http://schemas.microsoft.com/office/drawing/2014/main" xmlns="" id="{2955AA9D-6786-4450-9BDD-2BA4EE48D863}"/>
+                <a16:creationId xmlns:a16="http://schemas.microsoft.com/office/drawing/2014/main" id="{2955AA9D-6786-4450-9BDD-2BA4EE48D863}"/>
               </a:ext>
             </a:extLst>
           </p:cNvPr>
@@ -1934,7 +1950,7 @@
           <p:cNvPr id="3" name="날짜 개체 틀 2">
             <a:extLst>
               <a:ext uri="{FF2B5EF4-FFF2-40B4-BE49-F238E27FC236}">
-                <a16:creationId xmlns:a16="http://schemas.microsoft.com/office/drawing/2014/main" xmlns="" id="{E146404A-1984-4C78-A3DE-21D46365CB7D}"/>
+                <a16:creationId xmlns:a16="http://schemas.microsoft.com/office/drawing/2014/main" id="{E146404A-1984-4C78-A3DE-21D46365CB7D}"/>
               </a:ext>
             </a:extLst>
           </p:cNvPr>
@@ -1963,7 +1979,7 @@
           <p:cNvPr id="4" name="바닥글 개체 틀 3">
             <a:extLst>
               <a:ext uri="{FF2B5EF4-FFF2-40B4-BE49-F238E27FC236}">
-                <a16:creationId xmlns:a16="http://schemas.microsoft.com/office/drawing/2014/main" xmlns="" id="{8F893B4E-C980-45B5-BE39-7594C6DD6ACA}"/>
+                <a16:creationId xmlns:a16="http://schemas.microsoft.com/office/drawing/2014/main" id="{8F893B4E-C980-45B5-BE39-7594C6DD6ACA}"/>
               </a:ext>
             </a:extLst>
           </p:cNvPr>
@@ -1988,7 +2004,7 @@
           <p:cNvPr id="5" name="슬라이드 번호 개체 틀 4">
             <a:extLst>
               <a:ext uri="{FF2B5EF4-FFF2-40B4-BE49-F238E27FC236}">
-                <a16:creationId xmlns:a16="http://schemas.microsoft.com/office/drawing/2014/main" xmlns="" id="{3BD722BB-12C7-45B1-B252-383CC3B99470}"/>
+                <a16:creationId xmlns:a16="http://schemas.microsoft.com/office/drawing/2014/main" id="{3BD722BB-12C7-45B1-B252-383CC3B99470}"/>
               </a:ext>
             </a:extLst>
           </p:cNvPr>
@@ -2047,7 +2063,7 @@
           <p:cNvPr id="2" name="날짜 개체 틀 1">
             <a:extLst>
               <a:ext uri="{FF2B5EF4-FFF2-40B4-BE49-F238E27FC236}">
-                <a16:creationId xmlns:a16="http://schemas.microsoft.com/office/drawing/2014/main" xmlns="" id="{E61E0A7B-EA91-432B-9461-3053C8942C9E}"/>
+                <a16:creationId xmlns:a16="http://schemas.microsoft.com/office/drawing/2014/main" id="{E61E0A7B-EA91-432B-9461-3053C8942C9E}"/>
               </a:ext>
             </a:extLst>
           </p:cNvPr>
@@ -2076,7 +2092,7 @@
           <p:cNvPr id="3" name="바닥글 개체 틀 2">
             <a:extLst>
               <a:ext uri="{FF2B5EF4-FFF2-40B4-BE49-F238E27FC236}">
-                <a16:creationId xmlns:a16="http://schemas.microsoft.com/office/drawing/2014/main" xmlns="" id="{BE16DEDA-1B9D-4DAE-A70C-EC2482A4D163}"/>
+                <a16:creationId xmlns:a16="http://schemas.microsoft.com/office/drawing/2014/main" id="{BE16DEDA-1B9D-4DAE-A70C-EC2482A4D163}"/>
               </a:ext>
             </a:extLst>
           </p:cNvPr>
@@ -2101,7 +2117,7 @@
           <p:cNvPr id="4" name="슬라이드 번호 개체 틀 3">
             <a:extLst>
               <a:ext uri="{FF2B5EF4-FFF2-40B4-BE49-F238E27FC236}">
-                <a16:creationId xmlns:a16="http://schemas.microsoft.com/office/drawing/2014/main" xmlns="" id="{82DFB462-9E50-4064-89B7-57CFB22BBD0F}"/>
+                <a16:creationId xmlns:a16="http://schemas.microsoft.com/office/drawing/2014/main" id="{82DFB462-9E50-4064-89B7-57CFB22BBD0F}"/>
               </a:ext>
             </a:extLst>
           </p:cNvPr>
@@ -2160,7 +2176,7 @@
           <p:cNvPr id="2" name="제목 1">
             <a:extLst>
               <a:ext uri="{FF2B5EF4-FFF2-40B4-BE49-F238E27FC236}">
-                <a16:creationId xmlns:a16="http://schemas.microsoft.com/office/drawing/2014/main" xmlns="" id="{6BE43F40-DE21-4959-A358-8BA8674B23BA}"/>
+                <a16:creationId xmlns:a16="http://schemas.microsoft.com/office/drawing/2014/main" id="{6BE43F40-DE21-4959-A358-8BA8674B23BA}"/>
               </a:ext>
             </a:extLst>
           </p:cNvPr>
@@ -2197,7 +2213,7 @@
           <p:cNvPr id="3" name="내용 개체 틀 2">
             <a:extLst>
               <a:ext uri="{FF2B5EF4-FFF2-40B4-BE49-F238E27FC236}">
-                <a16:creationId xmlns:a16="http://schemas.microsoft.com/office/drawing/2014/main" xmlns="" id="{26D00634-22EA-455E-B0A0-97DABB12CD44}"/>
+                <a16:creationId xmlns:a16="http://schemas.microsoft.com/office/drawing/2014/main" id="{26D00634-22EA-455E-B0A0-97DABB12CD44}"/>
               </a:ext>
             </a:extLst>
           </p:cNvPr>
@@ -2287,7 +2303,7 @@
           <p:cNvPr id="4" name="텍스트 개체 틀 3">
             <a:extLst>
               <a:ext uri="{FF2B5EF4-FFF2-40B4-BE49-F238E27FC236}">
-                <a16:creationId xmlns:a16="http://schemas.microsoft.com/office/drawing/2014/main" xmlns="" id="{8D5C2DF1-35A9-4DF1-A6FD-BA9C97B0749C}"/>
+                <a16:creationId xmlns:a16="http://schemas.microsoft.com/office/drawing/2014/main" id="{8D5C2DF1-35A9-4DF1-A6FD-BA9C97B0749C}"/>
               </a:ext>
             </a:extLst>
           </p:cNvPr>
@@ -2358,7 +2374,7 @@
           <p:cNvPr id="5" name="날짜 개체 틀 4">
             <a:extLst>
               <a:ext uri="{FF2B5EF4-FFF2-40B4-BE49-F238E27FC236}">
-                <a16:creationId xmlns:a16="http://schemas.microsoft.com/office/drawing/2014/main" xmlns="" id="{4E4957CF-8698-4102-9554-5E2CACD059EA}"/>
+                <a16:creationId xmlns:a16="http://schemas.microsoft.com/office/drawing/2014/main" id="{4E4957CF-8698-4102-9554-5E2CACD059EA}"/>
               </a:ext>
             </a:extLst>
           </p:cNvPr>
@@ -2387,7 +2403,7 @@
           <p:cNvPr id="6" name="바닥글 개체 틀 5">
             <a:extLst>
               <a:ext uri="{FF2B5EF4-FFF2-40B4-BE49-F238E27FC236}">
-                <a16:creationId xmlns:a16="http://schemas.microsoft.com/office/drawing/2014/main" xmlns="" id="{491EAA55-0603-4F33-85DB-1BBC35465821}"/>
+                <a16:creationId xmlns:a16="http://schemas.microsoft.com/office/drawing/2014/main" id="{491EAA55-0603-4F33-85DB-1BBC35465821}"/>
               </a:ext>
             </a:extLst>
           </p:cNvPr>
@@ -2412,7 +2428,7 @@
           <p:cNvPr id="7" name="슬라이드 번호 개체 틀 6">
             <a:extLst>
               <a:ext uri="{FF2B5EF4-FFF2-40B4-BE49-F238E27FC236}">
-                <a16:creationId xmlns:a16="http://schemas.microsoft.com/office/drawing/2014/main" xmlns="" id="{0029C551-183E-4D0D-9254-0D1A36A55CF9}"/>
+                <a16:creationId xmlns:a16="http://schemas.microsoft.com/office/drawing/2014/main" id="{0029C551-183E-4D0D-9254-0D1A36A55CF9}"/>
               </a:ext>
             </a:extLst>
           </p:cNvPr>
@@ -2471,7 +2487,7 @@
           <p:cNvPr id="2" name="제목 1">
             <a:extLst>
               <a:ext uri="{FF2B5EF4-FFF2-40B4-BE49-F238E27FC236}">
-                <a16:creationId xmlns:a16="http://schemas.microsoft.com/office/drawing/2014/main" xmlns="" id="{0B7E93DA-3856-4F86-9766-3EB54D2B7C24}"/>
+                <a16:creationId xmlns:a16="http://schemas.microsoft.com/office/drawing/2014/main" id="{0B7E93DA-3856-4F86-9766-3EB54D2B7C24}"/>
               </a:ext>
             </a:extLst>
           </p:cNvPr>
@@ -2508,7 +2524,7 @@
           <p:cNvPr id="3" name="그림 개체 틀 2">
             <a:extLst>
               <a:ext uri="{FF2B5EF4-FFF2-40B4-BE49-F238E27FC236}">
-                <a16:creationId xmlns:a16="http://schemas.microsoft.com/office/drawing/2014/main" xmlns="" id="{2215CE40-D8AC-4ED0-9786-9F04041B741A}"/>
+                <a16:creationId xmlns:a16="http://schemas.microsoft.com/office/drawing/2014/main" id="{2215CE40-D8AC-4ED0-9786-9F04041B741A}"/>
               </a:ext>
             </a:extLst>
           </p:cNvPr>
@@ -2575,7 +2591,7 @@
           <p:cNvPr id="4" name="텍스트 개체 틀 3">
             <a:extLst>
               <a:ext uri="{FF2B5EF4-FFF2-40B4-BE49-F238E27FC236}">
-                <a16:creationId xmlns:a16="http://schemas.microsoft.com/office/drawing/2014/main" xmlns="" id="{3C89CECC-4172-4B4D-A3E0-EEC3D6AF65FB}"/>
+                <a16:creationId xmlns:a16="http://schemas.microsoft.com/office/drawing/2014/main" id="{3C89CECC-4172-4B4D-A3E0-EEC3D6AF65FB}"/>
               </a:ext>
             </a:extLst>
           </p:cNvPr>
@@ -2646,7 +2662,7 @@
           <p:cNvPr id="5" name="날짜 개체 틀 4">
             <a:extLst>
               <a:ext uri="{FF2B5EF4-FFF2-40B4-BE49-F238E27FC236}">
-                <a16:creationId xmlns:a16="http://schemas.microsoft.com/office/drawing/2014/main" xmlns="" id="{C845CF85-B887-41D5-AAB8-D8BD4456601B}"/>
+                <a16:creationId xmlns:a16="http://schemas.microsoft.com/office/drawing/2014/main" id="{C845CF85-B887-41D5-AAB8-D8BD4456601B}"/>
               </a:ext>
             </a:extLst>
           </p:cNvPr>
@@ -2675,7 +2691,7 @@
           <p:cNvPr id="6" name="바닥글 개체 틀 5">
             <a:extLst>
               <a:ext uri="{FF2B5EF4-FFF2-40B4-BE49-F238E27FC236}">
-                <a16:creationId xmlns:a16="http://schemas.microsoft.com/office/drawing/2014/main" xmlns="" id="{1C5CA868-9687-46ED-AB94-D8FC7B58DB4B}"/>
+                <a16:creationId xmlns:a16="http://schemas.microsoft.com/office/drawing/2014/main" id="{1C5CA868-9687-46ED-AB94-D8FC7B58DB4B}"/>
               </a:ext>
             </a:extLst>
           </p:cNvPr>
@@ -2700,7 +2716,7 @@
           <p:cNvPr id="7" name="슬라이드 번호 개체 틀 6">
             <a:extLst>
               <a:ext uri="{FF2B5EF4-FFF2-40B4-BE49-F238E27FC236}">
-                <a16:creationId xmlns:a16="http://schemas.microsoft.com/office/drawing/2014/main" xmlns="" id="{9E600FCF-2DA4-45D1-B3F6-76E223840884}"/>
+                <a16:creationId xmlns:a16="http://schemas.microsoft.com/office/drawing/2014/main" id="{9E600FCF-2DA4-45D1-B3F6-76E223840884}"/>
               </a:ext>
             </a:extLst>
           </p:cNvPr>
@@ -2764,7 +2780,7 @@
           <p:cNvPr id="2" name="제목 개체 틀 1">
             <a:extLst>
               <a:ext uri="{FF2B5EF4-FFF2-40B4-BE49-F238E27FC236}">
-                <a16:creationId xmlns:a16="http://schemas.microsoft.com/office/drawing/2014/main" xmlns="" id="{A8C52A6F-F497-44A1-BB14-3E6CC014E8A6}"/>
+                <a16:creationId xmlns:a16="http://schemas.microsoft.com/office/drawing/2014/main" id="{A8C52A6F-F497-44A1-BB14-3E6CC014E8A6}"/>
               </a:ext>
             </a:extLst>
           </p:cNvPr>
@@ -2802,7 +2818,7 @@
           <p:cNvPr id="3" name="텍스트 개체 틀 2">
             <a:extLst>
               <a:ext uri="{FF2B5EF4-FFF2-40B4-BE49-F238E27FC236}">
-                <a16:creationId xmlns:a16="http://schemas.microsoft.com/office/drawing/2014/main" xmlns="" id="{190A1CFD-3476-480F-B326-5BE6504B4367}"/>
+                <a16:creationId xmlns:a16="http://schemas.microsoft.com/office/drawing/2014/main" id="{190A1CFD-3476-480F-B326-5BE6504B4367}"/>
               </a:ext>
             </a:extLst>
           </p:cNvPr>
@@ -2869,7 +2885,7 @@
           <p:cNvPr id="4" name="날짜 개체 틀 3">
             <a:extLst>
               <a:ext uri="{FF2B5EF4-FFF2-40B4-BE49-F238E27FC236}">
-                <a16:creationId xmlns:a16="http://schemas.microsoft.com/office/drawing/2014/main" xmlns="" id="{1CF80ACE-931E-4D4D-B423-87DA0B2985D6}"/>
+                <a16:creationId xmlns:a16="http://schemas.microsoft.com/office/drawing/2014/main" id="{1CF80ACE-931E-4D4D-B423-87DA0B2985D6}"/>
               </a:ext>
             </a:extLst>
           </p:cNvPr>
@@ -2916,7 +2932,7 @@
           <p:cNvPr id="5" name="바닥글 개체 틀 4">
             <a:extLst>
               <a:ext uri="{FF2B5EF4-FFF2-40B4-BE49-F238E27FC236}">
-                <a16:creationId xmlns:a16="http://schemas.microsoft.com/office/drawing/2014/main" xmlns="" id="{E5510432-09DD-48D1-9EB0-C69B1BDEBAB9}"/>
+                <a16:creationId xmlns:a16="http://schemas.microsoft.com/office/drawing/2014/main" id="{E5510432-09DD-48D1-9EB0-C69B1BDEBAB9}"/>
               </a:ext>
             </a:extLst>
           </p:cNvPr>
@@ -2959,7 +2975,7 @@
           <p:cNvPr id="6" name="슬라이드 번호 개체 틀 5">
             <a:extLst>
               <a:ext uri="{FF2B5EF4-FFF2-40B4-BE49-F238E27FC236}">
-                <a16:creationId xmlns:a16="http://schemas.microsoft.com/office/drawing/2014/main" xmlns="" id="{10FF43BD-85A3-4AE5-84F6-A3A72925CDB5}"/>
+                <a16:creationId xmlns:a16="http://schemas.microsoft.com/office/drawing/2014/main" id="{10FF43BD-85A3-4AE5-84F6-A3A72925CDB5}"/>
               </a:ext>
             </a:extLst>
           </p:cNvPr>
@@ -3327,7 +3343,7 @@
           <p:cNvPr id="28" name="그룹 27">
             <a:extLst>
               <a:ext uri="{FF2B5EF4-FFF2-40B4-BE49-F238E27FC236}">
-                <a16:creationId xmlns:a16="http://schemas.microsoft.com/office/drawing/2014/main" xmlns="" id="{35BB685C-447C-4A35-B90C-BBF1085510D5}"/>
+                <a16:creationId xmlns:a16="http://schemas.microsoft.com/office/drawing/2014/main" id="{35BB685C-447C-4A35-B90C-BBF1085510D5}"/>
               </a:ext>
             </a:extLst>
           </p:cNvPr>
@@ -3347,7 +3363,7 @@
             <p:cNvPr id="4" name="그림 3">
               <a:extLst>
                 <a:ext uri="{FF2B5EF4-FFF2-40B4-BE49-F238E27FC236}">
-                  <a16:creationId xmlns:a16="http://schemas.microsoft.com/office/drawing/2014/main" xmlns="" id="{7692B2D0-E87F-4CEA-8559-C34C4A7B07C4}"/>
+                  <a16:creationId xmlns:a16="http://schemas.microsoft.com/office/drawing/2014/main" id="{7692B2D0-E87F-4CEA-8559-C34C4A7B07C4}"/>
                 </a:ext>
               </a:extLst>
             </p:cNvPr>
@@ -3377,7 +3393,7 @@
             <p:cNvPr id="27" name="그룹 26">
               <a:extLst>
                 <a:ext uri="{FF2B5EF4-FFF2-40B4-BE49-F238E27FC236}">
-                  <a16:creationId xmlns:a16="http://schemas.microsoft.com/office/drawing/2014/main" xmlns="" id="{C2765D57-1FA6-4E35-A821-E79D4AF47DE8}"/>
+                  <a16:creationId xmlns:a16="http://schemas.microsoft.com/office/drawing/2014/main" id="{C2765D57-1FA6-4E35-A821-E79D4AF47DE8}"/>
                 </a:ext>
               </a:extLst>
             </p:cNvPr>
@@ -3397,7 +3413,7 @@
               <p:cNvPr id="6" name="직선 화살표 연결선 5">
                 <a:extLst>
                   <a:ext uri="{FF2B5EF4-FFF2-40B4-BE49-F238E27FC236}">
-                    <a16:creationId xmlns:a16="http://schemas.microsoft.com/office/drawing/2014/main" xmlns="" id="{D7DB7754-F1D3-49C6-A62C-3827DCBA8B00}"/>
+                    <a16:creationId xmlns:a16="http://schemas.microsoft.com/office/drawing/2014/main" id="{D7DB7754-F1D3-49C6-A62C-3827DCBA8B00}"/>
                   </a:ext>
                 </a:extLst>
               </p:cNvPr>
@@ -3441,7 +3457,7 @@
               <p:cNvPr id="9" name="직선 화살표 연결선 8">
                 <a:extLst>
                   <a:ext uri="{FF2B5EF4-FFF2-40B4-BE49-F238E27FC236}">
-                    <a16:creationId xmlns:a16="http://schemas.microsoft.com/office/drawing/2014/main" xmlns="" id="{09C90FEC-5A86-49A5-8A3B-FFF54265A8E3}"/>
+                    <a16:creationId xmlns:a16="http://schemas.microsoft.com/office/drawing/2014/main" id="{09C90FEC-5A86-49A5-8A3B-FFF54265A8E3}"/>
                   </a:ext>
                 </a:extLst>
               </p:cNvPr>
@@ -3485,7 +3501,7 @@
               <p:cNvPr id="12" name="직선 화살표 연결선 11">
                 <a:extLst>
                   <a:ext uri="{FF2B5EF4-FFF2-40B4-BE49-F238E27FC236}">
-                    <a16:creationId xmlns:a16="http://schemas.microsoft.com/office/drawing/2014/main" xmlns="" id="{5E42743C-E681-44C1-8F94-C9F08EE94C22}"/>
+                    <a16:creationId xmlns:a16="http://schemas.microsoft.com/office/drawing/2014/main" id="{5E42743C-E681-44C1-8F94-C9F08EE94C22}"/>
                   </a:ext>
                 </a:extLst>
               </p:cNvPr>
@@ -3529,7 +3545,7 @@
               <p:cNvPr id="15" name="직선 화살표 연결선 14">
                 <a:extLst>
                   <a:ext uri="{FF2B5EF4-FFF2-40B4-BE49-F238E27FC236}">
-                    <a16:creationId xmlns:a16="http://schemas.microsoft.com/office/drawing/2014/main" xmlns="" id="{BC6C7C61-B860-4A91-8571-D82AD07D2985}"/>
+                    <a16:creationId xmlns:a16="http://schemas.microsoft.com/office/drawing/2014/main" id="{BC6C7C61-B860-4A91-8571-D82AD07D2985}"/>
                   </a:ext>
                 </a:extLst>
               </p:cNvPr>
@@ -3573,7 +3589,7 @@
               <p:cNvPr id="20" name="그림 19">
                 <a:extLst>
                   <a:ext uri="{FF2B5EF4-FFF2-40B4-BE49-F238E27FC236}">
-                    <a16:creationId xmlns:a16="http://schemas.microsoft.com/office/drawing/2014/main" xmlns="" id="{50932BD1-E3D4-499D-95CA-4A42A5236EE7}"/>
+                    <a16:creationId xmlns:a16="http://schemas.microsoft.com/office/drawing/2014/main" id="{50932BD1-E3D4-499D-95CA-4A42A5236EE7}"/>
                   </a:ext>
                 </a:extLst>
               </p:cNvPr>
@@ -3602,7 +3618,7 @@
               <p:cNvPr id="21" name="TextBox 20">
                 <a:extLst>
                   <a:ext uri="{FF2B5EF4-FFF2-40B4-BE49-F238E27FC236}">
-                    <a16:creationId xmlns:a16="http://schemas.microsoft.com/office/drawing/2014/main" xmlns="" id="{304036DD-579B-4240-B70C-BEE2DE720921}"/>
+                    <a16:creationId xmlns:a16="http://schemas.microsoft.com/office/drawing/2014/main" id="{304036DD-579B-4240-B70C-BEE2DE720921}"/>
                   </a:ext>
                 </a:extLst>
               </p:cNvPr>
@@ -3637,7 +3653,7 @@
               <p:cNvPr id="22" name="TextBox 21">
                 <a:extLst>
                   <a:ext uri="{FF2B5EF4-FFF2-40B4-BE49-F238E27FC236}">
-                    <a16:creationId xmlns:a16="http://schemas.microsoft.com/office/drawing/2014/main" xmlns="" id="{0A89143E-2963-422F-84EF-87F703DA8F73}"/>
+                    <a16:creationId xmlns:a16="http://schemas.microsoft.com/office/drawing/2014/main" id="{0A89143E-2963-422F-84EF-87F703DA8F73}"/>
                   </a:ext>
                 </a:extLst>
               </p:cNvPr>
@@ -3673,7 +3689,7 @@
               <p:cNvPr id="23" name="직선 화살표 연결선 22">
                 <a:extLst>
                   <a:ext uri="{FF2B5EF4-FFF2-40B4-BE49-F238E27FC236}">
-                    <a16:creationId xmlns:a16="http://schemas.microsoft.com/office/drawing/2014/main" xmlns="" id="{32A5347C-FC5D-4463-A04A-C426A57D2DDE}"/>
+                    <a16:creationId xmlns:a16="http://schemas.microsoft.com/office/drawing/2014/main" id="{32A5347C-FC5D-4463-A04A-C426A57D2DDE}"/>
                   </a:ext>
                 </a:extLst>
               </p:cNvPr>
@@ -3809,6 +3825,264 @@
           </a:extLst>
         </p:spPr>
       </p:pic>
+      <p:sp>
+        <p:nvSpPr>
+          <p:cNvPr id="2" name="타원 1">
+            <a:extLst>
+              <a:ext uri="{FF2B5EF4-FFF2-40B4-BE49-F238E27FC236}">
+                <a16:creationId xmlns:a16="http://schemas.microsoft.com/office/drawing/2014/main" id="{63B2AC22-7515-472D-B541-34F3D44B6F62}"/>
+              </a:ext>
+            </a:extLst>
+          </p:cNvPr>
+          <p:cNvSpPr/>
+          <p:nvPr/>
+        </p:nvSpPr>
+        <p:spPr>
+          <a:xfrm>
+            <a:off x="4421171" y="3516198"/>
+            <a:ext cx="169682" cy="169682"/>
+          </a:xfrm>
+          <a:prstGeom prst="ellipse">
+            <a:avLst/>
+          </a:prstGeom>
+          <a:solidFill>
+            <a:schemeClr val="accent4"/>
+          </a:solidFill>
+        </p:spPr>
+        <p:style>
+          <a:lnRef idx="2">
+            <a:schemeClr val="accent1">
+              <a:shade val="50000"/>
+            </a:schemeClr>
+          </a:lnRef>
+          <a:fillRef idx="1">
+            <a:schemeClr val="accent1"/>
+          </a:fillRef>
+          <a:effectRef idx="0">
+            <a:schemeClr val="accent1"/>
+          </a:effectRef>
+          <a:fontRef idx="minor">
+            <a:schemeClr val="lt1"/>
+          </a:fontRef>
+        </p:style>
+        <p:txBody>
+          <a:bodyPr rtlCol="0" anchor="ctr"/>
+          <a:lstStyle/>
+          <a:p>
+            <a:pPr algn="ctr"/>
+            <a:endParaRPr lang="ko-KR" altLang="en-US"/>
+          </a:p>
+        </p:txBody>
+      </p:sp>
+      <p:sp>
+        <p:nvSpPr>
+          <p:cNvPr id="4" name="타원 3">
+            <a:extLst>
+              <a:ext uri="{FF2B5EF4-FFF2-40B4-BE49-F238E27FC236}">
+                <a16:creationId xmlns:a16="http://schemas.microsoft.com/office/drawing/2014/main" id="{33B2237A-07B3-4BFF-9EB2-C91BBB07680D}"/>
+              </a:ext>
+            </a:extLst>
+          </p:cNvPr>
+          <p:cNvSpPr/>
+          <p:nvPr/>
+        </p:nvSpPr>
+        <p:spPr>
+          <a:xfrm>
+            <a:off x="7857791" y="4575378"/>
+            <a:ext cx="169682" cy="169682"/>
+          </a:xfrm>
+          <a:prstGeom prst="ellipse">
+            <a:avLst/>
+          </a:prstGeom>
+          <a:solidFill>
+            <a:srgbClr val="FF0000"/>
+          </a:solidFill>
+        </p:spPr>
+        <p:style>
+          <a:lnRef idx="2">
+            <a:schemeClr val="accent1">
+              <a:shade val="50000"/>
+            </a:schemeClr>
+          </a:lnRef>
+          <a:fillRef idx="1">
+            <a:schemeClr val="accent1"/>
+          </a:fillRef>
+          <a:effectRef idx="0">
+            <a:schemeClr val="accent1"/>
+          </a:effectRef>
+          <a:fontRef idx="minor">
+            <a:schemeClr val="lt1"/>
+          </a:fontRef>
+        </p:style>
+        <p:txBody>
+          <a:bodyPr rtlCol="0" anchor="ctr"/>
+          <a:lstStyle/>
+          <a:p>
+            <a:pPr algn="ctr"/>
+            <a:endParaRPr lang="ko-KR" altLang="en-US"/>
+          </a:p>
+        </p:txBody>
+      </p:sp>
+      <p:cxnSp>
+        <p:nvCxnSpPr>
+          <p:cNvPr id="5" name="직선 화살표 연결선 4">
+            <a:extLst>
+              <a:ext uri="{FF2B5EF4-FFF2-40B4-BE49-F238E27FC236}">
+                <a16:creationId xmlns:a16="http://schemas.microsoft.com/office/drawing/2014/main" id="{D2062CBD-3F3A-4A56-9F2C-F23834A95715}"/>
+              </a:ext>
+            </a:extLst>
+          </p:cNvPr>
+          <p:cNvCxnSpPr>
+            <a:cxnSpLocks/>
+          </p:cNvCxnSpPr>
+          <p:nvPr/>
+        </p:nvCxnSpPr>
+        <p:spPr>
+          <a:xfrm flipH="1" flipV="1">
+            <a:off x="4600280" y="3780149"/>
+            <a:ext cx="320511" cy="729110"/>
+          </a:xfrm>
+          <a:prstGeom prst="straightConnector1">
+            <a:avLst/>
+          </a:prstGeom>
+          <a:ln w="38100">
+            <a:solidFill>
+              <a:schemeClr val="accent4"/>
+            </a:solidFill>
+            <a:tailEnd type="triangle"/>
+          </a:ln>
+        </p:spPr>
+        <p:style>
+          <a:lnRef idx="1">
+            <a:schemeClr val="accent1"/>
+          </a:lnRef>
+          <a:fillRef idx="0">
+            <a:schemeClr val="accent1"/>
+          </a:fillRef>
+          <a:effectRef idx="0">
+            <a:schemeClr val="accent1"/>
+          </a:effectRef>
+          <a:fontRef idx="minor">
+            <a:schemeClr val="tx1"/>
+          </a:fontRef>
+        </p:style>
+      </p:cxnSp>
+      <p:sp>
+        <p:nvSpPr>
+          <p:cNvPr id="7" name="TextBox 6">
+            <a:extLst>
+              <a:ext uri="{FF2B5EF4-FFF2-40B4-BE49-F238E27FC236}">
+                <a16:creationId xmlns:a16="http://schemas.microsoft.com/office/drawing/2014/main" id="{B17A4C11-6B15-45FE-A995-6007259055C4}"/>
+              </a:ext>
+            </a:extLst>
+          </p:cNvPr>
+          <p:cNvSpPr txBox="1"/>
+          <p:nvPr/>
+        </p:nvSpPr>
+        <p:spPr>
+          <a:xfrm>
+            <a:off x="4134358" y="4509259"/>
+            <a:ext cx="1572866" cy="369332"/>
+          </a:xfrm>
+          <a:prstGeom prst="rect">
+            <a:avLst/>
+          </a:prstGeom>
+          <a:noFill/>
+        </p:spPr>
+        <p:txBody>
+          <a:bodyPr wrap="none" rtlCol="0">
+            <a:spAutoFit/>
+          </a:bodyPr>
+          <a:lstStyle/>
+          <a:p>
+            <a:r>
+              <a:rPr lang="en-US" altLang="ko-KR" dirty="0"/>
+              <a:t>Local minima</a:t>
+            </a:r>
+            <a:endParaRPr lang="ko-KR" altLang="en-US" dirty="0"/>
+          </a:p>
+        </p:txBody>
+      </p:sp>
+      <p:cxnSp>
+        <p:nvCxnSpPr>
+          <p:cNvPr id="9" name="직선 화살표 연결선 8">
+            <a:extLst>
+              <a:ext uri="{FF2B5EF4-FFF2-40B4-BE49-F238E27FC236}">
+                <a16:creationId xmlns:a16="http://schemas.microsoft.com/office/drawing/2014/main" id="{E266AD11-4356-4CD8-B878-2318CA5890CD}"/>
+              </a:ext>
+            </a:extLst>
+          </p:cNvPr>
+          <p:cNvCxnSpPr>
+            <a:cxnSpLocks/>
+          </p:cNvCxnSpPr>
+          <p:nvPr/>
+        </p:nvCxnSpPr>
+        <p:spPr>
+          <a:xfrm>
+            <a:off x="7601149" y="2696066"/>
+            <a:ext cx="341483" cy="1791171"/>
+          </a:xfrm>
+          <a:prstGeom prst="straightConnector1">
+            <a:avLst/>
+          </a:prstGeom>
+          <a:ln w="38100">
+            <a:solidFill>
+              <a:srgbClr val="FF0000"/>
+            </a:solidFill>
+            <a:tailEnd type="triangle"/>
+          </a:ln>
+        </p:spPr>
+        <p:style>
+          <a:lnRef idx="1">
+            <a:schemeClr val="accent1"/>
+          </a:lnRef>
+          <a:fillRef idx="0">
+            <a:schemeClr val="accent1"/>
+          </a:fillRef>
+          <a:effectRef idx="0">
+            <a:schemeClr val="accent1"/>
+          </a:effectRef>
+          <a:fontRef idx="minor">
+            <a:schemeClr val="tx1"/>
+          </a:fontRef>
+        </p:style>
+      </p:cxnSp>
+      <p:sp>
+        <p:nvSpPr>
+          <p:cNvPr id="12" name="TextBox 11">
+            <a:extLst>
+              <a:ext uri="{FF2B5EF4-FFF2-40B4-BE49-F238E27FC236}">
+                <a16:creationId xmlns:a16="http://schemas.microsoft.com/office/drawing/2014/main" id="{0204311A-1A71-46CB-BFE1-C18D5E9F2C3D}"/>
+              </a:ext>
+            </a:extLst>
+          </p:cNvPr>
+          <p:cNvSpPr txBox="1"/>
+          <p:nvPr/>
+        </p:nvSpPr>
+        <p:spPr>
+          <a:xfrm>
+            <a:off x="6330805" y="2224373"/>
+            <a:ext cx="1960730" cy="369332"/>
+          </a:xfrm>
+          <a:prstGeom prst="rect">
+            <a:avLst/>
+          </a:prstGeom>
+          <a:noFill/>
+        </p:spPr>
+        <p:txBody>
+          <a:bodyPr wrap="none" rtlCol="0">
+            <a:spAutoFit/>
+          </a:bodyPr>
+          <a:lstStyle/>
+          <a:p>
+            <a:r>
+              <a:rPr lang="en-US" altLang="ko-KR" dirty="0"/>
+              <a:t>Global maximum</a:t>
+            </a:r>
+            <a:endParaRPr lang="ko-KR" altLang="en-US" dirty="0"/>
+          </a:p>
+        </p:txBody>
+      </p:sp>
     </p:spTree>
     <p:extLst>
       <p:ext uri="{BB962C8B-B14F-4D97-AF65-F5344CB8AC3E}">
@@ -4111,7 +4385,7 @@
   <a:extraClrSchemeLst/>
   <a:extLst>
     <a:ext uri="{05A4C25C-085E-4340-85A3-A5531E510DB2}">
-      <thm15:themeFamily xmlns:thm15="http://schemas.microsoft.com/office/thememl/2012/main" xmlns="" name="Office Theme" id="{62F939B6-93AF-4DB8-9C6B-D6C7DFDC589F}" vid="{4A3C46E8-61CC-4603-A589-7422A47A8E4A}"/>
+      <thm15:themeFamily xmlns:thm15="http://schemas.microsoft.com/office/thememl/2012/main" name="Office Theme" id="{62F939B6-93AF-4DB8-9C6B-D6C7DFDC589F}" vid="{4A3C46E8-61CC-4603-A589-7422A47A8E4A}"/>
     </a:ext>
   </a:extLst>
 </a:theme>

</xml_diff>

<commit_message>
Gradient descent 내용 상 오류 수정
</commit_message>
<xml_diff>
--- a/pics/2020-08-16-gradient_descent/pics.pptx
+++ b/pics/2020-08-16-gradient_descent/pics.pptx
@@ -272,7 +272,7 @@
           <a:p>
             <a:fld id="{FB39D72B-B597-4B6A-A424-C00DE6914B05}" type="datetimeFigureOut">
               <a:rPr lang="ko-KR" altLang="en-US" smtClean="0"/>
-              <a:t>2020-09-09</a:t>
+              <a:t>2021-07-24</a:t>
             </a:fld>
             <a:endParaRPr lang="ko-KR" altLang="en-US"/>
           </a:p>
@@ -470,7 +470,7 @@
           <a:p>
             <a:fld id="{FB39D72B-B597-4B6A-A424-C00DE6914B05}" type="datetimeFigureOut">
               <a:rPr lang="ko-KR" altLang="en-US" smtClean="0"/>
-              <a:t>2020-09-09</a:t>
+              <a:t>2021-07-24</a:t>
             </a:fld>
             <a:endParaRPr lang="ko-KR" altLang="en-US"/>
           </a:p>
@@ -678,7 +678,7 @@
           <a:p>
             <a:fld id="{FB39D72B-B597-4B6A-A424-C00DE6914B05}" type="datetimeFigureOut">
               <a:rPr lang="ko-KR" altLang="en-US" smtClean="0"/>
-              <a:t>2020-09-09</a:t>
+              <a:t>2021-07-24</a:t>
             </a:fld>
             <a:endParaRPr lang="ko-KR" altLang="en-US"/>
           </a:p>
@@ -876,7 +876,7 @@
           <a:p>
             <a:fld id="{FB39D72B-B597-4B6A-A424-C00DE6914B05}" type="datetimeFigureOut">
               <a:rPr lang="ko-KR" altLang="en-US" smtClean="0"/>
-              <a:t>2020-09-09</a:t>
+              <a:t>2021-07-24</a:t>
             </a:fld>
             <a:endParaRPr lang="ko-KR" altLang="en-US"/>
           </a:p>
@@ -1151,7 +1151,7 @@
           <a:p>
             <a:fld id="{FB39D72B-B597-4B6A-A424-C00DE6914B05}" type="datetimeFigureOut">
               <a:rPr lang="ko-KR" altLang="en-US" smtClean="0"/>
-              <a:t>2020-09-09</a:t>
+              <a:t>2021-07-24</a:t>
             </a:fld>
             <a:endParaRPr lang="ko-KR" altLang="en-US"/>
           </a:p>
@@ -1416,7 +1416,7 @@
           <a:p>
             <a:fld id="{FB39D72B-B597-4B6A-A424-C00DE6914B05}" type="datetimeFigureOut">
               <a:rPr lang="ko-KR" altLang="en-US" smtClean="0"/>
-              <a:t>2020-09-09</a:t>
+              <a:t>2021-07-24</a:t>
             </a:fld>
             <a:endParaRPr lang="ko-KR" altLang="en-US"/>
           </a:p>
@@ -1828,7 +1828,7 @@
           <a:p>
             <a:fld id="{FB39D72B-B597-4B6A-A424-C00DE6914B05}" type="datetimeFigureOut">
               <a:rPr lang="ko-KR" altLang="en-US" smtClean="0"/>
-              <a:t>2020-09-09</a:t>
+              <a:t>2021-07-24</a:t>
             </a:fld>
             <a:endParaRPr lang="ko-KR" altLang="en-US"/>
           </a:p>
@@ -1969,7 +1969,7 @@
           <a:p>
             <a:fld id="{FB39D72B-B597-4B6A-A424-C00DE6914B05}" type="datetimeFigureOut">
               <a:rPr lang="ko-KR" altLang="en-US" smtClean="0"/>
-              <a:t>2020-09-09</a:t>
+              <a:t>2021-07-24</a:t>
             </a:fld>
             <a:endParaRPr lang="ko-KR" altLang="en-US"/>
           </a:p>
@@ -2082,7 +2082,7 @@
           <a:p>
             <a:fld id="{FB39D72B-B597-4B6A-A424-C00DE6914B05}" type="datetimeFigureOut">
               <a:rPr lang="ko-KR" altLang="en-US" smtClean="0"/>
-              <a:t>2020-09-09</a:t>
+              <a:t>2021-07-24</a:t>
             </a:fld>
             <a:endParaRPr lang="ko-KR" altLang="en-US"/>
           </a:p>
@@ -2393,7 +2393,7 @@
           <a:p>
             <a:fld id="{FB39D72B-B597-4B6A-A424-C00DE6914B05}" type="datetimeFigureOut">
               <a:rPr lang="ko-KR" altLang="en-US" smtClean="0"/>
-              <a:t>2020-09-09</a:t>
+              <a:t>2021-07-24</a:t>
             </a:fld>
             <a:endParaRPr lang="ko-KR" altLang="en-US"/>
           </a:p>
@@ -2681,7 +2681,7 @@
           <a:p>
             <a:fld id="{FB39D72B-B597-4B6A-A424-C00DE6914B05}" type="datetimeFigureOut">
               <a:rPr lang="ko-KR" altLang="en-US" smtClean="0"/>
-              <a:t>2020-09-09</a:t>
+              <a:t>2021-07-24</a:t>
             </a:fld>
             <a:endParaRPr lang="ko-KR" altLang="en-US"/>
           </a:p>
@@ -2922,7 +2922,7 @@
           <a:p>
             <a:fld id="{FB39D72B-B597-4B6A-A424-C00DE6914B05}" type="datetimeFigureOut">
               <a:rPr lang="ko-KR" altLang="en-US" smtClean="0"/>
-              <a:t>2020-09-09</a:t>
+              <a:t>2021-07-24</a:t>
             </a:fld>
             <a:endParaRPr lang="ko-KR" altLang="en-US"/>
           </a:p>
@@ -3877,8 +3877,8 @@
           </a:p>
         </p:txBody>
       </p:sp>
-      <mc:AlternateContent xmlns:mc="http://schemas.openxmlformats.org/markup-compatibility/2006">
-        <mc:Choice xmlns:a14="http://schemas.microsoft.com/office/drawing/2010/main" Requires="a14">
+      <mc:AlternateContent xmlns:mc="http://schemas.openxmlformats.org/markup-compatibility/2006" xmlns:a14="http://schemas.microsoft.com/office/drawing/2010/main">
+        <mc:Choice Requires="a14">
           <p:sp>
             <p:nvSpPr>
               <p:cNvPr id="20" name="TextBox 19">
@@ -3962,7 +3962,7 @@
             </p:txBody>
           </p:sp>
         </mc:Choice>
-        <mc:Fallback>
+        <mc:Fallback xmlns="">
           <p:sp>
             <p:nvSpPr>
               <p:cNvPr id="20" name="TextBox 19">
@@ -4729,8 +4729,8 @@
         </p:nvSpPr>
         <p:spPr>
           <a:xfrm>
-            <a:off x="6330805" y="2224373"/>
-            <a:ext cx="1960730" cy="369332"/>
+            <a:off x="6383813" y="2224373"/>
+            <a:ext cx="1922257" cy="369332"/>
           </a:xfrm>
           <a:prstGeom prst="rect">
             <a:avLst/>
@@ -4745,7 +4745,7 @@
           <a:p>
             <a:r>
               <a:rPr lang="en-US" altLang="ko-KR" dirty="0"/>
-              <a:t>Global maximum</a:t>
+              <a:t>Global minimum</a:t>
             </a:r>
             <a:endParaRPr lang="ko-KR" altLang="en-US" dirty="0"/>
           </a:p>

</xml_diff>

<commit_message>
Gradient Descent in English
</commit_message>
<xml_diff>
--- a/pics/2020-08-16-gradient_descent/pics.pptx
+++ b/pics/2020-08-16-gradient_descent/pics.pptx
@@ -6,8 +6,10 @@
   </p:sldMasterIdLst>
   <p:sldIdLst>
     <p:sldId id="258" r:id="rId2"/>
-    <p:sldId id="256" r:id="rId3"/>
-    <p:sldId id="257" r:id="rId4"/>
+    <p:sldId id="259" r:id="rId3"/>
+    <p:sldId id="256" r:id="rId4"/>
+    <p:sldId id="260" r:id="rId5"/>
+    <p:sldId id="257" r:id="rId6"/>
   </p:sldIdLst>
   <p:sldSz cx="12192000" cy="6858000"/>
   <p:notesSz cx="6858000" cy="9144000"/>
@@ -272,7 +274,7 @@
           <a:p>
             <a:fld id="{FB39D72B-B597-4B6A-A424-C00DE6914B05}" type="datetimeFigureOut">
               <a:rPr lang="ko-KR" altLang="en-US" smtClean="0"/>
-              <a:t>2021-07-24</a:t>
+              <a:t>2023-04-25</a:t>
             </a:fld>
             <a:endParaRPr lang="ko-KR" altLang="en-US"/>
           </a:p>
@@ -470,7 +472,7 @@
           <a:p>
             <a:fld id="{FB39D72B-B597-4B6A-A424-C00DE6914B05}" type="datetimeFigureOut">
               <a:rPr lang="ko-KR" altLang="en-US" smtClean="0"/>
-              <a:t>2021-07-24</a:t>
+              <a:t>2023-04-25</a:t>
             </a:fld>
             <a:endParaRPr lang="ko-KR" altLang="en-US"/>
           </a:p>
@@ -678,7 +680,7 @@
           <a:p>
             <a:fld id="{FB39D72B-B597-4B6A-A424-C00DE6914B05}" type="datetimeFigureOut">
               <a:rPr lang="ko-KR" altLang="en-US" smtClean="0"/>
-              <a:t>2021-07-24</a:t>
+              <a:t>2023-04-25</a:t>
             </a:fld>
             <a:endParaRPr lang="ko-KR" altLang="en-US"/>
           </a:p>
@@ -876,7 +878,7 @@
           <a:p>
             <a:fld id="{FB39D72B-B597-4B6A-A424-C00DE6914B05}" type="datetimeFigureOut">
               <a:rPr lang="ko-KR" altLang="en-US" smtClean="0"/>
-              <a:t>2021-07-24</a:t>
+              <a:t>2023-04-25</a:t>
             </a:fld>
             <a:endParaRPr lang="ko-KR" altLang="en-US"/>
           </a:p>
@@ -1151,7 +1153,7 @@
           <a:p>
             <a:fld id="{FB39D72B-B597-4B6A-A424-C00DE6914B05}" type="datetimeFigureOut">
               <a:rPr lang="ko-KR" altLang="en-US" smtClean="0"/>
-              <a:t>2021-07-24</a:t>
+              <a:t>2023-04-25</a:t>
             </a:fld>
             <a:endParaRPr lang="ko-KR" altLang="en-US"/>
           </a:p>
@@ -1416,7 +1418,7 @@
           <a:p>
             <a:fld id="{FB39D72B-B597-4B6A-A424-C00DE6914B05}" type="datetimeFigureOut">
               <a:rPr lang="ko-KR" altLang="en-US" smtClean="0"/>
-              <a:t>2021-07-24</a:t>
+              <a:t>2023-04-25</a:t>
             </a:fld>
             <a:endParaRPr lang="ko-KR" altLang="en-US"/>
           </a:p>
@@ -1828,7 +1830,7 @@
           <a:p>
             <a:fld id="{FB39D72B-B597-4B6A-A424-C00DE6914B05}" type="datetimeFigureOut">
               <a:rPr lang="ko-KR" altLang="en-US" smtClean="0"/>
-              <a:t>2021-07-24</a:t>
+              <a:t>2023-04-25</a:t>
             </a:fld>
             <a:endParaRPr lang="ko-KR" altLang="en-US"/>
           </a:p>
@@ -1969,7 +1971,7 @@
           <a:p>
             <a:fld id="{FB39D72B-B597-4B6A-A424-C00DE6914B05}" type="datetimeFigureOut">
               <a:rPr lang="ko-KR" altLang="en-US" smtClean="0"/>
-              <a:t>2021-07-24</a:t>
+              <a:t>2023-04-25</a:t>
             </a:fld>
             <a:endParaRPr lang="ko-KR" altLang="en-US"/>
           </a:p>
@@ -2082,7 +2084,7 @@
           <a:p>
             <a:fld id="{FB39D72B-B597-4B6A-A424-C00DE6914B05}" type="datetimeFigureOut">
               <a:rPr lang="ko-KR" altLang="en-US" smtClean="0"/>
-              <a:t>2021-07-24</a:t>
+              <a:t>2023-04-25</a:t>
             </a:fld>
             <a:endParaRPr lang="ko-KR" altLang="en-US"/>
           </a:p>
@@ -2393,7 +2395,7 @@
           <a:p>
             <a:fld id="{FB39D72B-B597-4B6A-A424-C00DE6914B05}" type="datetimeFigureOut">
               <a:rPr lang="ko-KR" altLang="en-US" smtClean="0"/>
-              <a:t>2021-07-24</a:t>
+              <a:t>2023-04-25</a:t>
             </a:fld>
             <a:endParaRPr lang="ko-KR" altLang="en-US"/>
           </a:p>
@@ -2681,7 +2683,7 @@
           <a:p>
             <a:fld id="{FB39D72B-B597-4B6A-A424-C00DE6914B05}" type="datetimeFigureOut">
               <a:rPr lang="ko-KR" altLang="en-US" smtClean="0"/>
-              <a:t>2021-07-24</a:t>
+              <a:t>2023-04-25</a:t>
             </a:fld>
             <a:endParaRPr lang="ko-KR" altLang="en-US"/>
           </a:p>
@@ -2922,7 +2924,7 @@
           <a:p>
             <a:fld id="{FB39D72B-B597-4B6A-A424-C00DE6914B05}" type="datetimeFigureOut">
               <a:rPr lang="ko-KR" altLang="en-US" smtClean="0"/>
-              <a:t>2021-07-24</a:t>
+              <a:t>2023-04-25</a:t>
             </a:fld>
             <a:endParaRPr lang="ko-KR" altLang="en-US"/>
           </a:p>
@@ -4040,12 +4042,725 @@
           <a:chExt cx="0" cy="0"/>
         </a:xfrm>
       </p:grpSpPr>
+      <p:pic>
+        <p:nvPicPr>
+          <p:cNvPr id="4" name="그림 3">
+            <a:extLst>
+              <a:ext uri="{FF2B5EF4-FFF2-40B4-BE49-F238E27FC236}">
+                <a16:creationId xmlns:a16="http://schemas.microsoft.com/office/drawing/2014/main" id="{A59D8468-FF2E-4D45-8AAD-B4915268BEAB}"/>
+              </a:ext>
+            </a:extLst>
+          </p:cNvPr>
+          <p:cNvPicPr>
+            <a:picLocks noChangeAspect="1"/>
+          </p:cNvPicPr>
+          <p:nvPr/>
+        </p:nvPicPr>
+        <p:blipFill>
+          <a:blip r:embed="rId2"/>
+          <a:stretch>
+            <a:fillRect/>
+          </a:stretch>
+        </p:blipFill>
+        <p:spPr>
+          <a:xfrm>
+            <a:off x="2388945" y="659876"/>
+            <a:ext cx="7414110" cy="5538248"/>
+          </a:xfrm>
+          <a:prstGeom prst="rect">
+            <a:avLst/>
+          </a:prstGeom>
+        </p:spPr>
+      </p:pic>
+      <p:cxnSp>
+        <p:nvCxnSpPr>
+          <p:cNvPr id="6" name="직선 연결선 5">
+            <a:extLst>
+              <a:ext uri="{FF2B5EF4-FFF2-40B4-BE49-F238E27FC236}">
+                <a16:creationId xmlns:a16="http://schemas.microsoft.com/office/drawing/2014/main" id="{7C26489C-B399-49EC-806D-27219E87BC51}"/>
+              </a:ext>
+            </a:extLst>
+          </p:cNvPr>
+          <p:cNvCxnSpPr>
+            <a:cxnSpLocks/>
+          </p:cNvCxnSpPr>
+          <p:nvPr/>
+        </p:nvCxnSpPr>
+        <p:spPr>
+          <a:xfrm flipV="1">
+            <a:off x="7280476" y="2419109"/>
+            <a:ext cx="1111170" cy="1898248"/>
+          </a:xfrm>
+          <a:prstGeom prst="line">
+            <a:avLst/>
+          </a:prstGeom>
+          <a:ln w="38100">
+            <a:solidFill>
+              <a:schemeClr val="tx1"/>
+            </a:solidFill>
+          </a:ln>
+        </p:spPr>
+        <p:style>
+          <a:lnRef idx="1">
+            <a:schemeClr val="accent1"/>
+          </a:lnRef>
+          <a:fillRef idx="0">
+            <a:schemeClr val="accent1"/>
+          </a:fillRef>
+          <a:effectRef idx="0">
+            <a:schemeClr val="accent1"/>
+          </a:effectRef>
+          <a:fontRef idx="minor">
+            <a:schemeClr val="tx1"/>
+          </a:fontRef>
+        </p:style>
+      </p:cxnSp>
+      <p:cxnSp>
+        <p:nvCxnSpPr>
+          <p:cNvPr id="12" name="직선 연결선 11">
+            <a:extLst>
+              <a:ext uri="{FF2B5EF4-FFF2-40B4-BE49-F238E27FC236}">
+                <a16:creationId xmlns:a16="http://schemas.microsoft.com/office/drawing/2014/main" id="{875EA15C-58D3-4DFF-A56D-72AB213EDFA8}"/>
+              </a:ext>
+            </a:extLst>
+          </p:cNvPr>
+          <p:cNvCxnSpPr>
+            <a:cxnSpLocks/>
+          </p:cNvCxnSpPr>
+          <p:nvPr/>
+        </p:nvCxnSpPr>
+        <p:spPr>
+          <a:xfrm flipH="1" flipV="1">
+            <a:off x="4053068" y="2419109"/>
+            <a:ext cx="1111170" cy="1898248"/>
+          </a:xfrm>
+          <a:prstGeom prst="line">
+            <a:avLst/>
+          </a:prstGeom>
+          <a:ln w="38100">
+            <a:solidFill>
+              <a:schemeClr val="tx1"/>
+            </a:solidFill>
+          </a:ln>
+        </p:spPr>
+        <p:style>
+          <a:lnRef idx="1">
+            <a:schemeClr val="accent1"/>
+          </a:lnRef>
+          <a:fillRef idx="0">
+            <a:schemeClr val="accent1"/>
+          </a:fillRef>
+          <a:effectRef idx="0">
+            <a:schemeClr val="accent1"/>
+          </a:effectRef>
+          <a:fontRef idx="minor">
+            <a:schemeClr val="tx1"/>
+          </a:fontRef>
+        </p:style>
+      </p:cxnSp>
+      <p:sp>
+        <p:nvSpPr>
+          <p:cNvPr id="13" name="타원 12">
+            <a:extLst>
+              <a:ext uri="{FF2B5EF4-FFF2-40B4-BE49-F238E27FC236}">
+                <a16:creationId xmlns:a16="http://schemas.microsoft.com/office/drawing/2014/main" id="{93BE03CF-F8C8-4280-87D1-425C8596013E}"/>
+              </a:ext>
+            </a:extLst>
+          </p:cNvPr>
+          <p:cNvSpPr/>
+          <p:nvPr/>
+        </p:nvSpPr>
+        <p:spPr>
+          <a:xfrm>
+            <a:off x="4542404" y="3301984"/>
+            <a:ext cx="132498" cy="132498"/>
+          </a:xfrm>
+          <a:prstGeom prst="ellipse">
+            <a:avLst/>
+          </a:prstGeom>
+          <a:solidFill>
+            <a:srgbClr val="FF0000"/>
+          </a:solidFill>
+          <a:ln>
+            <a:noFill/>
+          </a:ln>
+        </p:spPr>
+        <p:style>
+          <a:lnRef idx="2">
+            <a:schemeClr val="accent1">
+              <a:shade val="50000"/>
+            </a:schemeClr>
+          </a:lnRef>
+          <a:fillRef idx="1">
+            <a:schemeClr val="accent1"/>
+          </a:fillRef>
+          <a:effectRef idx="0">
+            <a:schemeClr val="accent1"/>
+          </a:effectRef>
+          <a:fontRef idx="minor">
+            <a:schemeClr val="lt1"/>
+          </a:fontRef>
+        </p:style>
+        <p:txBody>
+          <a:bodyPr rtlCol="0" anchor="ctr"/>
+          <a:lstStyle/>
+          <a:p>
+            <a:pPr algn="ctr"/>
+            <a:endParaRPr lang="ko-KR" altLang="en-US"/>
+          </a:p>
+        </p:txBody>
+      </p:sp>
+      <p:sp>
+        <p:nvSpPr>
+          <p:cNvPr id="14" name="타원 13">
+            <a:extLst>
+              <a:ext uri="{FF2B5EF4-FFF2-40B4-BE49-F238E27FC236}">
+                <a16:creationId xmlns:a16="http://schemas.microsoft.com/office/drawing/2014/main" id="{F416D615-94D4-4B3D-8A52-B3349A9FDB23}"/>
+              </a:ext>
+            </a:extLst>
+          </p:cNvPr>
+          <p:cNvSpPr/>
+          <p:nvPr/>
+        </p:nvSpPr>
+        <p:spPr>
+          <a:xfrm>
+            <a:off x="7769812" y="3301984"/>
+            <a:ext cx="132498" cy="132498"/>
+          </a:xfrm>
+          <a:prstGeom prst="ellipse">
+            <a:avLst/>
+          </a:prstGeom>
+          <a:solidFill>
+            <a:srgbClr val="FF0000"/>
+          </a:solidFill>
+          <a:ln>
+            <a:noFill/>
+          </a:ln>
+        </p:spPr>
+        <p:style>
+          <a:lnRef idx="2">
+            <a:schemeClr val="accent1">
+              <a:shade val="50000"/>
+            </a:schemeClr>
+          </a:lnRef>
+          <a:fillRef idx="1">
+            <a:schemeClr val="accent1"/>
+          </a:fillRef>
+          <a:effectRef idx="0">
+            <a:schemeClr val="accent1"/>
+          </a:effectRef>
+          <a:fontRef idx="minor">
+            <a:schemeClr val="lt1"/>
+          </a:fontRef>
+        </p:style>
+        <p:txBody>
+          <a:bodyPr rtlCol="0" anchor="ctr"/>
+          <a:lstStyle/>
+          <a:p>
+            <a:pPr algn="ctr"/>
+            <a:endParaRPr lang="ko-KR" altLang="en-US"/>
+          </a:p>
+        </p:txBody>
+      </p:sp>
+      <p:sp>
+        <p:nvSpPr>
+          <p:cNvPr id="16" name="자유형: 도형 15">
+            <a:extLst>
+              <a:ext uri="{FF2B5EF4-FFF2-40B4-BE49-F238E27FC236}">
+                <a16:creationId xmlns:a16="http://schemas.microsoft.com/office/drawing/2014/main" id="{670E99A4-056F-40D5-9B1B-698A88A93FA7}"/>
+              </a:ext>
+            </a:extLst>
+          </p:cNvPr>
+          <p:cNvSpPr/>
+          <p:nvPr/>
+        </p:nvSpPr>
+        <p:spPr>
+          <a:xfrm>
+            <a:off x="2297922" y="3391382"/>
+            <a:ext cx="2181481" cy="1090733"/>
+          </a:xfrm>
+          <a:custGeom>
+            <a:avLst/>
+            <a:gdLst>
+              <a:gd name="connsiteX0" fmla="*/ 40164 w 2181481"/>
+              <a:gd name="connsiteY0" fmla="*/ 1053296 h 1090733"/>
+              <a:gd name="connsiteX1" fmla="*/ 74888 w 2181481"/>
+              <a:gd name="connsiteY1" fmla="*/ 995423 h 1090733"/>
+              <a:gd name="connsiteX2" fmla="*/ 723070 w 2181481"/>
+              <a:gd name="connsiteY2" fmla="*/ 231494 h 1090733"/>
+              <a:gd name="connsiteX3" fmla="*/ 1197632 w 2181481"/>
+              <a:gd name="connsiteY3" fmla="*/ 601884 h 1090733"/>
+              <a:gd name="connsiteX4" fmla="*/ 2181481 w 2181481"/>
+              <a:gd name="connsiteY4" fmla="*/ 0 h 1090733"/>
+            </a:gdLst>
+            <a:ahLst/>
+            <a:cxnLst>
+              <a:cxn ang="0">
+                <a:pos x="connsiteX0" y="connsiteY0"/>
+              </a:cxn>
+              <a:cxn ang="0">
+                <a:pos x="connsiteX1" y="connsiteY1"/>
+              </a:cxn>
+              <a:cxn ang="0">
+                <a:pos x="connsiteX2" y="connsiteY2"/>
+              </a:cxn>
+              <a:cxn ang="0">
+                <a:pos x="connsiteX3" y="connsiteY3"/>
+              </a:cxn>
+              <a:cxn ang="0">
+                <a:pos x="connsiteX4" y="connsiteY4"/>
+              </a:cxn>
+            </a:cxnLst>
+            <a:rect l="l" t="t" r="r" b="b"/>
+            <a:pathLst>
+              <a:path w="2181481" h="1090733">
+                <a:moveTo>
+                  <a:pt x="40164" y="1053296"/>
+                </a:moveTo>
+                <a:cubicBezTo>
+                  <a:pt x="617" y="1092843"/>
+                  <a:pt x="-38930" y="1132390"/>
+                  <a:pt x="74888" y="995423"/>
+                </a:cubicBezTo>
+                <a:cubicBezTo>
+                  <a:pt x="188706" y="858456"/>
+                  <a:pt x="535946" y="297084"/>
+                  <a:pt x="723070" y="231494"/>
+                </a:cubicBezTo>
+                <a:cubicBezTo>
+                  <a:pt x="910194" y="165904"/>
+                  <a:pt x="954564" y="640466"/>
+                  <a:pt x="1197632" y="601884"/>
+                </a:cubicBezTo>
+                <a:cubicBezTo>
+                  <a:pt x="1440701" y="563302"/>
+                  <a:pt x="1811091" y="281651"/>
+                  <a:pt x="2181481" y="0"/>
+                </a:cubicBezTo>
+              </a:path>
+            </a:pathLst>
+          </a:custGeom>
+          <a:noFill/>
+          <a:ln w="38100">
+            <a:solidFill>
+              <a:schemeClr val="accent2"/>
+            </a:solidFill>
+            <a:headEnd type="none" w="med" len="med"/>
+            <a:tailEnd type="arrow" w="med" len="med"/>
+          </a:ln>
+        </p:spPr>
+        <p:style>
+          <a:lnRef idx="2">
+            <a:schemeClr val="accent1">
+              <a:shade val="50000"/>
+            </a:schemeClr>
+          </a:lnRef>
+          <a:fillRef idx="1">
+            <a:schemeClr val="accent1"/>
+          </a:fillRef>
+          <a:effectRef idx="0">
+            <a:schemeClr val="accent1"/>
+          </a:effectRef>
+          <a:fontRef idx="minor">
+            <a:schemeClr val="lt1"/>
+          </a:fontRef>
+        </p:style>
+        <p:txBody>
+          <a:bodyPr rtlCol="0" anchor="ctr"/>
+          <a:lstStyle/>
+          <a:p>
+            <a:pPr algn="ctr"/>
+            <a:endParaRPr lang="ko-KR" altLang="en-US"/>
+          </a:p>
+        </p:txBody>
+      </p:sp>
+      <p:sp>
+        <p:nvSpPr>
+          <p:cNvPr id="17" name="자유형: 도형 16">
+            <a:extLst>
+              <a:ext uri="{FF2B5EF4-FFF2-40B4-BE49-F238E27FC236}">
+                <a16:creationId xmlns:a16="http://schemas.microsoft.com/office/drawing/2014/main" id="{8CFA485F-F674-47EF-9749-D747988C6462}"/>
+              </a:ext>
+            </a:extLst>
+          </p:cNvPr>
+          <p:cNvSpPr/>
+          <p:nvPr/>
+        </p:nvSpPr>
+        <p:spPr>
+          <a:xfrm>
+            <a:off x="8009681" y="2650603"/>
+            <a:ext cx="2187615" cy="659756"/>
+          </a:xfrm>
+          <a:custGeom>
+            <a:avLst/>
+            <a:gdLst>
+              <a:gd name="connsiteX0" fmla="*/ 2187615 w 2187615"/>
+              <a:gd name="connsiteY0" fmla="*/ 0 h 659756"/>
+              <a:gd name="connsiteX1" fmla="*/ 1632030 w 2187615"/>
+              <a:gd name="connsiteY1" fmla="*/ 625032 h 659756"/>
+              <a:gd name="connsiteX2" fmla="*/ 856527 w 2187615"/>
+              <a:gd name="connsiteY2" fmla="*/ 266217 h 659756"/>
+              <a:gd name="connsiteX3" fmla="*/ 0 w 2187615"/>
+              <a:gd name="connsiteY3" fmla="*/ 659756 h 659756"/>
+            </a:gdLst>
+            <a:ahLst/>
+            <a:cxnLst>
+              <a:cxn ang="0">
+                <a:pos x="connsiteX0" y="connsiteY0"/>
+              </a:cxn>
+              <a:cxn ang="0">
+                <a:pos x="connsiteX1" y="connsiteY1"/>
+              </a:cxn>
+              <a:cxn ang="0">
+                <a:pos x="connsiteX2" y="connsiteY2"/>
+              </a:cxn>
+              <a:cxn ang="0">
+                <a:pos x="connsiteX3" y="connsiteY3"/>
+              </a:cxn>
+            </a:cxnLst>
+            <a:rect l="l" t="t" r="r" b="b"/>
+            <a:pathLst>
+              <a:path w="2187615" h="659756">
+                <a:moveTo>
+                  <a:pt x="2187615" y="0"/>
+                </a:moveTo>
+                <a:cubicBezTo>
+                  <a:pt x="2020746" y="290331"/>
+                  <a:pt x="1853878" y="580663"/>
+                  <a:pt x="1632030" y="625032"/>
+                </a:cubicBezTo>
+                <a:cubicBezTo>
+                  <a:pt x="1410182" y="669401"/>
+                  <a:pt x="1128532" y="260430"/>
+                  <a:pt x="856527" y="266217"/>
+                </a:cubicBezTo>
+                <a:cubicBezTo>
+                  <a:pt x="584522" y="272004"/>
+                  <a:pt x="292261" y="465880"/>
+                  <a:pt x="0" y="659756"/>
+                </a:cubicBezTo>
+              </a:path>
+            </a:pathLst>
+          </a:custGeom>
+          <a:noFill/>
+          <a:ln w="38100">
+            <a:solidFill>
+              <a:schemeClr val="accent6"/>
+            </a:solidFill>
+            <a:headEnd type="none" w="med" len="med"/>
+            <a:tailEnd type="arrow" w="med" len="med"/>
+          </a:ln>
+        </p:spPr>
+        <p:style>
+          <a:lnRef idx="2">
+            <a:schemeClr val="accent1">
+              <a:shade val="50000"/>
+            </a:schemeClr>
+          </a:lnRef>
+          <a:fillRef idx="1">
+            <a:schemeClr val="accent1"/>
+          </a:fillRef>
+          <a:effectRef idx="0">
+            <a:schemeClr val="accent1"/>
+          </a:effectRef>
+          <a:fontRef idx="minor">
+            <a:schemeClr val="lt1"/>
+          </a:fontRef>
+        </p:style>
+        <p:txBody>
+          <a:bodyPr rtlCol="0" anchor="ctr"/>
+          <a:lstStyle/>
+          <a:p>
+            <a:pPr algn="ctr"/>
+            <a:endParaRPr lang="ko-KR" altLang="en-US"/>
+          </a:p>
+        </p:txBody>
+      </p:sp>
+      <p:sp>
+        <p:nvSpPr>
+          <p:cNvPr id="18" name="TextBox 17">
+            <a:extLst>
+              <a:ext uri="{FF2B5EF4-FFF2-40B4-BE49-F238E27FC236}">
+                <a16:creationId xmlns:a16="http://schemas.microsoft.com/office/drawing/2014/main" id="{00A5C7ED-4A9F-4EAD-9A01-CE38E6F3FEB5}"/>
+              </a:ext>
+            </a:extLst>
+          </p:cNvPr>
+          <p:cNvSpPr txBox="1"/>
+          <p:nvPr/>
+        </p:nvSpPr>
+        <p:spPr>
+          <a:xfrm>
+            <a:off x="1302730" y="4401092"/>
+            <a:ext cx="1867999" cy="408623"/>
+          </a:xfrm>
+          <a:prstGeom prst="roundRect">
+            <a:avLst/>
+          </a:prstGeom>
+          <a:solidFill>
+            <a:schemeClr val="bg1"/>
+          </a:solidFill>
+          <a:ln>
+            <a:solidFill>
+              <a:schemeClr val="tx1"/>
+            </a:solidFill>
+          </a:ln>
+        </p:spPr>
+        <p:txBody>
+          <a:bodyPr wrap="none" rtlCol="0">
+            <a:spAutoFit/>
+          </a:bodyPr>
+          <a:lstStyle/>
+          <a:p>
+            <a:pPr algn="ctr"/>
+            <a:r>
+              <a:rPr lang="en-US" altLang="ko-KR" dirty="0"/>
+              <a:t>when slope &lt; 0</a:t>
+            </a:r>
+          </a:p>
+        </p:txBody>
+      </p:sp>
+      <p:sp>
+        <p:nvSpPr>
+          <p:cNvPr id="19" name="TextBox 18">
+            <a:extLst>
+              <a:ext uri="{FF2B5EF4-FFF2-40B4-BE49-F238E27FC236}">
+                <a16:creationId xmlns:a16="http://schemas.microsoft.com/office/drawing/2014/main" id="{5F7A7194-E0C9-4530-9754-1B4D9E1B4841}"/>
+              </a:ext>
+            </a:extLst>
+          </p:cNvPr>
+          <p:cNvSpPr txBox="1"/>
+          <p:nvPr/>
+        </p:nvSpPr>
+        <p:spPr>
+          <a:xfrm>
+            <a:off x="9574763" y="1984525"/>
+            <a:ext cx="1867999" cy="408623"/>
+          </a:xfrm>
+          <a:prstGeom prst="roundRect">
+            <a:avLst/>
+          </a:prstGeom>
+          <a:solidFill>
+            <a:schemeClr val="bg1"/>
+          </a:solidFill>
+          <a:ln>
+            <a:solidFill>
+              <a:schemeClr val="tx1"/>
+            </a:solidFill>
+          </a:ln>
+        </p:spPr>
+        <p:txBody>
+          <a:bodyPr wrap="none" rtlCol="0">
+            <a:spAutoFit/>
+          </a:bodyPr>
+          <a:lstStyle/>
+          <a:p>
+            <a:pPr algn="ctr"/>
+            <a:r>
+              <a:rPr lang="en-US" altLang="ko-KR" dirty="0"/>
+              <a:t>when slope &gt; 0</a:t>
+            </a:r>
+          </a:p>
+        </p:txBody>
+      </p:sp>
+      <mc:AlternateContent xmlns:mc="http://schemas.openxmlformats.org/markup-compatibility/2006" xmlns:a14="http://schemas.microsoft.com/office/drawing/2010/main">
+        <mc:Choice Requires="a14">
+          <p:sp>
+            <p:nvSpPr>
+              <p:cNvPr id="20" name="TextBox 19">
+                <a:extLst>
+                  <a:ext uri="{FF2B5EF4-FFF2-40B4-BE49-F238E27FC236}">
+                    <a16:creationId xmlns:a16="http://schemas.microsoft.com/office/drawing/2014/main" id="{329C5176-1B3B-4AEB-ACA2-9B27AF2B2FCA}"/>
+                  </a:ext>
+                </a:extLst>
+              </p:cNvPr>
+              <p:cNvSpPr txBox="1"/>
+              <p:nvPr/>
+            </p:nvSpPr>
+            <p:spPr>
+              <a:xfrm>
+                <a:off x="5619796" y="474607"/>
+                <a:ext cx="1415396" cy="578882"/>
+              </a:xfrm>
+              <a:prstGeom prst="roundRect">
+                <a:avLst/>
+              </a:prstGeom>
+              <a:noFill/>
+              <a:ln>
+                <a:noFill/>
+              </a:ln>
+            </p:spPr>
+            <p:txBody>
+              <a:bodyPr wrap="none" rtlCol="0">
+                <a:spAutoFit/>
+              </a:bodyPr>
+              <a:lstStyle/>
+              <a:p>
+                <a:pPr algn="ctr"/>
+                <a14:m>
+                  <m:oMathPara xmlns:m="http://schemas.openxmlformats.org/officeDocument/2006/math">
+                    <m:oMathParaPr>
+                      <m:jc m:val="center"/>
+                    </m:oMathParaPr>
+                    <m:oMath xmlns:m="http://schemas.openxmlformats.org/officeDocument/2006/math">
+                      <m:r>
+                        <a:rPr lang="en-US" altLang="ko-KR" sz="2800" b="0" i="1" smtClean="0">
+                          <a:latin typeface="Cambria Math" panose="02040503050406030204" pitchFamily="18" charset="0"/>
+                        </a:rPr>
+                        <m:t>𝑦</m:t>
+                      </m:r>
+                      <m:r>
+                        <a:rPr lang="en-US" altLang="ko-KR" sz="2800" b="0" i="1" smtClean="0">
+                          <a:latin typeface="Cambria Math" panose="02040503050406030204" pitchFamily="18" charset="0"/>
+                        </a:rPr>
+                        <m:t>=</m:t>
+                      </m:r>
+                      <m:sSup>
+                        <m:sSupPr>
+                          <m:ctrlPr>
+                            <a:rPr lang="en-US" altLang="ko-KR" sz="2800" b="0" i="1" smtClean="0">
+                              <a:latin typeface="Cambria Math" panose="02040503050406030204" pitchFamily="18" charset="0"/>
+                            </a:rPr>
+                          </m:ctrlPr>
+                        </m:sSupPr>
+                        <m:e>
+                          <m:r>
+                            <a:rPr lang="en-US" altLang="ko-KR" sz="2800" b="0" i="1" smtClean="0">
+                              <a:latin typeface="Cambria Math" panose="02040503050406030204" pitchFamily="18" charset="0"/>
+                            </a:rPr>
+                            <m:t>𝑥</m:t>
+                          </m:r>
+                        </m:e>
+                        <m:sup>
+                          <m:r>
+                            <a:rPr lang="en-US" altLang="ko-KR" sz="2800" b="0" i="1" smtClean="0">
+                              <a:latin typeface="Cambria Math" panose="02040503050406030204" pitchFamily="18" charset="0"/>
+                            </a:rPr>
+                            <m:t>2</m:t>
+                          </m:r>
+                        </m:sup>
+                      </m:sSup>
+                    </m:oMath>
+                  </m:oMathPara>
+                </a14:m>
+                <a:endParaRPr lang="en-US" altLang="ko-KR" sz="2800" dirty="0"/>
+              </a:p>
+            </p:txBody>
+          </p:sp>
+        </mc:Choice>
+        <mc:Fallback xmlns="">
+          <p:sp>
+            <p:nvSpPr>
+              <p:cNvPr id="20" name="TextBox 19">
+                <a:extLst>
+                  <a:ext uri="{FF2B5EF4-FFF2-40B4-BE49-F238E27FC236}">
+                    <a16:creationId xmlns:a16="http://schemas.microsoft.com/office/drawing/2014/main" id="{329C5176-1B3B-4AEB-ACA2-9B27AF2B2FCA}"/>
+                  </a:ext>
+                </a:extLst>
+              </p:cNvPr>
+              <p:cNvSpPr txBox="1">
+                <a:spLocks noRot="1" noChangeAspect="1" noMove="1" noResize="1" noEditPoints="1" noAdjustHandles="1" noChangeArrowheads="1" noChangeShapeType="1" noTextEdit="1"/>
+              </p:cNvSpPr>
+              <p:nvPr/>
+            </p:nvSpPr>
+            <p:spPr>
+              <a:xfrm>
+                <a:off x="5619796" y="474607"/>
+                <a:ext cx="1415396" cy="578882"/>
+              </a:xfrm>
+              <a:prstGeom prst="roundRect">
+                <a:avLst/>
+              </a:prstGeom>
+              <a:blipFill>
+                <a:blip r:embed="rId3"/>
+                <a:stretch>
+                  <a:fillRect/>
+                </a:stretch>
+              </a:blipFill>
+              <a:ln>
+                <a:noFill/>
+              </a:ln>
+            </p:spPr>
+            <p:txBody>
+              <a:bodyPr/>
+              <a:lstStyle/>
+              <a:p>
+                <a:r>
+                  <a:rPr lang="ko-KR" altLang="en-US">
+                    <a:noFill/>
+                  </a:rPr>
+                  <a:t> </a:t>
+                </a:r>
+              </a:p>
+            </p:txBody>
+          </p:sp>
+        </mc:Fallback>
+      </mc:AlternateContent>
+    </p:spTree>
+    <p:extLst>
+      <p:ext uri="{BB962C8B-B14F-4D97-AF65-F5344CB8AC3E}">
+        <p14:creationId xmlns:p14="http://schemas.microsoft.com/office/powerpoint/2010/main" val="129811197"/>
+      </p:ext>
+    </p:extLst>
+  </p:cSld>
+  <p:clrMapOvr>
+    <a:masterClrMapping/>
+  </p:clrMapOvr>
+</p:sld>
+</file>
+
+<file path=ppt/slides/slide3.xml><?xml version="1.0" encoding="utf-8"?>
+<p:sld xmlns:a="http://schemas.openxmlformats.org/drawingml/2006/main" xmlns:r="http://schemas.openxmlformats.org/officeDocument/2006/relationships" xmlns:p="http://schemas.openxmlformats.org/presentationml/2006/main">
+  <p:cSld>
+    <p:spTree>
+      <p:nvGrpSpPr>
+        <p:cNvPr id="1" name=""/>
+        <p:cNvGrpSpPr/>
+        <p:nvPr/>
+      </p:nvGrpSpPr>
+      <p:grpSpPr>
+        <a:xfrm>
+          <a:off x="0" y="0"/>
+          <a:ext cx="0" cy="0"/>
+          <a:chOff x="0" y="0"/>
+          <a:chExt cx="0" cy="0"/>
+        </a:xfrm>
+      </p:grpSpPr>
+      <p:pic>
+        <p:nvPicPr>
+          <p:cNvPr id="4" name="그림 3">
+            <a:extLst>
+              <a:ext uri="{FF2B5EF4-FFF2-40B4-BE49-F238E27FC236}">
+                <a16:creationId xmlns:a16="http://schemas.microsoft.com/office/drawing/2014/main" id="{7692B2D0-E87F-4CEA-8559-C34C4A7B07C4}"/>
+              </a:ext>
+            </a:extLst>
+          </p:cNvPr>
+          <p:cNvPicPr>
+            <a:picLocks noChangeAspect="1"/>
+          </p:cNvPicPr>
+          <p:nvPr/>
+        </p:nvPicPr>
+        <p:blipFill>
+          <a:blip r:embed="rId2"/>
+          <a:stretch>
+            <a:fillRect/>
+          </a:stretch>
+        </p:blipFill>
+        <p:spPr>
+          <a:xfrm>
+            <a:off x="163718" y="1814660"/>
+            <a:ext cx="10940736" cy="3228680"/>
+          </a:xfrm>
+          <a:prstGeom prst="rect">
+            <a:avLst/>
+          </a:prstGeom>
+        </p:spPr>
+      </p:pic>
       <p:grpSp>
         <p:nvGrpSpPr>
-          <p:cNvPr id="28" name="그룹 27">
-            <a:extLst>
-              <a:ext uri="{FF2B5EF4-FFF2-40B4-BE49-F238E27FC236}">
-                <a16:creationId xmlns:a16="http://schemas.microsoft.com/office/drawing/2014/main" id="{35BB685C-447C-4A35-B90C-BBF1085510D5}"/>
+          <p:cNvPr id="27" name="그룹 26">
+            <a:extLst>
+              <a:ext uri="{FF2B5EF4-FFF2-40B4-BE49-F238E27FC236}">
+                <a16:creationId xmlns:a16="http://schemas.microsoft.com/office/drawing/2014/main" id="{C2765D57-1FA6-4E35-A821-E79D4AF47DE8}"/>
               </a:ext>
             </a:extLst>
           </p:cNvPr>
@@ -4054,18 +4769,194 @@
         </p:nvGrpSpPr>
         <p:grpSpPr>
           <a:xfrm>
-            <a:off x="163718" y="1785983"/>
-            <a:ext cx="11121732" cy="3257357"/>
-            <a:chOff x="163718" y="1785983"/>
-            <a:chExt cx="11121732" cy="3257357"/>
+            <a:off x="2139046" y="1785983"/>
+            <a:ext cx="9146404" cy="3255000"/>
+            <a:chOff x="2139046" y="1785983"/>
+            <a:chExt cx="9146404" cy="3255000"/>
           </a:xfrm>
         </p:grpSpPr>
+        <p:cxnSp>
+          <p:nvCxnSpPr>
+            <p:cNvPr id="6" name="직선 화살표 연결선 5">
+              <a:extLst>
+                <a:ext uri="{FF2B5EF4-FFF2-40B4-BE49-F238E27FC236}">
+                  <a16:creationId xmlns:a16="http://schemas.microsoft.com/office/drawing/2014/main" id="{D7DB7754-F1D3-49C6-A62C-3827DCBA8B00}"/>
+                </a:ext>
+              </a:extLst>
+            </p:cNvPr>
+            <p:cNvCxnSpPr>
+              <a:cxnSpLocks/>
+            </p:cNvCxnSpPr>
+            <p:nvPr/>
+          </p:nvCxnSpPr>
+          <p:spPr>
+            <a:xfrm>
+              <a:off x="2139046" y="2964180"/>
+              <a:ext cx="269580" cy="653853"/>
+            </a:xfrm>
+            <a:prstGeom prst="straightConnector1">
+              <a:avLst/>
+            </a:prstGeom>
+            <a:ln w="57150">
+              <a:solidFill>
+                <a:srgbClr val="FF0000"/>
+              </a:solidFill>
+              <a:tailEnd type="triangle"/>
+            </a:ln>
+          </p:spPr>
+          <p:style>
+            <a:lnRef idx="1">
+              <a:schemeClr val="accent1"/>
+            </a:lnRef>
+            <a:fillRef idx="0">
+              <a:schemeClr val="accent1"/>
+            </a:fillRef>
+            <a:effectRef idx="0">
+              <a:schemeClr val="accent1"/>
+            </a:effectRef>
+            <a:fontRef idx="minor">
+              <a:schemeClr val="tx1"/>
+            </a:fontRef>
+          </p:style>
+        </p:cxnSp>
+        <p:cxnSp>
+          <p:nvCxnSpPr>
+            <p:cNvPr id="9" name="직선 화살표 연결선 8">
+              <a:extLst>
+                <a:ext uri="{FF2B5EF4-FFF2-40B4-BE49-F238E27FC236}">
+                  <a16:creationId xmlns:a16="http://schemas.microsoft.com/office/drawing/2014/main" id="{09C90FEC-5A86-49A5-8A3B-FFF54265A8E3}"/>
+                </a:ext>
+              </a:extLst>
+            </p:cNvPr>
+            <p:cNvCxnSpPr>
+              <a:cxnSpLocks/>
+            </p:cNvCxnSpPr>
+            <p:nvPr/>
+          </p:nvCxnSpPr>
+          <p:spPr>
+            <a:xfrm>
+              <a:off x="5450263" y="3640668"/>
+              <a:ext cx="386499" cy="388359"/>
+            </a:xfrm>
+            <a:prstGeom prst="straightConnector1">
+              <a:avLst/>
+            </a:prstGeom>
+            <a:ln w="57150">
+              <a:solidFill>
+                <a:srgbClr val="FF0000"/>
+              </a:solidFill>
+              <a:tailEnd type="triangle"/>
+            </a:ln>
+          </p:spPr>
+          <p:style>
+            <a:lnRef idx="1">
+              <a:schemeClr val="accent1"/>
+            </a:lnRef>
+            <a:fillRef idx="0">
+              <a:schemeClr val="accent1"/>
+            </a:fillRef>
+            <a:effectRef idx="0">
+              <a:schemeClr val="accent1"/>
+            </a:effectRef>
+            <a:fontRef idx="minor">
+              <a:schemeClr val="tx1"/>
+            </a:fontRef>
+          </p:style>
+        </p:cxnSp>
+        <p:cxnSp>
+          <p:nvCxnSpPr>
+            <p:cNvPr id="12" name="직선 화살표 연결선 11">
+              <a:extLst>
+                <a:ext uri="{FF2B5EF4-FFF2-40B4-BE49-F238E27FC236}">
+                  <a16:creationId xmlns:a16="http://schemas.microsoft.com/office/drawing/2014/main" id="{5E42743C-E681-44C1-8F94-C9F08EE94C22}"/>
+                </a:ext>
+              </a:extLst>
+            </p:cNvPr>
+            <p:cNvCxnSpPr>
+              <a:cxnSpLocks/>
+            </p:cNvCxnSpPr>
+            <p:nvPr/>
+          </p:nvCxnSpPr>
+          <p:spPr>
+            <a:xfrm>
+              <a:off x="5184742" y="3101419"/>
+              <a:ext cx="221529" cy="516614"/>
+            </a:xfrm>
+            <a:prstGeom prst="straightConnector1">
+              <a:avLst/>
+            </a:prstGeom>
+            <a:ln w="57150">
+              <a:solidFill>
+                <a:srgbClr val="FF0000"/>
+              </a:solidFill>
+              <a:tailEnd type="triangle"/>
+            </a:ln>
+          </p:spPr>
+          <p:style>
+            <a:lnRef idx="1">
+              <a:schemeClr val="accent1"/>
+            </a:lnRef>
+            <a:fillRef idx="0">
+              <a:schemeClr val="accent1"/>
+            </a:fillRef>
+            <a:effectRef idx="0">
+              <a:schemeClr val="accent1"/>
+            </a:effectRef>
+            <a:fontRef idx="minor">
+              <a:schemeClr val="tx1"/>
+            </a:fontRef>
+          </p:style>
+        </p:cxnSp>
+        <p:cxnSp>
+          <p:nvCxnSpPr>
+            <p:cNvPr id="15" name="직선 화살표 연결선 14">
+              <a:extLst>
+                <a:ext uri="{FF2B5EF4-FFF2-40B4-BE49-F238E27FC236}">
+                  <a16:creationId xmlns:a16="http://schemas.microsoft.com/office/drawing/2014/main" id="{BC6C7C61-B860-4A91-8571-D82AD07D2985}"/>
+                </a:ext>
+              </a:extLst>
+            </p:cNvPr>
+            <p:cNvCxnSpPr>
+              <a:cxnSpLocks/>
+            </p:cNvCxnSpPr>
+            <p:nvPr/>
+          </p:nvCxnSpPr>
+          <p:spPr>
+            <a:xfrm flipV="1">
+              <a:off x="8921371" y="2149312"/>
+              <a:ext cx="0" cy="1089425"/>
+            </a:xfrm>
+            <a:prstGeom prst="straightConnector1">
+              <a:avLst/>
+            </a:prstGeom>
+            <a:ln w="57150">
+              <a:solidFill>
+                <a:srgbClr val="FF0000"/>
+              </a:solidFill>
+              <a:tailEnd type="triangle"/>
+            </a:ln>
+          </p:spPr>
+          <p:style>
+            <a:lnRef idx="1">
+              <a:schemeClr val="accent1"/>
+            </a:lnRef>
+            <a:fillRef idx="0">
+              <a:schemeClr val="accent1"/>
+            </a:fillRef>
+            <a:effectRef idx="0">
+              <a:schemeClr val="accent1"/>
+            </a:effectRef>
+            <a:fontRef idx="minor">
+              <a:schemeClr val="tx1"/>
+            </a:fontRef>
+          </p:style>
+        </p:cxnSp>
         <p:pic>
           <p:nvPicPr>
-            <p:cNvPr id="4" name="그림 3">
+            <p:cNvPr id="20" name="그림 19">
               <a:extLst>
                 <a:ext uri="{FF2B5EF4-FFF2-40B4-BE49-F238E27FC236}">
-                  <a16:creationId xmlns:a16="http://schemas.microsoft.com/office/drawing/2014/main" id="{7692B2D0-E87F-4CEA-8559-C34C4A7B07C4}"/>
+                  <a16:creationId xmlns:a16="http://schemas.microsoft.com/office/drawing/2014/main" id="{50932BD1-E3D4-499D-95CA-4A42A5236EE7}"/>
                 </a:ext>
               </a:extLst>
             </p:cNvPr>
@@ -4074,364 +4965,137 @@
             </p:cNvPicPr>
             <p:nvPr/>
           </p:nvPicPr>
-          <p:blipFill>
-            <a:blip r:embed="rId2"/>
-            <a:stretch>
-              <a:fillRect/>
-            </a:stretch>
+          <p:blipFill rotWithShape="1">
+            <a:blip r:embed="rId3"/>
+            <a:srcRect l="80514" r="10616"/>
+            <a:stretch/>
           </p:blipFill>
           <p:spPr>
             <a:xfrm>
-              <a:off x="163718" y="1814660"/>
-              <a:ext cx="10940736" cy="3228680"/>
+              <a:off x="10306316" y="1785983"/>
+              <a:ext cx="386500" cy="3255000"/>
             </a:xfrm>
             <a:prstGeom prst="rect">
               <a:avLst/>
             </a:prstGeom>
           </p:spPr>
         </p:pic>
-        <p:grpSp>
-          <p:nvGrpSpPr>
-            <p:cNvPr id="27" name="그룹 26">
+        <p:sp>
+          <p:nvSpPr>
+            <p:cNvPr id="21" name="TextBox 20">
               <a:extLst>
                 <a:ext uri="{FF2B5EF4-FFF2-40B4-BE49-F238E27FC236}">
-                  <a16:creationId xmlns:a16="http://schemas.microsoft.com/office/drawing/2014/main" id="{C2765D57-1FA6-4E35-A821-E79D4AF47DE8}"/>
+                  <a16:creationId xmlns:a16="http://schemas.microsoft.com/office/drawing/2014/main" id="{304036DD-579B-4240-B70C-BEE2DE720921}"/>
                 </a:ext>
               </a:extLst>
             </p:cNvPr>
-            <p:cNvGrpSpPr/>
+            <p:cNvSpPr txBox="1"/>
             <p:nvPr/>
-          </p:nvGrpSpPr>
-          <p:grpSpPr>
+          </p:nvSpPr>
+          <p:spPr>
             <a:xfrm>
-              <a:off x="2139046" y="1785983"/>
-              <a:ext cx="9146404" cy="3255000"/>
-              <a:chOff x="2139046" y="1785983"/>
-              <a:chExt cx="9146404" cy="3255000"/>
+              <a:off x="10562175" y="4453321"/>
+              <a:ext cx="723275" cy="307777"/>
             </a:xfrm>
-          </p:grpSpPr>
-          <p:cxnSp>
-            <p:nvCxnSpPr>
-              <p:cNvPr id="6" name="직선 화살표 연결선 5">
-                <a:extLst>
-                  <a:ext uri="{FF2B5EF4-FFF2-40B4-BE49-F238E27FC236}">
-                    <a16:creationId xmlns:a16="http://schemas.microsoft.com/office/drawing/2014/main" id="{D7DB7754-F1D3-49C6-A62C-3827DCBA8B00}"/>
-                  </a:ext>
-                </a:extLst>
-              </p:cNvPr>
-              <p:cNvCxnSpPr>
-                <a:cxnSpLocks/>
-              </p:cNvCxnSpPr>
-              <p:nvPr/>
-            </p:nvCxnSpPr>
-            <p:spPr>
-              <a:xfrm>
-                <a:off x="2139046" y="2964180"/>
-                <a:ext cx="269580" cy="653853"/>
-              </a:xfrm>
-              <a:prstGeom prst="straightConnector1">
-                <a:avLst/>
-              </a:prstGeom>
-              <a:ln w="57150">
-                <a:solidFill>
-                  <a:srgbClr val="FF0000"/>
-                </a:solidFill>
-                <a:tailEnd type="triangle"/>
-              </a:ln>
-            </p:spPr>
-            <p:style>
-              <a:lnRef idx="1">
-                <a:schemeClr val="accent1"/>
-              </a:lnRef>
-              <a:fillRef idx="0">
-                <a:schemeClr val="accent1"/>
-              </a:fillRef>
-              <a:effectRef idx="0">
-                <a:schemeClr val="accent1"/>
-              </a:effectRef>
-              <a:fontRef idx="minor">
+            <a:prstGeom prst="rect">
+              <a:avLst/>
+            </a:prstGeom>
+            <a:noFill/>
+          </p:spPr>
+          <p:txBody>
+            <a:bodyPr wrap="none" rtlCol="0">
+              <a:spAutoFit/>
+            </a:bodyPr>
+            <a:lstStyle/>
+            <a:p>
+              <a:r>
+                <a:rPr lang="ko-KR" altLang="en-US" sz="1400" dirty="0"/>
+                <a:t>시작점</a:t>
+              </a:r>
+            </a:p>
+          </p:txBody>
+        </p:sp>
+        <p:sp>
+          <p:nvSpPr>
+            <p:cNvPr id="22" name="TextBox 21">
+              <a:extLst>
+                <a:ext uri="{FF2B5EF4-FFF2-40B4-BE49-F238E27FC236}">
+                  <a16:creationId xmlns:a16="http://schemas.microsoft.com/office/drawing/2014/main" id="{0A89143E-2963-422F-84EF-87F703DA8F73}"/>
+                </a:ext>
+              </a:extLst>
+            </p:cNvPr>
+            <p:cNvSpPr txBox="1"/>
+            <p:nvPr/>
+          </p:nvSpPr>
+          <p:spPr>
+            <a:xfrm>
+              <a:off x="10541395" y="1992926"/>
+              <a:ext cx="543739" cy="307777"/>
+            </a:xfrm>
+            <a:prstGeom prst="rect">
+              <a:avLst/>
+            </a:prstGeom>
+            <a:noFill/>
+          </p:spPr>
+          <p:txBody>
+            <a:bodyPr wrap="none" rtlCol="0">
+              <a:spAutoFit/>
+            </a:bodyPr>
+            <a:lstStyle/>
+            <a:p>
+              <a:r>
+                <a:rPr lang="ko-KR" altLang="en-US" sz="1400"/>
+                <a:t>끝점</a:t>
+              </a:r>
+              <a:endParaRPr lang="ko-KR" altLang="en-US" sz="1400" dirty="0"/>
+            </a:p>
+          </p:txBody>
+        </p:sp>
+        <p:cxnSp>
+          <p:nvCxnSpPr>
+            <p:cNvPr id="23" name="직선 화살표 연결선 22">
+              <a:extLst>
+                <a:ext uri="{FF2B5EF4-FFF2-40B4-BE49-F238E27FC236}">
+                  <a16:creationId xmlns:a16="http://schemas.microsoft.com/office/drawing/2014/main" id="{32A5347C-FC5D-4463-A04A-C426A57D2DDE}"/>
+                </a:ext>
+              </a:extLst>
+            </p:cNvPr>
+            <p:cNvCxnSpPr>
+              <a:cxnSpLocks/>
+            </p:cNvCxnSpPr>
+            <p:nvPr/>
+          </p:nvCxnSpPr>
+          <p:spPr>
+            <a:xfrm flipV="1">
+              <a:off x="10721097" y="2368992"/>
+              <a:ext cx="0" cy="2026765"/>
+            </a:xfrm>
+            <a:prstGeom prst="straightConnector1">
+              <a:avLst/>
+            </a:prstGeom>
+            <a:ln w="12700">
+              <a:solidFill>
                 <a:schemeClr val="tx1"/>
-              </a:fontRef>
-            </p:style>
-          </p:cxnSp>
-          <p:cxnSp>
-            <p:nvCxnSpPr>
-              <p:cNvPr id="9" name="직선 화살표 연결선 8">
-                <a:extLst>
-                  <a:ext uri="{FF2B5EF4-FFF2-40B4-BE49-F238E27FC236}">
-                    <a16:creationId xmlns:a16="http://schemas.microsoft.com/office/drawing/2014/main" id="{09C90FEC-5A86-49A5-8A3B-FFF54265A8E3}"/>
-                  </a:ext>
-                </a:extLst>
-              </p:cNvPr>
-              <p:cNvCxnSpPr>
-                <a:cxnSpLocks/>
-              </p:cNvCxnSpPr>
-              <p:nvPr/>
-            </p:nvCxnSpPr>
-            <p:spPr>
-              <a:xfrm>
-                <a:off x="5450263" y="3640668"/>
-                <a:ext cx="386499" cy="388359"/>
-              </a:xfrm>
-              <a:prstGeom prst="straightConnector1">
-                <a:avLst/>
-              </a:prstGeom>
-              <a:ln w="57150">
-                <a:solidFill>
-                  <a:srgbClr val="FF0000"/>
-                </a:solidFill>
-                <a:tailEnd type="triangle"/>
-              </a:ln>
-            </p:spPr>
-            <p:style>
-              <a:lnRef idx="1">
-                <a:schemeClr val="accent1"/>
-              </a:lnRef>
-              <a:fillRef idx="0">
-                <a:schemeClr val="accent1"/>
-              </a:fillRef>
-              <a:effectRef idx="0">
-                <a:schemeClr val="accent1"/>
-              </a:effectRef>
-              <a:fontRef idx="minor">
-                <a:schemeClr val="tx1"/>
-              </a:fontRef>
-            </p:style>
-          </p:cxnSp>
-          <p:cxnSp>
-            <p:nvCxnSpPr>
-              <p:cNvPr id="12" name="직선 화살표 연결선 11">
-                <a:extLst>
-                  <a:ext uri="{FF2B5EF4-FFF2-40B4-BE49-F238E27FC236}">
-                    <a16:creationId xmlns:a16="http://schemas.microsoft.com/office/drawing/2014/main" id="{5E42743C-E681-44C1-8F94-C9F08EE94C22}"/>
-                  </a:ext>
-                </a:extLst>
-              </p:cNvPr>
-              <p:cNvCxnSpPr>
-                <a:cxnSpLocks/>
-              </p:cNvCxnSpPr>
-              <p:nvPr/>
-            </p:nvCxnSpPr>
-            <p:spPr>
-              <a:xfrm>
-                <a:off x="5184742" y="3101419"/>
-                <a:ext cx="221529" cy="516614"/>
-              </a:xfrm>
-              <a:prstGeom prst="straightConnector1">
-                <a:avLst/>
-              </a:prstGeom>
-              <a:ln w="57150">
-                <a:solidFill>
-                  <a:srgbClr val="FF0000"/>
-                </a:solidFill>
-                <a:tailEnd type="triangle"/>
-              </a:ln>
-            </p:spPr>
-            <p:style>
-              <a:lnRef idx="1">
-                <a:schemeClr val="accent1"/>
-              </a:lnRef>
-              <a:fillRef idx="0">
-                <a:schemeClr val="accent1"/>
-              </a:fillRef>
-              <a:effectRef idx="0">
-                <a:schemeClr val="accent1"/>
-              </a:effectRef>
-              <a:fontRef idx="minor">
-                <a:schemeClr val="tx1"/>
-              </a:fontRef>
-            </p:style>
-          </p:cxnSp>
-          <p:cxnSp>
-            <p:nvCxnSpPr>
-              <p:cNvPr id="15" name="직선 화살표 연결선 14">
-                <a:extLst>
-                  <a:ext uri="{FF2B5EF4-FFF2-40B4-BE49-F238E27FC236}">
-                    <a16:creationId xmlns:a16="http://schemas.microsoft.com/office/drawing/2014/main" id="{BC6C7C61-B860-4A91-8571-D82AD07D2985}"/>
-                  </a:ext>
-                </a:extLst>
-              </p:cNvPr>
-              <p:cNvCxnSpPr>
-                <a:cxnSpLocks/>
-              </p:cNvCxnSpPr>
-              <p:nvPr/>
-            </p:nvCxnSpPr>
-            <p:spPr>
-              <a:xfrm flipV="1">
-                <a:off x="8921371" y="2149312"/>
-                <a:ext cx="0" cy="1089425"/>
-              </a:xfrm>
-              <a:prstGeom prst="straightConnector1">
-                <a:avLst/>
-              </a:prstGeom>
-              <a:ln w="57150">
-                <a:solidFill>
-                  <a:srgbClr val="FF0000"/>
-                </a:solidFill>
-                <a:tailEnd type="triangle"/>
-              </a:ln>
-            </p:spPr>
-            <p:style>
-              <a:lnRef idx="1">
-                <a:schemeClr val="accent1"/>
-              </a:lnRef>
-              <a:fillRef idx="0">
-                <a:schemeClr val="accent1"/>
-              </a:fillRef>
-              <a:effectRef idx="0">
-                <a:schemeClr val="accent1"/>
-              </a:effectRef>
-              <a:fontRef idx="minor">
-                <a:schemeClr val="tx1"/>
-              </a:fontRef>
-            </p:style>
-          </p:cxnSp>
-          <p:pic>
-            <p:nvPicPr>
-              <p:cNvPr id="20" name="그림 19">
-                <a:extLst>
-                  <a:ext uri="{FF2B5EF4-FFF2-40B4-BE49-F238E27FC236}">
-                    <a16:creationId xmlns:a16="http://schemas.microsoft.com/office/drawing/2014/main" id="{50932BD1-E3D4-499D-95CA-4A42A5236EE7}"/>
-                  </a:ext>
-                </a:extLst>
-              </p:cNvPr>
-              <p:cNvPicPr>
-                <a:picLocks noChangeAspect="1"/>
-              </p:cNvPicPr>
-              <p:nvPr/>
-            </p:nvPicPr>
-            <p:blipFill rotWithShape="1">
-              <a:blip r:embed="rId3"/>
-              <a:srcRect l="80514" r="10616"/>
-              <a:stretch/>
-            </p:blipFill>
-            <p:spPr>
-              <a:xfrm>
-                <a:off x="10306316" y="1785983"/>
-                <a:ext cx="386500" cy="3255000"/>
-              </a:xfrm>
-              <a:prstGeom prst="rect">
-                <a:avLst/>
-              </a:prstGeom>
-            </p:spPr>
-          </p:pic>
-          <p:sp>
-            <p:nvSpPr>
-              <p:cNvPr id="21" name="TextBox 20">
-                <a:extLst>
-                  <a:ext uri="{FF2B5EF4-FFF2-40B4-BE49-F238E27FC236}">
-                    <a16:creationId xmlns:a16="http://schemas.microsoft.com/office/drawing/2014/main" id="{304036DD-579B-4240-B70C-BEE2DE720921}"/>
-                  </a:ext>
-                </a:extLst>
-              </p:cNvPr>
-              <p:cNvSpPr txBox="1"/>
-              <p:nvPr/>
-            </p:nvSpPr>
-            <p:spPr>
-              <a:xfrm>
-                <a:off x="10562175" y="4453321"/>
-                <a:ext cx="723275" cy="307777"/>
-              </a:xfrm>
-              <a:prstGeom prst="rect">
-                <a:avLst/>
-              </a:prstGeom>
-              <a:noFill/>
-            </p:spPr>
-            <p:txBody>
-              <a:bodyPr wrap="none" rtlCol="0">
-                <a:spAutoFit/>
-              </a:bodyPr>
-              <a:lstStyle/>
-              <a:p>
-                <a:r>
-                  <a:rPr lang="ko-KR" altLang="en-US" sz="1400" dirty="0"/>
-                  <a:t>시작점</a:t>
-                </a:r>
-              </a:p>
-            </p:txBody>
-          </p:sp>
-          <p:sp>
-            <p:nvSpPr>
-              <p:cNvPr id="22" name="TextBox 21">
-                <a:extLst>
-                  <a:ext uri="{FF2B5EF4-FFF2-40B4-BE49-F238E27FC236}">
-                    <a16:creationId xmlns:a16="http://schemas.microsoft.com/office/drawing/2014/main" id="{0A89143E-2963-422F-84EF-87F703DA8F73}"/>
-                  </a:ext>
-                </a:extLst>
-              </p:cNvPr>
-              <p:cNvSpPr txBox="1"/>
-              <p:nvPr/>
-            </p:nvSpPr>
-            <p:spPr>
-              <a:xfrm>
-                <a:off x="10541395" y="1992926"/>
-                <a:ext cx="543739" cy="307777"/>
-              </a:xfrm>
-              <a:prstGeom prst="rect">
-                <a:avLst/>
-              </a:prstGeom>
-              <a:noFill/>
-            </p:spPr>
-            <p:txBody>
-              <a:bodyPr wrap="none" rtlCol="0">
-                <a:spAutoFit/>
-              </a:bodyPr>
-              <a:lstStyle/>
-              <a:p>
-                <a:r>
-                  <a:rPr lang="ko-KR" altLang="en-US" sz="1400"/>
-                  <a:t>끝점</a:t>
-                </a:r>
-                <a:endParaRPr lang="ko-KR" altLang="en-US" sz="1400" dirty="0"/>
-              </a:p>
-            </p:txBody>
-          </p:sp>
-          <p:cxnSp>
-            <p:nvCxnSpPr>
-              <p:cNvPr id="23" name="직선 화살표 연결선 22">
-                <a:extLst>
-                  <a:ext uri="{FF2B5EF4-FFF2-40B4-BE49-F238E27FC236}">
-                    <a16:creationId xmlns:a16="http://schemas.microsoft.com/office/drawing/2014/main" id="{32A5347C-FC5D-4463-A04A-C426A57D2DDE}"/>
-                  </a:ext>
-                </a:extLst>
-              </p:cNvPr>
-              <p:cNvCxnSpPr>
-                <a:cxnSpLocks/>
-              </p:cNvCxnSpPr>
-              <p:nvPr/>
-            </p:nvCxnSpPr>
-            <p:spPr>
-              <a:xfrm flipV="1">
-                <a:off x="10721097" y="2368992"/>
-                <a:ext cx="0" cy="2026765"/>
-              </a:xfrm>
-              <a:prstGeom prst="straightConnector1">
-                <a:avLst/>
-              </a:prstGeom>
-              <a:ln w="12700">
-                <a:solidFill>
-                  <a:schemeClr val="tx1"/>
-                </a:solidFill>
-                <a:prstDash val="dash"/>
-                <a:tailEnd type="triangle"/>
-              </a:ln>
-            </p:spPr>
-            <p:style>
-              <a:lnRef idx="1">
-                <a:schemeClr val="accent1"/>
-              </a:lnRef>
-              <a:fillRef idx="0">
-                <a:schemeClr val="accent1"/>
-              </a:fillRef>
-              <a:effectRef idx="0">
-                <a:schemeClr val="accent1"/>
-              </a:effectRef>
-              <a:fontRef idx="minor">
-                <a:schemeClr val="tx1"/>
-              </a:fontRef>
-            </p:style>
-          </p:cxnSp>
-        </p:grpSp>
+              </a:solidFill>
+              <a:prstDash val="dash"/>
+              <a:tailEnd type="triangle"/>
+            </a:ln>
+          </p:spPr>
+          <p:style>
+            <a:lnRef idx="1">
+              <a:schemeClr val="accent1"/>
+            </a:lnRef>
+            <a:fillRef idx="0">
+              <a:schemeClr val="accent1"/>
+            </a:fillRef>
+            <a:effectRef idx="0">
+              <a:schemeClr val="accent1"/>
+            </a:effectRef>
+            <a:fontRef idx="minor">
+              <a:schemeClr val="tx1"/>
+            </a:fontRef>
+          </p:style>
+        </p:cxnSp>
       </p:grpSp>
     </p:spTree>
     <p:extLst>
@@ -4446,7 +5110,410 @@
 </p:sld>
 </file>
 
-<file path=ppt/slides/slide3.xml><?xml version="1.0" encoding="utf-8"?>
+<file path=ppt/slides/slide4.xml><?xml version="1.0" encoding="utf-8"?>
+<p:sld xmlns:a="http://schemas.openxmlformats.org/drawingml/2006/main" xmlns:r="http://schemas.openxmlformats.org/officeDocument/2006/relationships" xmlns:p="http://schemas.openxmlformats.org/presentationml/2006/main">
+  <p:cSld>
+    <p:spTree>
+      <p:nvGrpSpPr>
+        <p:cNvPr id="1" name=""/>
+        <p:cNvGrpSpPr/>
+        <p:nvPr/>
+      </p:nvGrpSpPr>
+      <p:grpSpPr>
+        <a:xfrm>
+          <a:off x="0" y="0"/>
+          <a:ext cx="0" cy="0"/>
+          <a:chOff x="0" y="0"/>
+          <a:chExt cx="0" cy="0"/>
+        </a:xfrm>
+      </p:grpSpPr>
+      <p:pic>
+        <p:nvPicPr>
+          <p:cNvPr id="5" name="Picture 4">
+            <a:extLst>
+              <a:ext uri="{FF2B5EF4-FFF2-40B4-BE49-F238E27FC236}">
+                <a16:creationId xmlns:a16="http://schemas.microsoft.com/office/drawing/2014/main" id="{DE7484D3-1EA8-2140-1AC6-79DF4BF8D821}"/>
+              </a:ext>
+            </a:extLst>
+          </p:cNvPr>
+          <p:cNvPicPr>
+            <a:picLocks noChangeAspect="1"/>
+          </p:cNvPicPr>
+          <p:nvPr/>
+        </p:nvPicPr>
+        <p:blipFill>
+          <a:blip r:embed="rId2"/>
+          <a:stretch>
+            <a:fillRect/>
+          </a:stretch>
+        </p:blipFill>
+        <p:spPr>
+          <a:xfrm>
+            <a:off x="151970" y="1801876"/>
+            <a:ext cx="10983085" cy="3254248"/>
+          </a:xfrm>
+          <a:prstGeom prst="rect">
+            <a:avLst/>
+          </a:prstGeom>
+        </p:spPr>
+      </p:pic>
+      <p:grpSp>
+        <p:nvGrpSpPr>
+          <p:cNvPr id="7" name="그룹 26">
+            <a:extLst>
+              <a:ext uri="{FF2B5EF4-FFF2-40B4-BE49-F238E27FC236}">
+                <a16:creationId xmlns:a16="http://schemas.microsoft.com/office/drawing/2014/main" id="{D103C476-61CD-1FEB-C81B-D82D36516B25}"/>
+              </a:ext>
+            </a:extLst>
+          </p:cNvPr>
+          <p:cNvGrpSpPr/>
+          <p:nvPr/>
+        </p:nvGrpSpPr>
+        <p:grpSpPr>
+          <a:xfrm>
+            <a:off x="2139046" y="1785983"/>
+            <a:ext cx="8987130" cy="3255000"/>
+            <a:chOff x="2139046" y="1785983"/>
+            <a:chExt cx="8987130" cy="3255000"/>
+          </a:xfrm>
+        </p:grpSpPr>
+        <p:cxnSp>
+          <p:nvCxnSpPr>
+            <p:cNvPr id="8" name="직선 화살표 연결선 5">
+              <a:extLst>
+                <a:ext uri="{FF2B5EF4-FFF2-40B4-BE49-F238E27FC236}">
+                  <a16:creationId xmlns:a16="http://schemas.microsoft.com/office/drawing/2014/main" id="{F65AB04F-694F-231D-DCF9-AD41117A5641}"/>
+                </a:ext>
+              </a:extLst>
+            </p:cNvPr>
+            <p:cNvCxnSpPr>
+              <a:cxnSpLocks/>
+            </p:cNvCxnSpPr>
+            <p:nvPr/>
+          </p:nvCxnSpPr>
+          <p:spPr>
+            <a:xfrm>
+              <a:off x="2139046" y="2964180"/>
+              <a:ext cx="269580" cy="653853"/>
+            </a:xfrm>
+            <a:prstGeom prst="straightConnector1">
+              <a:avLst/>
+            </a:prstGeom>
+            <a:ln w="57150">
+              <a:solidFill>
+                <a:srgbClr val="FF0000"/>
+              </a:solidFill>
+              <a:tailEnd type="triangle"/>
+            </a:ln>
+          </p:spPr>
+          <p:style>
+            <a:lnRef idx="1">
+              <a:schemeClr val="accent1"/>
+            </a:lnRef>
+            <a:fillRef idx="0">
+              <a:schemeClr val="accent1"/>
+            </a:fillRef>
+            <a:effectRef idx="0">
+              <a:schemeClr val="accent1"/>
+            </a:effectRef>
+            <a:fontRef idx="minor">
+              <a:schemeClr val="tx1"/>
+            </a:fontRef>
+          </p:style>
+        </p:cxnSp>
+        <p:cxnSp>
+          <p:nvCxnSpPr>
+            <p:cNvPr id="10" name="직선 화살표 연결선 8">
+              <a:extLst>
+                <a:ext uri="{FF2B5EF4-FFF2-40B4-BE49-F238E27FC236}">
+                  <a16:creationId xmlns:a16="http://schemas.microsoft.com/office/drawing/2014/main" id="{B1361A4F-89F7-2E25-D566-0C187E3354BD}"/>
+                </a:ext>
+              </a:extLst>
+            </p:cNvPr>
+            <p:cNvCxnSpPr>
+              <a:cxnSpLocks/>
+            </p:cNvCxnSpPr>
+            <p:nvPr/>
+          </p:nvCxnSpPr>
+          <p:spPr>
+            <a:xfrm>
+              <a:off x="5450263" y="3640668"/>
+              <a:ext cx="386499" cy="388359"/>
+            </a:xfrm>
+            <a:prstGeom prst="straightConnector1">
+              <a:avLst/>
+            </a:prstGeom>
+            <a:ln w="57150">
+              <a:solidFill>
+                <a:srgbClr val="FF0000"/>
+              </a:solidFill>
+              <a:tailEnd type="triangle"/>
+            </a:ln>
+          </p:spPr>
+          <p:style>
+            <a:lnRef idx="1">
+              <a:schemeClr val="accent1"/>
+            </a:lnRef>
+            <a:fillRef idx="0">
+              <a:schemeClr val="accent1"/>
+            </a:fillRef>
+            <a:effectRef idx="0">
+              <a:schemeClr val="accent1"/>
+            </a:effectRef>
+            <a:fontRef idx="minor">
+              <a:schemeClr val="tx1"/>
+            </a:fontRef>
+          </p:style>
+        </p:cxnSp>
+        <p:cxnSp>
+          <p:nvCxnSpPr>
+            <p:cNvPr id="11" name="직선 화살표 연결선 11">
+              <a:extLst>
+                <a:ext uri="{FF2B5EF4-FFF2-40B4-BE49-F238E27FC236}">
+                  <a16:creationId xmlns:a16="http://schemas.microsoft.com/office/drawing/2014/main" id="{D8C8D565-3B80-4F2B-AFE0-FA9247FCA75E}"/>
+                </a:ext>
+              </a:extLst>
+            </p:cNvPr>
+            <p:cNvCxnSpPr>
+              <a:cxnSpLocks/>
+            </p:cNvCxnSpPr>
+            <p:nvPr/>
+          </p:nvCxnSpPr>
+          <p:spPr>
+            <a:xfrm>
+              <a:off x="5184742" y="3101419"/>
+              <a:ext cx="221529" cy="516614"/>
+            </a:xfrm>
+            <a:prstGeom prst="straightConnector1">
+              <a:avLst/>
+            </a:prstGeom>
+            <a:ln w="57150">
+              <a:solidFill>
+                <a:srgbClr val="FF0000"/>
+              </a:solidFill>
+              <a:tailEnd type="triangle"/>
+            </a:ln>
+          </p:spPr>
+          <p:style>
+            <a:lnRef idx="1">
+              <a:schemeClr val="accent1"/>
+            </a:lnRef>
+            <a:fillRef idx="0">
+              <a:schemeClr val="accent1"/>
+            </a:fillRef>
+            <a:effectRef idx="0">
+              <a:schemeClr val="accent1"/>
+            </a:effectRef>
+            <a:fontRef idx="minor">
+              <a:schemeClr val="tx1"/>
+            </a:fontRef>
+          </p:style>
+        </p:cxnSp>
+        <p:cxnSp>
+          <p:nvCxnSpPr>
+            <p:cNvPr id="13" name="직선 화살표 연결선 14">
+              <a:extLst>
+                <a:ext uri="{FF2B5EF4-FFF2-40B4-BE49-F238E27FC236}">
+                  <a16:creationId xmlns:a16="http://schemas.microsoft.com/office/drawing/2014/main" id="{91466912-D39E-5B72-8FCC-06CDA6E9406E}"/>
+                </a:ext>
+              </a:extLst>
+            </p:cNvPr>
+            <p:cNvCxnSpPr>
+              <a:cxnSpLocks/>
+            </p:cNvCxnSpPr>
+            <p:nvPr/>
+          </p:nvCxnSpPr>
+          <p:spPr>
+            <a:xfrm flipV="1">
+              <a:off x="8921371" y="2149312"/>
+              <a:ext cx="0" cy="1089425"/>
+            </a:xfrm>
+            <a:prstGeom prst="straightConnector1">
+              <a:avLst/>
+            </a:prstGeom>
+            <a:ln w="57150">
+              <a:solidFill>
+                <a:srgbClr val="FF0000"/>
+              </a:solidFill>
+              <a:tailEnd type="triangle"/>
+            </a:ln>
+          </p:spPr>
+          <p:style>
+            <a:lnRef idx="1">
+              <a:schemeClr val="accent1"/>
+            </a:lnRef>
+            <a:fillRef idx="0">
+              <a:schemeClr val="accent1"/>
+            </a:fillRef>
+            <a:effectRef idx="0">
+              <a:schemeClr val="accent1"/>
+            </a:effectRef>
+            <a:fontRef idx="minor">
+              <a:schemeClr val="tx1"/>
+            </a:fontRef>
+          </p:style>
+        </p:cxnSp>
+        <p:pic>
+          <p:nvPicPr>
+            <p:cNvPr id="14" name="그림 19">
+              <a:extLst>
+                <a:ext uri="{FF2B5EF4-FFF2-40B4-BE49-F238E27FC236}">
+                  <a16:creationId xmlns:a16="http://schemas.microsoft.com/office/drawing/2014/main" id="{5E911DBA-C43E-6F15-97C7-0116B9ED8783}"/>
+                </a:ext>
+              </a:extLst>
+            </p:cNvPr>
+            <p:cNvPicPr>
+              <a:picLocks noChangeAspect="1"/>
+            </p:cNvPicPr>
+            <p:nvPr/>
+          </p:nvPicPr>
+          <p:blipFill rotWithShape="1">
+            <a:blip r:embed="rId3"/>
+            <a:srcRect l="80514" r="10616"/>
+            <a:stretch/>
+          </p:blipFill>
+          <p:spPr>
+            <a:xfrm>
+              <a:off x="10306316" y="1785983"/>
+              <a:ext cx="386500" cy="3255000"/>
+            </a:xfrm>
+            <a:prstGeom prst="rect">
+              <a:avLst/>
+            </a:prstGeom>
+          </p:spPr>
+        </p:pic>
+        <p:sp>
+          <p:nvSpPr>
+            <p:cNvPr id="16" name="TextBox 15">
+              <a:extLst>
+                <a:ext uri="{FF2B5EF4-FFF2-40B4-BE49-F238E27FC236}">
+                  <a16:creationId xmlns:a16="http://schemas.microsoft.com/office/drawing/2014/main" id="{8D48AC60-1F4A-662B-F88F-4CD48D8E799F}"/>
+                </a:ext>
+              </a:extLst>
+            </p:cNvPr>
+            <p:cNvSpPr txBox="1"/>
+            <p:nvPr/>
+          </p:nvSpPr>
+          <p:spPr>
+            <a:xfrm>
+              <a:off x="10562175" y="4453321"/>
+              <a:ext cx="564001" cy="307777"/>
+            </a:xfrm>
+            <a:prstGeom prst="rect">
+              <a:avLst/>
+            </a:prstGeom>
+            <a:noFill/>
+          </p:spPr>
+          <p:txBody>
+            <a:bodyPr wrap="none" rtlCol="0">
+              <a:spAutoFit/>
+            </a:bodyPr>
+            <a:lstStyle/>
+            <a:p>
+              <a:r>
+                <a:rPr lang="en-US" altLang="ko-KR" sz="1400" dirty="0"/>
+                <a:t>Start</a:t>
+              </a:r>
+              <a:endParaRPr lang="ko-KR" altLang="en-US" sz="1400" dirty="0"/>
+            </a:p>
+          </p:txBody>
+        </p:sp>
+        <p:sp>
+          <p:nvSpPr>
+            <p:cNvPr id="17" name="TextBox 16">
+              <a:extLst>
+                <a:ext uri="{FF2B5EF4-FFF2-40B4-BE49-F238E27FC236}">
+                  <a16:creationId xmlns:a16="http://schemas.microsoft.com/office/drawing/2014/main" id="{42831CBD-0F77-013F-2847-70CDEF650929}"/>
+                </a:ext>
+              </a:extLst>
+            </p:cNvPr>
+            <p:cNvSpPr txBox="1"/>
+            <p:nvPr/>
+          </p:nvSpPr>
+          <p:spPr>
+            <a:xfrm>
+              <a:off x="10541395" y="1992926"/>
+              <a:ext cx="489236" cy="307777"/>
+            </a:xfrm>
+            <a:prstGeom prst="rect">
+              <a:avLst/>
+            </a:prstGeom>
+            <a:noFill/>
+          </p:spPr>
+          <p:txBody>
+            <a:bodyPr wrap="none" rtlCol="0">
+              <a:spAutoFit/>
+            </a:bodyPr>
+            <a:lstStyle/>
+            <a:p>
+              <a:r>
+                <a:rPr lang="en-US" altLang="ko-KR" sz="1400" dirty="0"/>
+                <a:t>End</a:t>
+              </a:r>
+              <a:endParaRPr lang="ko-KR" altLang="en-US" sz="1400" dirty="0"/>
+            </a:p>
+          </p:txBody>
+        </p:sp>
+        <p:cxnSp>
+          <p:nvCxnSpPr>
+            <p:cNvPr id="18" name="직선 화살표 연결선 22">
+              <a:extLst>
+                <a:ext uri="{FF2B5EF4-FFF2-40B4-BE49-F238E27FC236}">
+                  <a16:creationId xmlns:a16="http://schemas.microsoft.com/office/drawing/2014/main" id="{C613FA00-F611-487D-3D8B-1627DE7B0C77}"/>
+                </a:ext>
+              </a:extLst>
+            </p:cNvPr>
+            <p:cNvCxnSpPr>
+              <a:cxnSpLocks/>
+            </p:cNvCxnSpPr>
+            <p:nvPr/>
+          </p:nvCxnSpPr>
+          <p:spPr>
+            <a:xfrm flipV="1">
+              <a:off x="10721097" y="2368992"/>
+              <a:ext cx="0" cy="2026765"/>
+            </a:xfrm>
+            <a:prstGeom prst="straightConnector1">
+              <a:avLst/>
+            </a:prstGeom>
+            <a:ln w="12700">
+              <a:solidFill>
+                <a:schemeClr val="tx1"/>
+              </a:solidFill>
+              <a:prstDash val="dash"/>
+              <a:tailEnd type="triangle"/>
+            </a:ln>
+          </p:spPr>
+          <p:style>
+            <a:lnRef idx="1">
+              <a:schemeClr val="accent1"/>
+            </a:lnRef>
+            <a:fillRef idx="0">
+              <a:schemeClr val="accent1"/>
+            </a:fillRef>
+            <a:effectRef idx="0">
+              <a:schemeClr val="accent1"/>
+            </a:effectRef>
+            <a:fontRef idx="minor">
+              <a:schemeClr val="tx1"/>
+            </a:fontRef>
+          </p:style>
+        </p:cxnSp>
+      </p:grpSp>
+    </p:spTree>
+    <p:extLst>
+      <p:ext uri="{BB962C8B-B14F-4D97-AF65-F5344CB8AC3E}">
+        <p14:creationId xmlns:p14="http://schemas.microsoft.com/office/powerpoint/2010/main" val="1218834372"/>
+      </p:ext>
+    </p:extLst>
+  </p:cSld>
+  <p:clrMapOvr>
+    <a:masterClrMapping/>
+  </p:clrMapOvr>
+</p:sld>
+</file>
+
+<file path=ppt/slides/slide5.xml><?xml version="1.0" encoding="utf-8"?>
 <p:sld xmlns:a="http://schemas.openxmlformats.org/drawingml/2006/main" xmlns:r="http://schemas.openxmlformats.org/officeDocument/2006/relationships" xmlns:p="http://schemas.openxmlformats.org/presentationml/2006/main">
   <p:cSld>
     <p:spTree>

</xml_diff>